<commit_message>
start cleaning event extraction slides
</commit_message>
<xml_diff>
--- a/slides/pptx/5-event-extraction.pptx
+++ b/slides/pptx/5-event-extraction.pptx
@@ -5,23 +5,22 @@
     <p:sldMasterId id="2147483660" r:id="rId1"/>
   </p:sldMasterIdLst>
   <p:notesMasterIdLst>
-    <p:notesMasterId r:id="rId16"/>
+    <p:notesMasterId r:id="rId15"/>
   </p:notesMasterIdLst>
   <p:sldIdLst>
     <p:sldId id="332" r:id="rId2"/>
     <p:sldId id="333" r:id="rId3"/>
     <p:sldId id="334" r:id="rId4"/>
-    <p:sldId id="335" r:id="rId5"/>
-    <p:sldId id="336" r:id="rId6"/>
-    <p:sldId id="337" r:id="rId7"/>
-    <p:sldId id="338" r:id="rId8"/>
-    <p:sldId id="339" r:id="rId9"/>
-    <p:sldId id="340" r:id="rId10"/>
+    <p:sldId id="346" r:id="rId5"/>
+    <p:sldId id="340" r:id="rId6"/>
+    <p:sldId id="335" r:id="rId7"/>
+    <p:sldId id="336" r:id="rId8"/>
+    <p:sldId id="337" r:id="rId9"/>
+    <p:sldId id="339" r:id="rId10"/>
     <p:sldId id="341" r:id="rId11"/>
     <p:sldId id="342" r:id="rId12"/>
     <p:sldId id="343" r:id="rId13"/>
-    <p:sldId id="344" r:id="rId14"/>
-    <p:sldId id="345" r:id="rId15"/>
+    <p:sldId id="345" r:id="rId14"/>
   </p:sldIdLst>
   <p:sldSz cx="9144000" cy="6858000" type="screen4x3"/>
   <p:notesSz cx="6858000" cy="9144000"/>
@@ -210,7 +209,7 @@
           <a:p>
             <a:fld id="{BE1256C8-1BA4-4200-90F3-9413893DDEA5}" type="datetimeFigureOut">
               <a:rPr lang="en-US" smtClean="0"/>
-              <a:t>4/18/2018</a:t>
+              <a:t>4/18/18</a:t>
             </a:fld>
             <a:endParaRPr lang="en-US"/>
           </a:p>
@@ -4334,7 +4333,7 @@
           <p:cNvPr id="4" name="Picture 3">
             <a:extLst>
               <a:ext uri="{FF2B5EF4-FFF2-40B4-BE49-F238E27FC236}">
-                <a16:creationId xmlns="" xmlns:a16="http://schemas.microsoft.com/office/drawing/2014/main" id="{0B14148A-CDBC-4010-8E64-009C4BA6BA7A}"/>
+                <a16:creationId xmlns:a16="http://schemas.microsoft.com/office/drawing/2014/main" xmlns="" id="{0B14148A-CDBC-4010-8E64-009C4BA6BA7A}"/>
               </a:ext>
             </a:extLst>
           </p:cNvPr>
@@ -4401,7 +4400,7 @@
           <p:cNvPr id="2" name="Title 1">
             <a:extLst>
               <a:ext uri="{FF2B5EF4-FFF2-40B4-BE49-F238E27FC236}">
-                <a16:creationId xmlns="" xmlns:a16="http://schemas.microsoft.com/office/drawing/2014/main" id="{F5EA10E8-179C-48CA-A962-83AC7A417653}"/>
+                <a16:creationId xmlns:a16="http://schemas.microsoft.com/office/drawing/2014/main" xmlns="" id="{F5EA10E8-179C-48CA-A962-83AC7A417653}"/>
               </a:ext>
             </a:extLst>
           </p:cNvPr>
@@ -4429,7 +4428,7 @@
           <p:cNvPr id="4" name="Picture 3">
             <a:extLst>
               <a:ext uri="{FF2B5EF4-FFF2-40B4-BE49-F238E27FC236}">
-                <a16:creationId xmlns="" xmlns:a16="http://schemas.microsoft.com/office/drawing/2014/main" id="{3B9B8793-346A-43E4-A56F-D565544760F6}"/>
+                <a16:creationId xmlns:a16="http://schemas.microsoft.com/office/drawing/2014/main" xmlns="" id="{3B9B8793-346A-43E4-A56F-D565544760F6}"/>
               </a:ext>
             </a:extLst>
           </p:cNvPr>
@@ -4496,7 +4495,7 @@
           <p:cNvPr id="2" name="Title 1">
             <a:extLst>
               <a:ext uri="{FF2B5EF4-FFF2-40B4-BE49-F238E27FC236}">
-                <a16:creationId xmlns="" xmlns:a16="http://schemas.microsoft.com/office/drawing/2014/main" id="{F5EA10E8-179C-48CA-A962-83AC7A417653}"/>
+                <a16:creationId xmlns:a16="http://schemas.microsoft.com/office/drawing/2014/main" xmlns="" id="{F5EA10E8-179C-48CA-A962-83AC7A417653}"/>
               </a:ext>
             </a:extLst>
           </p:cNvPr>
@@ -4524,7 +4523,7 @@
           <p:cNvPr id="3" name="Picture 2">
             <a:extLst>
               <a:ext uri="{FF2B5EF4-FFF2-40B4-BE49-F238E27FC236}">
-                <a16:creationId xmlns="" xmlns:a16="http://schemas.microsoft.com/office/drawing/2014/main" id="{47C8D744-821F-442B-8D37-F20DB15467EA}"/>
+                <a16:creationId xmlns:a16="http://schemas.microsoft.com/office/drawing/2014/main" xmlns="" id="{47C8D744-821F-442B-8D37-F20DB15467EA}"/>
               </a:ext>
             </a:extLst>
           </p:cNvPr>
@@ -4591,7 +4590,7 @@
           <p:cNvPr id="2" name="Title 1">
             <a:extLst>
               <a:ext uri="{FF2B5EF4-FFF2-40B4-BE49-F238E27FC236}">
-                <a16:creationId xmlns="" xmlns:a16="http://schemas.microsoft.com/office/drawing/2014/main" id="{AE890550-47CB-4C83-8211-5BF6F356FA01}"/>
+                <a16:creationId xmlns:a16="http://schemas.microsoft.com/office/drawing/2014/main" xmlns="" id="{E1C3A720-E34E-4BB6-B515-B3C2EF039BC8}"/>
               </a:ext>
             </a:extLst>
           </p:cNvPr>
@@ -4599,99 +4598,6 @@
             <a:spLocks noGrp="1"/>
           </p:cNvSpPr>
           <p:nvPr>
-            <p:ph type="ctrTitle"/>
-          </p:nvPr>
-        </p:nvSpPr>
-        <p:spPr/>
-        <p:txBody>
-          <a:bodyPr/>
-          <a:lstStyle/>
-          <a:p>
-            <a:r>
-              <a:rPr lang="en-US"/>
-              <a:t>Hands-on</a:t>
-            </a:r>
-          </a:p>
-        </p:txBody>
-      </p:sp>
-      <p:sp>
-        <p:nvSpPr>
-          <p:cNvPr id="4" name="Subtitle 3">
-            <a:extLst>
-              <a:ext uri="{FF2B5EF4-FFF2-40B4-BE49-F238E27FC236}">
-                <a16:creationId xmlns="" xmlns:a16="http://schemas.microsoft.com/office/drawing/2014/main" id="{A17F6BE8-24F0-4801-8F49-5E26B514EED2}"/>
-              </a:ext>
-            </a:extLst>
-          </p:cNvPr>
-          <p:cNvSpPr>
-            <a:spLocks noGrp="1"/>
-          </p:cNvSpPr>
-          <p:nvPr>
-            <p:ph type="subTitle" idx="1"/>
-          </p:nvPr>
-        </p:nvSpPr>
-        <p:spPr/>
-        <p:txBody>
-          <a:bodyPr/>
-          <a:lstStyle/>
-          <a:p>
-            <a:r>
-              <a:rPr lang="en-US"/>
-              <a:t>Event extraction system specifically designed for short texts/tweets</a:t>
-            </a:r>
-          </a:p>
-        </p:txBody>
-      </p:sp>
-    </p:spTree>
-    <p:extLst>
-      <p:ext uri="{BB962C8B-B14F-4D97-AF65-F5344CB8AC3E}">
-        <p14:creationId xmlns:p14="http://schemas.microsoft.com/office/powerpoint/2010/main" val="1055052955"/>
-      </p:ext>
-    </p:extLst>
-  </p:cSld>
-  <p:clrMapOvr>
-    <a:masterClrMapping/>
-  </p:clrMapOvr>
-  <p:timing>
-    <p:tnLst>
-      <p:par>
-        <p:cTn id="1" dur="indefinite" restart="never" nodeType="tmRoot"/>
-      </p:par>
-    </p:tnLst>
-  </p:timing>
-</p:sld>
-</file>
-
-<file path=ppt/slides/slide14.xml><?xml version="1.0" encoding="utf-8"?>
-<p:sld xmlns:a="http://schemas.openxmlformats.org/drawingml/2006/main" xmlns:r="http://schemas.openxmlformats.org/officeDocument/2006/relationships" xmlns:p="http://schemas.openxmlformats.org/presentationml/2006/main">
-  <p:cSld>
-    <p:spTree>
-      <p:nvGrpSpPr>
-        <p:cNvPr id="1" name=""/>
-        <p:cNvGrpSpPr/>
-        <p:nvPr/>
-      </p:nvGrpSpPr>
-      <p:grpSpPr>
-        <a:xfrm>
-          <a:off x="0" y="0"/>
-          <a:ext cx="0" cy="0"/>
-          <a:chOff x="0" y="0"/>
-          <a:chExt cx="0" cy="0"/>
-        </a:xfrm>
-      </p:grpSpPr>
-      <p:sp>
-        <p:nvSpPr>
-          <p:cNvPr id="2" name="Title 1">
-            <a:extLst>
-              <a:ext uri="{FF2B5EF4-FFF2-40B4-BE49-F238E27FC236}">
-                <a16:creationId xmlns="" xmlns:a16="http://schemas.microsoft.com/office/drawing/2014/main" id="{E1C3A720-E34E-4BB6-B515-B3C2EF039BC8}"/>
-              </a:ext>
-            </a:extLst>
-          </p:cNvPr>
-          <p:cNvSpPr>
-            <a:spLocks noGrp="1"/>
-          </p:cNvSpPr>
-          <p:nvPr>
             <p:ph type="title"/>
           </p:nvPr>
         </p:nvSpPr>
@@ -4712,7 +4618,7 @@
           <p:cNvPr id="3" name="Content Placeholder 2">
             <a:extLst>
               <a:ext uri="{FF2B5EF4-FFF2-40B4-BE49-F238E27FC236}">
-                <a16:creationId xmlns="" xmlns:a16="http://schemas.microsoft.com/office/drawing/2014/main" id="{D16B1CA5-8025-464F-80E9-9942274912F8}"/>
+                <a16:creationId xmlns:a16="http://schemas.microsoft.com/office/drawing/2014/main" xmlns="" id="{D16B1CA5-8025-464F-80E9-9942274912F8}"/>
               </a:ext>
             </a:extLst>
           </p:cNvPr>
@@ -4807,7 +4713,7 @@
           <p:cNvPr id="2" name="Title 1">
             <a:extLst>
               <a:ext uri="{FF2B5EF4-FFF2-40B4-BE49-F238E27FC236}">
-                <a16:creationId xmlns="" xmlns:a16="http://schemas.microsoft.com/office/drawing/2014/main" id="{47E09107-4194-4BB3-9118-E9B9EDF2C558}"/>
+                <a16:creationId xmlns:a16="http://schemas.microsoft.com/office/drawing/2014/main" xmlns="" id="{47E09107-4194-4BB3-9118-E9B9EDF2C558}"/>
               </a:ext>
             </a:extLst>
           </p:cNvPr>
@@ -4835,7 +4741,7 @@
           <p:cNvPr id="4" name="Picture 3">
             <a:extLst>
               <a:ext uri="{FF2B5EF4-FFF2-40B4-BE49-F238E27FC236}">
-                <a16:creationId xmlns="" xmlns:a16="http://schemas.microsoft.com/office/drawing/2014/main" id="{A2CCD1F4-74E1-4EA7-93C2-50DD90CBF94E}"/>
+                <a16:creationId xmlns:a16="http://schemas.microsoft.com/office/drawing/2014/main" xmlns="" id="{A2CCD1F4-74E1-4EA7-93C2-50DD90CBF94E}"/>
               </a:ext>
             </a:extLst>
           </p:cNvPr>
@@ -4959,7 +4865,7 @@
           <p:cNvPr id="5" name="Straight Arrow Connector 4">
             <a:extLst>
               <a:ext uri="{FF2B5EF4-FFF2-40B4-BE49-F238E27FC236}">
-                <a16:creationId xmlns="" xmlns:a16="http://schemas.microsoft.com/office/drawing/2014/main" id="{F462F756-659C-4710-82DE-942B1B17E5B8}"/>
+                <a16:creationId xmlns:a16="http://schemas.microsoft.com/office/drawing/2014/main" xmlns="" id="{F462F756-659C-4710-82DE-942B1B17E5B8}"/>
               </a:ext>
             </a:extLst>
           </p:cNvPr>
@@ -5001,7 +4907,7 @@
           <p:cNvPr id="6" name="Straight Arrow Connector 5">
             <a:extLst>
               <a:ext uri="{FF2B5EF4-FFF2-40B4-BE49-F238E27FC236}">
-                <a16:creationId xmlns="" xmlns:a16="http://schemas.microsoft.com/office/drawing/2014/main" id="{2EB44B3D-A1BD-41F6-A459-EE6FE6AAF2B4}"/>
+                <a16:creationId xmlns:a16="http://schemas.microsoft.com/office/drawing/2014/main" xmlns="" id="{2EB44B3D-A1BD-41F6-A459-EE6FE6AAF2B4}"/>
               </a:ext>
             </a:extLst>
           </p:cNvPr>
@@ -5043,7 +4949,7 @@
           <p:cNvPr id="9" name="TextBox 8">
             <a:extLst>
               <a:ext uri="{FF2B5EF4-FFF2-40B4-BE49-F238E27FC236}">
-                <a16:creationId xmlns="" xmlns:a16="http://schemas.microsoft.com/office/drawing/2014/main" id="{4BC24041-891F-4770-8AA2-5EE9E1E12059}"/>
+                <a16:creationId xmlns:a16="http://schemas.microsoft.com/office/drawing/2014/main" xmlns="" id="{4BC24041-891F-4770-8AA2-5EE9E1E12059}"/>
               </a:ext>
             </a:extLst>
           </p:cNvPr>
@@ -5078,7 +4984,7 @@
           <p:cNvPr id="10" name="TextBox 9">
             <a:extLst>
               <a:ext uri="{FF2B5EF4-FFF2-40B4-BE49-F238E27FC236}">
-                <a16:creationId xmlns="" xmlns:a16="http://schemas.microsoft.com/office/drawing/2014/main" id="{A4884E0B-0E26-42F8-A8BC-8ABAE815804F}"/>
+                <a16:creationId xmlns:a16="http://schemas.microsoft.com/office/drawing/2014/main" xmlns="" id="{A4884E0B-0E26-42F8-A8BC-8ABAE815804F}"/>
               </a:ext>
             </a:extLst>
           </p:cNvPr>
@@ -5113,7 +5019,7 @@
           <p:cNvPr id="11" name="TextBox 10">
             <a:extLst>
               <a:ext uri="{FF2B5EF4-FFF2-40B4-BE49-F238E27FC236}">
-                <a16:creationId xmlns="" xmlns:a16="http://schemas.microsoft.com/office/drawing/2014/main" id="{DECCFEC6-9813-4E58-B12C-F055AF0312C0}"/>
+                <a16:creationId xmlns:a16="http://schemas.microsoft.com/office/drawing/2014/main" xmlns="" id="{DECCFEC6-9813-4E58-B12C-F055AF0312C0}"/>
               </a:ext>
             </a:extLst>
           </p:cNvPr>
@@ -5168,7 +5074,7 @@
           <p:cNvPr id="15" name="TextBox 14">
             <a:extLst>
               <a:ext uri="{FF2B5EF4-FFF2-40B4-BE49-F238E27FC236}">
-                <a16:creationId xmlns="" xmlns:a16="http://schemas.microsoft.com/office/drawing/2014/main" id="{63849605-0246-411E-A2F1-308CC50FEB7C}"/>
+                <a16:creationId xmlns:a16="http://schemas.microsoft.com/office/drawing/2014/main" xmlns="" id="{63849605-0246-411E-A2F1-308CC50FEB7C}"/>
               </a:ext>
             </a:extLst>
           </p:cNvPr>
@@ -5252,6 +5158,376 @@
           <a:p>
             <a:r>
               <a:rPr lang="en-US"/>
+              <a:t>In Social Media</a:t>
+            </a:r>
+            <a:r>
+              <a:rPr lang="mr-IN"/>
+              <a:t>…</a:t>
+            </a:r>
+            <a:endParaRPr lang="en-US"/>
+          </a:p>
+        </p:txBody>
+      </p:sp>
+      <p:sp>
+        <p:nvSpPr>
+          <p:cNvPr id="3" name="Content Placeholder 2"/>
+          <p:cNvSpPr>
+            <a:spLocks noGrp="1"/>
+          </p:cNvSpPr>
+          <p:nvPr>
+            <p:ph idx="1"/>
+          </p:nvPr>
+        </p:nvSpPr>
+        <p:spPr/>
+        <p:txBody>
+          <a:bodyPr/>
+          <a:lstStyle/>
+          <a:p>
+            <a:r>
+              <a:rPr lang="en-US"/>
+              <a:t>Additional problem of first </a:t>
+            </a:r>
+            <a:r>
+              <a:rPr lang="en-US" b="1"/>
+              <a:t>detecting</a:t>
+            </a:r>
+            <a:r>
+              <a:rPr lang="en-US"/>
+              <a:t> whether the tweet is describing an event</a:t>
+            </a:r>
+          </a:p>
+          <a:p>
+            <a:r>
+              <a:rPr lang="en-US"/>
+              <a:t>Short text of tweet makes this essential for performance</a:t>
+            </a:r>
+          </a:p>
+          <a:p>
+            <a:r>
+              <a:rPr lang="en-US"/>
+              <a:t>Detection and extraction complement each other</a:t>
+            </a:r>
+          </a:p>
+          <a:p>
+            <a:pPr lvl="1"/>
+            <a:r>
+              <a:rPr lang="en-US"/>
+              <a:t>Forces us to decide what an event really is, for the purposes of extraction/detection/inference</a:t>
+            </a:r>
+          </a:p>
+        </p:txBody>
+      </p:sp>
+    </p:spTree>
+    <p:extLst>
+      <p:ext uri="{BB962C8B-B14F-4D97-AF65-F5344CB8AC3E}">
+        <p14:creationId xmlns:p14="http://schemas.microsoft.com/office/powerpoint/2010/main" val="260022398"/>
+      </p:ext>
+    </p:extLst>
+  </p:cSld>
+  <p:clrMapOvr>
+    <a:masterClrMapping/>
+  </p:clrMapOvr>
+</p:sld>
+</file>
+
+<file path=ppt/slides/slide5.xml><?xml version="1.0" encoding="utf-8"?>
+<p:sld xmlns:a="http://schemas.openxmlformats.org/drawingml/2006/main" xmlns:r="http://schemas.openxmlformats.org/officeDocument/2006/relationships" xmlns:p="http://schemas.openxmlformats.org/presentationml/2006/main">
+  <p:cSld>
+    <p:spTree>
+      <p:nvGrpSpPr>
+        <p:cNvPr id="1" name=""/>
+        <p:cNvGrpSpPr/>
+        <p:nvPr/>
+      </p:nvGrpSpPr>
+      <p:grpSpPr>
+        <a:xfrm>
+          <a:off x="0" y="0"/>
+          <a:ext cx="0" cy="0"/>
+          <a:chOff x="0" y="0"/>
+          <a:chExt cx="0" cy="0"/>
+        </a:xfrm>
+      </p:grpSpPr>
+      <p:sp>
+        <p:nvSpPr>
+          <p:cNvPr id="2" name="Title 1">
+            <a:extLst>
+              <a:ext uri="{FF2B5EF4-FFF2-40B4-BE49-F238E27FC236}">
+                <a16:creationId xmlns:a16="http://schemas.microsoft.com/office/drawing/2014/main" xmlns="" id="{789F0914-9F89-48D5-A04A-EB8506D20677}"/>
+              </a:ext>
+            </a:extLst>
+          </p:cNvPr>
+          <p:cNvSpPr>
+            <a:spLocks noGrp="1"/>
+          </p:cNvSpPr>
+          <p:nvPr>
+            <p:ph type="title"/>
+          </p:nvPr>
+        </p:nvSpPr>
+        <p:spPr>
+          <a:xfrm>
+            <a:off x="289560" y="365126"/>
+            <a:ext cx="8686800" cy="1325563"/>
+          </a:xfrm>
+        </p:spPr>
+        <p:txBody>
+          <a:bodyPr/>
+          <a:lstStyle/>
+          <a:p>
+            <a:r>
+              <a:rPr lang="en-US"/>
+              <a:t>Event Detection in Twitter: Examples</a:t>
+            </a:r>
+          </a:p>
+        </p:txBody>
+      </p:sp>
+      <p:sp>
+        <p:nvSpPr>
+          <p:cNvPr id="5" name="Rectangle 4">
+            <a:extLst>
+              <a:ext uri="{FF2B5EF4-FFF2-40B4-BE49-F238E27FC236}">
+                <a16:creationId xmlns:a16="http://schemas.microsoft.com/office/drawing/2014/main" xmlns="" id="{D5F8127B-3EAF-4D79-B961-9CDCF5DA2CA6}"/>
+              </a:ext>
+            </a:extLst>
+          </p:cNvPr>
+          <p:cNvSpPr/>
+          <p:nvPr/>
+        </p:nvSpPr>
+        <p:spPr>
+          <a:xfrm>
+            <a:off x="735330" y="3295596"/>
+            <a:ext cx="8012430" cy="1200329"/>
+          </a:xfrm>
+          <a:prstGeom prst="rect">
+            <a:avLst/>
+          </a:prstGeom>
+        </p:spPr>
+        <p:txBody>
+          <a:bodyPr wrap="square">
+            <a:spAutoFit/>
+          </a:bodyPr>
+          <a:lstStyle/>
+          <a:p>
+            <a:r>
+              <a:rPr lang="en-US" sz="2400" dirty="0"/>
+              <a:t>RT </a:t>
+            </a:r>
+            <a:r>
+              <a:rPr lang="en-US" sz="2400" dirty="0">
+                <a:solidFill>
+                  <a:srgbClr val="0070C0"/>
+                </a:solidFill>
+              </a:rPr>
+              <a:t>@Stump4TrumpPAC</a:t>
+            </a:r>
+            <a:r>
+              <a:rPr lang="en-US" sz="2400" dirty="0"/>
+              <a:t>: These are the 58 people killed in the Las Vegas massacre, the deadliest mass shooting in modern U.S. history.. 💐🙏🏻 http…</a:t>
+            </a:r>
+          </a:p>
+        </p:txBody>
+      </p:sp>
+      <p:sp>
+        <p:nvSpPr>
+          <p:cNvPr id="6" name="Rectangle 5">
+            <a:extLst>
+              <a:ext uri="{FF2B5EF4-FFF2-40B4-BE49-F238E27FC236}">
+                <a16:creationId xmlns:a16="http://schemas.microsoft.com/office/drawing/2014/main" xmlns="" id="{1B041536-BBFD-40FB-8C12-11420F37DDEA}"/>
+              </a:ext>
+            </a:extLst>
+          </p:cNvPr>
+          <p:cNvSpPr/>
+          <p:nvPr/>
+        </p:nvSpPr>
+        <p:spPr>
+          <a:xfrm>
+            <a:off x="735330" y="4819140"/>
+            <a:ext cx="8016239" cy="1200329"/>
+          </a:xfrm>
+          <a:prstGeom prst="rect">
+            <a:avLst/>
+          </a:prstGeom>
+        </p:spPr>
+        <p:txBody>
+          <a:bodyPr wrap="square">
+            <a:spAutoFit/>
+          </a:bodyPr>
+          <a:lstStyle/>
+          <a:p>
+            <a:r>
+              <a:rPr lang="en-US" sz="2400" dirty="0"/>
+              <a:t>RT </a:t>
+            </a:r>
+            <a:r>
+              <a:rPr lang="en-US" sz="2400" dirty="0">
+                <a:solidFill>
+                  <a:srgbClr val="0070C0"/>
+                </a:solidFill>
+              </a:rPr>
+              <a:t>@</a:t>
+            </a:r>
+            <a:r>
+              <a:rPr lang="en-US" sz="2400" dirty="0" err="1">
+                <a:solidFill>
+                  <a:srgbClr val="0070C0"/>
+                </a:solidFill>
+              </a:rPr>
+              <a:t>dragoner_JP</a:t>
+            </a:r>
+            <a:r>
+              <a:rPr lang="en-US" sz="2400" dirty="0"/>
+              <a:t>: うげえ……「ラスベガス銃撃の(カナダ人)犠牲者が巨額の医療費に直面」→ Las Vegas shooting victims facing large medical bills </a:t>
+            </a:r>
+            <a:r>
+              <a:rPr lang="en-US" sz="2400" dirty="0">
+                <a:solidFill>
+                  <a:srgbClr val="0070C0"/>
+                </a:solidFill>
+              </a:rPr>
+              <a:t>https://</a:t>
+            </a:r>
+            <a:r>
+              <a:rPr lang="en-US" sz="2400" dirty="0" err="1">
+                <a:solidFill>
+                  <a:srgbClr val="0070C0"/>
+                </a:solidFill>
+              </a:rPr>
+              <a:t>t.co</a:t>
+            </a:r>
+            <a:r>
+              <a:rPr lang="en-US" sz="2400" dirty="0">
+                <a:solidFill>
+                  <a:srgbClr val="0070C0"/>
+                </a:solidFill>
+              </a:rPr>
+              <a:t>/1F3bgH17Jv</a:t>
+            </a:r>
+          </a:p>
+        </p:txBody>
+      </p:sp>
+      <p:sp>
+        <p:nvSpPr>
+          <p:cNvPr id="7" name="Rectangle 6">
+            <a:extLst>
+              <a:ext uri="{FF2B5EF4-FFF2-40B4-BE49-F238E27FC236}">
+                <a16:creationId xmlns:a16="http://schemas.microsoft.com/office/drawing/2014/main" xmlns="" id="{D5F8127B-3EAF-4D79-B961-9CDCF5DA2CA6}"/>
+              </a:ext>
+            </a:extLst>
+          </p:cNvPr>
+          <p:cNvSpPr/>
+          <p:nvPr/>
+        </p:nvSpPr>
+        <p:spPr>
+          <a:xfrm>
+            <a:off x="735330" y="1772052"/>
+            <a:ext cx="8012430" cy="1200329"/>
+          </a:xfrm>
+          <a:prstGeom prst="rect">
+            <a:avLst/>
+          </a:prstGeom>
+        </p:spPr>
+        <p:txBody>
+          <a:bodyPr wrap="square">
+            <a:spAutoFit/>
+          </a:bodyPr>
+          <a:lstStyle/>
+          <a:p>
+            <a:r>
+              <a:rPr lang="en-US" sz="2400" dirty="0"/>
+              <a:t>RT </a:t>
+            </a:r>
+            <a:r>
+              <a:rPr lang="en-US" sz="2400" dirty="0">
+                <a:solidFill>
+                  <a:srgbClr val="0070C0"/>
+                </a:solidFill>
+              </a:rPr>
+              <a:t>@jc_stubbs</a:t>
+            </a:r>
+            <a:r>
+              <a:rPr lang="en-US" sz="2400" dirty="0"/>
+              <a:t>: Another tragic day in </a:t>
+            </a:r>
+            <a:r>
+              <a:rPr lang="en-US" sz="2400" dirty="0">
+                <a:solidFill>
+                  <a:srgbClr val="0070C0"/>
+                </a:solidFill>
+              </a:rPr>
+              <a:t>#Ukraine </a:t>
+            </a:r>
+            <a:r>
+              <a:rPr lang="mr-IN" sz="2400" dirty="0"/>
+              <a:t>–</a:t>
+            </a:r>
+            <a:r>
+              <a:rPr lang="en-US" sz="2400" dirty="0"/>
+              <a:t> More than 50 rebels killed as new leader unleashes assault: </a:t>
+            </a:r>
+            <a:r>
+              <a:rPr lang="en-US" sz="2400" dirty="0">
+                <a:solidFill>
+                  <a:srgbClr val="0070C0"/>
+                </a:solidFill>
+              </a:rPr>
+              <a:t>http://t.co/wcfU3kyAFX</a:t>
+            </a:r>
+          </a:p>
+        </p:txBody>
+      </p:sp>
+    </p:spTree>
+    <p:extLst>
+      <p:ext uri="{BB962C8B-B14F-4D97-AF65-F5344CB8AC3E}">
+        <p14:creationId xmlns:p14="http://schemas.microsoft.com/office/powerpoint/2010/main" val="1556995143"/>
+      </p:ext>
+    </p:extLst>
+  </p:cSld>
+  <p:clrMapOvr>
+    <a:masterClrMapping/>
+  </p:clrMapOvr>
+  <p:timing>
+    <p:tnLst>
+      <p:par>
+        <p:cTn id="1" dur="indefinite" restart="never" nodeType="tmRoot"/>
+      </p:par>
+    </p:tnLst>
+  </p:timing>
+</p:sld>
+</file>
+
+<file path=ppt/slides/slide6.xml><?xml version="1.0" encoding="utf-8"?>
+<p:sld xmlns:a="http://schemas.openxmlformats.org/drawingml/2006/main" xmlns:r="http://schemas.openxmlformats.org/officeDocument/2006/relationships" xmlns:p="http://schemas.openxmlformats.org/presentationml/2006/main">
+  <p:cSld>
+    <p:spTree>
+      <p:nvGrpSpPr>
+        <p:cNvPr id="1" name=""/>
+        <p:cNvGrpSpPr/>
+        <p:nvPr/>
+      </p:nvGrpSpPr>
+      <p:grpSpPr>
+        <a:xfrm>
+          <a:off x="0" y="0"/>
+          <a:ext cx="0" cy="0"/>
+          <a:chOff x="0" y="0"/>
+          <a:chExt cx="0" cy="0"/>
+        </a:xfrm>
+      </p:grpSpPr>
+      <p:sp>
+        <p:nvSpPr>
+          <p:cNvPr id="2" name="Title 1"/>
+          <p:cNvSpPr>
+            <a:spLocks noGrp="1"/>
+          </p:cNvSpPr>
+          <p:nvPr>
+            <p:ph type="title"/>
+          </p:nvPr>
+        </p:nvSpPr>
+        <p:spPr/>
+        <p:txBody>
+          <a:bodyPr/>
+          <a:lstStyle/>
+          <a:p>
+            <a:r>
+              <a:rPr lang="en-US"/>
               <a:t>An Example Workflow</a:t>
             </a:r>
             <a:endParaRPr lang="en-US" dirty="0"/>
@@ -5282,7 +5558,7 @@
           <p:cNvPr id="4" name="Picture 3">
             <a:extLst>
               <a:ext uri="{FF2B5EF4-FFF2-40B4-BE49-F238E27FC236}">
-                <a16:creationId xmlns="" xmlns:a16="http://schemas.microsoft.com/office/drawing/2014/main" id="{A5FA5E3F-93A3-49D6-87CB-54DA033C241C}"/>
+                <a16:creationId xmlns:a16="http://schemas.microsoft.com/office/drawing/2014/main" xmlns="" id="{A5FA5E3F-93A3-49D6-87CB-54DA033C241C}"/>
               </a:ext>
             </a:extLst>
           </p:cNvPr>
@@ -5299,8 +5575,8 @@
         </p:blipFill>
         <p:spPr>
           <a:xfrm>
-            <a:off x="736600" y="1690689"/>
-            <a:ext cx="7505700" cy="4783985"/>
+            <a:off x="999067" y="1825625"/>
+            <a:ext cx="6705600" cy="4274017"/>
           </a:xfrm>
           <a:prstGeom prst="rect">
             <a:avLst/>
@@ -5327,7 +5603,7 @@
 </p:sld>
 </file>
 
-<file path=ppt/slides/slide5.xml><?xml version="1.0" encoding="utf-8"?>
+<file path=ppt/slides/slide7.xml><?xml version="1.0" encoding="utf-8"?>
 <p:sld xmlns:a="http://schemas.openxmlformats.org/drawingml/2006/main" xmlns:r="http://schemas.openxmlformats.org/officeDocument/2006/relationships" xmlns:p="http://schemas.openxmlformats.org/presentationml/2006/main">
   <p:cSld>
     <p:spTree>
@@ -5349,7 +5625,7 @@
           <p:cNvPr id="2" name="Title 1">
             <a:extLst>
               <a:ext uri="{FF2B5EF4-FFF2-40B4-BE49-F238E27FC236}">
-                <a16:creationId xmlns="" xmlns:a16="http://schemas.microsoft.com/office/drawing/2014/main" id="{B4CF79A2-9503-4AD1-9E75-1E1A5C90BD69}"/>
+                <a16:creationId xmlns:a16="http://schemas.microsoft.com/office/drawing/2014/main" xmlns="" id="{B4CF79A2-9503-4AD1-9E75-1E1A5C90BD69}"/>
               </a:ext>
             </a:extLst>
           </p:cNvPr>
@@ -5377,7 +5653,7 @@
           <p:cNvPr id="5" name="Picture 4">
             <a:extLst>
               <a:ext uri="{FF2B5EF4-FFF2-40B4-BE49-F238E27FC236}">
-                <a16:creationId xmlns="" xmlns:a16="http://schemas.microsoft.com/office/drawing/2014/main" id="{0FC4BCA5-E0C5-4BB0-88EE-29E619BEB388}"/>
+                <a16:creationId xmlns:a16="http://schemas.microsoft.com/office/drawing/2014/main" xmlns="" id="{0FC4BCA5-E0C5-4BB0-88EE-29E619BEB388}"/>
               </a:ext>
             </a:extLst>
           </p:cNvPr>
@@ -5422,7 +5698,7 @@
 </p:sld>
 </file>
 
-<file path=ppt/slides/slide6.xml><?xml version="1.0" encoding="utf-8"?>
+<file path=ppt/slides/slide8.xml><?xml version="1.0" encoding="utf-8"?>
 <p:sld xmlns:a="http://schemas.openxmlformats.org/drawingml/2006/main" xmlns:r="http://schemas.openxmlformats.org/officeDocument/2006/relationships" xmlns:p="http://schemas.openxmlformats.org/presentationml/2006/main">
   <p:cSld>
     <p:spTree>
@@ -5444,7 +5720,7 @@
           <p:cNvPr id="2" name="Title 1">
             <a:extLst>
               <a:ext uri="{FF2B5EF4-FFF2-40B4-BE49-F238E27FC236}">
-                <a16:creationId xmlns="" xmlns:a16="http://schemas.microsoft.com/office/drawing/2014/main" id="{D6B083CC-4209-47D3-8AFB-A755190E41BB}"/>
+                <a16:creationId xmlns:a16="http://schemas.microsoft.com/office/drawing/2014/main" xmlns="" id="{D6B083CC-4209-47D3-8AFB-A755190E41BB}"/>
               </a:ext>
             </a:extLst>
           </p:cNvPr>
@@ -5472,7 +5748,7 @@
           <p:cNvPr id="3" name="Content Placeholder 2">
             <a:extLst>
               <a:ext uri="{FF2B5EF4-FFF2-40B4-BE49-F238E27FC236}">
-                <a16:creationId xmlns="" xmlns:a16="http://schemas.microsoft.com/office/drawing/2014/main" id="{21A045AF-1B0C-473F-B2BD-16CC029381CC}"/>
+                <a16:creationId xmlns:a16="http://schemas.microsoft.com/office/drawing/2014/main" xmlns="" id="{21A045AF-1B0C-473F-B2BD-16CC029381CC}"/>
               </a:ext>
             </a:extLst>
           </p:cNvPr>
@@ -5539,7 +5815,7 @@
           <p:cNvPr id="4" name="Content Placeholder 2">
             <a:extLst>
               <a:ext uri="{FF2B5EF4-FFF2-40B4-BE49-F238E27FC236}">
-                <a16:creationId xmlns="" xmlns:a16="http://schemas.microsoft.com/office/drawing/2014/main" id="{560166D7-7B6D-4B68-B8AE-1C1CC6E70202}"/>
+                <a16:creationId xmlns:a16="http://schemas.microsoft.com/office/drawing/2014/main" xmlns="" id="{560166D7-7B6D-4B68-B8AE-1C1CC6E70202}"/>
               </a:ext>
             </a:extLst>
           </p:cNvPr>
@@ -5770,7 +6046,7 @@
           <p:cNvPr id="5" name="Arrow: Right 4">
             <a:extLst>
               <a:ext uri="{FF2B5EF4-FFF2-40B4-BE49-F238E27FC236}">
-                <a16:creationId xmlns="" xmlns:a16="http://schemas.microsoft.com/office/drawing/2014/main" id="{D1E8C985-9E37-43C2-AD20-259A38EF2B2D}"/>
+                <a16:creationId xmlns:a16="http://schemas.microsoft.com/office/drawing/2014/main" xmlns="" id="{D1E8C985-9E37-43C2-AD20-259A38EF2B2D}"/>
               </a:ext>
             </a:extLst>
           </p:cNvPr>
@@ -5821,7 +6097,7 @@
           <p:cNvPr id="7" name="Content Placeholder 2">
             <a:extLst>
               <a:ext uri="{FF2B5EF4-FFF2-40B4-BE49-F238E27FC236}">
-                <a16:creationId xmlns="" xmlns:a16="http://schemas.microsoft.com/office/drawing/2014/main" id="{5DE865FC-39D0-4B3E-808A-72F7CCD94CD8}"/>
+                <a16:creationId xmlns:a16="http://schemas.microsoft.com/office/drawing/2014/main" xmlns="" id="{5DE865FC-39D0-4B3E-808A-72F7CCD94CD8}"/>
               </a:ext>
             </a:extLst>
           </p:cNvPr>
@@ -6028,7 +6304,7 @@
           <p:cNvPr id="8" name="Arrow: Right 7">
             <a:extLst>
               <a:ext uri="{FF2B5EF4-FFF2-40B4-BE49-F238E27FC236}">
-                <a16:creationId xmlns="" xmlns:a16="http://schemas.microsoft.com/office/drawing/2014/main" id="{3AB65389-B784-4AB6-BC15-A38C68139767}"/>
+                <a16:creationId xmlns:a16="http://schemas.microsoft.com/office/drawing/2014/main" xmlns="" id="{3AB65389-B784-4AB6-BC15-A38C68139767}"/>
               </a:ext>
             </a:extLst>
           </p:cNvPr>
@@ -6078,216 +6354,6 @@
     <p:extLst>
       <p:ext uri="{BB962C8B-B14F-4D97-AF65-F5344CB8AC3E}">
         <p14:creationId xmlns:p14="http://schemas.microsoft.com/office/powerpoint/2010/main" val="446995910"/>
-      </p:ext>
-    </p:extLst>
-  </p:cSld>
-  <p:clrMapOvr>
-    <a:masterClrMapping/>
-  </p:clrMapOvr>
-  <p:timing>
-    <p:tnLst>
-      <p:par>
-        <p:cTn id="1" dur="indefinite" restart="never" nodeType="tmRoot"/>
-      </p:par>
-    </p:tnLst>
-  </p:timing>
-</p:sld>
-</file>
-
-<file path=ppt/slides/slide7.xml><?xml version="1.0" encoding="utf-8"?>
-<p:sld xmlns:a="http://schemas.openxmlformats.org/drawingml/2006/main" xmlns:r="http://schemas.openxmlformats.org/officeDocument/2006/relationships" xmlns:p="http://schemas.openxmlformats.org/presentationml/2006/main">
-  <p:cSld>
-    <p:spTree>
-      <p:nvGrpSpPr>
-        <p:cNvPr id="1" name=""/>
-        <p:cNvGrpSpPr/>
-        <p:nvPr/>
-      </p:nvGrpSpPr>
-      <p:grpSpPr>
-        <a:xfrm>
-          <a:off x="0" y="0"/>
-          <a:ext cx="0" cy="0"/>
-          <a:chOff x="0" y="0"/>
-          <a:chExt cx="0" cy="0"/>
-        </a:xfrm>
-      </p:grpSpPr>
-      <p:sp>
-        <p:nvSpPr>
-          <p:cNvPr id="2" name="Title 1"/>
-          <p:cNvSpPr>
-            <a:spLocks noGrp="1"/>
-          </p:cNvSpPr>
-          <p:nvPr>
-            <p:ph type="ctrTitle"/>
-          </p:nvPr>
-        </p:nvSpPr>
-        <p:spPr/>
-        <p:txBody>
-          <a:bodyPr/>
-          <a:lstStyle/>
-          <a:p>
-            <a:r>
-              <a:rPr lang="en-US" dirty="0"/>
-              <a:t>Hands-on</a:t>
-            </a:r>
-          </a:p>
-        </p:txBody>
-      </p:sp>
-      <p:sp>
-        <p:nvSpPr>
-          <p:cNvPr id="3" name="Content Placeholder 2"/>
-          <p:cNvSpPr>
-            <a:spLocks noGrp="1"/>
-          </p:cNvSpPr>
-          <p:nvPr>
-            <p:ph type="subTitle" idx="1"/>
-          </p:nvPr>
-        </p:nvSpPr>
-        <p:spPr/>
-        <p:txBody>
-          <a:bodyPr/>
-          <a:lstStyle/>
-          <a:p>
-            <a:r>
-              <a:rPr lang="en-US" dirty="0"/>
-              <a:t>(Presently, could change) Yang and Mitchell’s work on joint event-entity extraction</a:t>
-            </a:r>
-          </a:p>
-        </p:txBody>
-      </p:sp>
-    </p:spTree>
-    <p:extLst>
-      <p:ext uri="{BB962C8B-B14F-4D97-AF65-F5344CB8AC3E}">
-        <p14:creationId xmlns:p14="http://schemas.microsoft.com/office/powerpoint/2010/main" val="785958564"/>
-      </p:ext>
-    </p:extLst>
-  </p:cSld>
-  <p:clrMapOvr>
-    <a:masterClrMapping/>
-  </p:clrMapOvr>
-  <p:timing>
-    <p:tnLst>
-      <p:par>
-        <p:cTn id="1" dur="indefinite" restart="never" nodeType="tmRoot"/>
-      </p:par>
-    </p:tnLst>
-  </p:timing>
-</p:sld>
-</file>
-
-<file path=ppt/slides/slide8.xml><?xml version="1.0" encoding="utf-8"?>
-<p:sld xmlns:a="http://schemas.openxmlformats.org/drawingml/2006/main" xmlns:r="http://schemas.openxmlformats.org/officeDocument/2006/relationships" xmlns:p="http://schemas.openxmlformats.org/presentationml/2006/main">
-  <p:cSld>
-    <p:spTree>
-      <p:nvGrpSpPr>
-        <p:cNvPr id="1" name=""/>
-        <p:cNvGrpSpPr/>
-        <p:nvPr/>
-      </p:nvGrpSpPr>
-      <p:grpSpPr>
-        <a:xfrm>
-          <a:off x="0" y="0"/>
-          <a:ext cx="0" cy="0"/>
-          <a:chOff x="0" y="0"/>
-          <a:chExt cx="0" cy="0"/>
-        </a:xfrm>
-      </p:grpSpPr>
-      <p:sp>
-        <p:nvSpPr>
-          <p:cNvPr id="2" name="Title 1">
-            <a:extLst>
-              <a:ext uri="{FF2B5EF4-FFF2-40B4-BE49-F238E27FC236}">
-                <a16:creationId xmlns="" xmlns:a16="http://schemas.microsoft.com/office/drawing/2014/main" id="{8537C631-3420-40A0-B136-850967FD898E}"/>
-              </a:ext>
-            </a:extLst>
-          </p:cNvPr>
-          <p:cNvSpPr>
-            <a:spLocks noGrp="1"/>
-          </p:cNvSpPr>
-          <p:nvPr>
-            <p:ph type="title"/>
-          </p:nvPr>
-        </p:nvSpPr>
-        <p:spPr/>
-        <p:txBody>
-          <a:bodyPr/>
-          <a:lstStyle/>
-          <a:p>
-            <a:r>
-              <a:rPr lang="en-US"/>
-              <a:t>Open Research Issues</a:t>
-            </a:r>
-          </a:p>
-        </p:txBody>
-      </p:sp>
-      <p:sp>
-        <p:nvSpPr>
-          <p:cNvPr id="3" name="Content Placeholder 2">
-            <a:extLst>
-              <a:ext uri="{FF2B5EF4-FFF2-40B4-BE49-F238E27FC236}">
-                <a16:creationId xmlns="" xmlns:a16="http://schemas.microsoft.com/office/drawing/2014/main" id="{F1CD4C0B-C44A-44A7-B3C4-2460C4A5D01B}"/>
-              </a:ext>
-            </a:extLst>
-          </p:cNvPr>
-          <p:cNvSpPr>
-            <a:spLocks noGrp="1"/>
-          </p:cNvSpPr>
-          <p:nvPr>
-            <p:ph idx="1"/>
-          </p:nvPr>
-        </p:nvSpPr>
-        <p:spPr/>
-        <p:txBody>
-          <a:bodyPr>
-            <a:normAutofit fontScale="92500" lnSpcReduction="10000"/>
-          </a:bodyPr>
-          <a:lstStyle/>
-          <a:p>
-            <a:r>
-              <a:rPr lang="en-US"/>
-              <a:t>Context-based advantages of data-driven, knowledge-driven or hybrid approaches</a:t>
-            </a:r>
-          </a:p>
-          <a:p>
-            <a:r>
-              <a:rPr lang="en-US"/>
-              <a:t>Understanding the limitations of specific event extraction techniques</a:t>
-            </a:r>
-          </a:p>
-          <a:p>
-            <a:r>
-              <a:rPr lang="en-US"/>
-              <a:t>The domain-dependency of event extraction procedures, affecting both their flexibility and effectiveness</a:t>
-            </a:r>
-          </a:p>
-          <a:p>
-            <a:r>
-              <a:rPr lang="en-US"/>
-              <a:t>The scalability of event extraction approaches when dealing with Big Data</a:t>
-            </a:r>
-          </a:p>
-          <a:p>
-            <a:r>
-              <a:rPr lang="en-US"/>
-              <a:t>The complexity of extracted events</a:t>
-            </a:r>
-          </a:p>
-          <a:p>
-            <a:r>
-              <a:rPr lang="en-US">
-                <a:solidFill>
-                  <a:srgbClr val="7030A0"/>
-                </a:solidFill>
-              </a:rPr>
-              <a:t>Extraction from noisy sources like Twitter</a:t>
-            </a:r>
-          </a:p>
-        </p:txBody>
-      </p:sp>
-    </p:spTree>
-    <p:extLst>
-      <p:ext uri="{BB962C8B-B14F-4D97-AF65-F5344CB8AC3E}">
-        <p14:creationId xmlns:p14="http://schemas.microsoft.com/office/powerpoint/2010/main" val="874142107"/>
       </p:ext>
     </p:extLst>
   </p:cSld>
@@ -6326,7 +6392,7 @@
           <p:cNvPr id="2" name="Title 1">
             <a:extLst>
               <a:ext uri="{FF2B5EF4-FFF2-40B4-BE49-F238E27FC236}">
-                <a16:creationId xmlns="" xmlns:a16="http://schemas.microsoft.com/office/drawing/2014/main" id="{789F0914-9F89-48D5-A04A-EB8506D20677}"/>
+                <a16:creationId xmlns:a16="http://schemas.microsoft.com/office/drawing/2014/main" xmlns="" id="{8537C631-3420-40A0-B136-850967FD898E}"/>
               </a:ext>
             </a:extLst>
           </p:cNvPr>
@@ -6337,133 +6403,78 @@
             <p:ph type="title"/>
           </p:nvPr>
         </p:nvSpPr>
-        <p:spPr>
-          <a:xfrm>
-            <a:off x="289560" y="365126"/>
-            <a:ext cx="8686800" cy="1325563"/>
-          </a:xfrm>
-        </p:spPr>
+        <p:spPr/>
         <p:txBody>
           <a:bodyPr/>
           <a:lstStyle/>
           <a:p>
             <a:r>
               <a:rPr lang="en-US"/>
-              <a:t>Event Detection in Twitter: Examples</a:t>
-            </a:r>
-          </a:p>
-        </p:txBody>
-      </p:sp>
-      <p:pic>
-        <p:nvPicPr>
-          <p:cNvPr id="4" name="Picture 3">
+              <a:t>Open Research Issues</a:t>
+            </a:r>
+          </a:p>
+        </p:txBody>
+      </p:sp>
+      <p:sp>
+        <p:nvSpPr>
+          <p:cNvPr id="3" name="Content Placeholder 2">
             <a:extLst>
               <a:ext uri="{FF2B5EF4-FFF2-40B4-BE49-F238E27FC236}">
-                <a16:creationId xmlns="" xmlns:a16="http://schemas.microsoft.com/office/drawing/2014/main" id="{E261DDE0-9900-4A81-8319-30D1EC0E078F}"/>
+                <a16:creationId xmlns:a16="http://schemas.microsoft.com/office/drawing/2014/main" xmlns="" id="{F1CD4C0B-C44A-44A7-B3C4-2460C4A5D01B}"/>
               </a:ext>
             </a:extLst>
           </p:cNvPr>
-          <p:cNvPicPr>
-            <a:picLocks noChangeAspect="1"/>
-          </p:cNvPicPr>
-          <p:nvPr/>
-        </p:nvPicPr>
-        <p:blipFill>
-          <a:blip r:embed="rId2"/>
-          <a:stretch>
-            <a:fillRect/>
-          </a:stretch>
-        </p:blipFill>
-        <p:spPr>
-          <a:xfrm>
-            <a:off x="628649" y="1690689"/>
-            <a:ext cx="7631431" cy="1209861"/>
-          </a:xfrm>
-          <a:prstGeom prst="rect">
-            <a:avLst/>
-          </a:prstGeom>
-        </p:spPr>
-      </p:pic>
-      <p:sp>
-        <p:nvSpPr>
-          <p:cNvPr id="5" name="Rectangle 4">
-            <a:extLst>
-              <a:ext uri="{FF2B5EF4-FFF2-40B4-BE49-F238E27FC236}">
-                <a16:creationId xmlns="" xmlns:a16="http://schemas.microsoft.com/office/drawing/2014/main" id="{D5F8127B-3EAF-4D79-B961-9CDCF5DA2CA6}"/>
-              </a:ext>
-            </a:extLst>
-          </p:cNvPr>
-          <p:cNvSpPr/>
-          <p:nvPr/>
-        </p:nvSpPr>
-        <p:spPr>
-          <a:xfrm>
-            <a:off x="735330" y="3295596"/>
-            <a:ext cx="8012430" cy="1200329"/>
-          </a:xfrm>
-          <a:prstGeom prst="rect">
-            <a:avLst/>
-          </a:prstGeom>
-        </p:spPr>
-        <p:txBody>
-          <a:bodyPr wrap="square">
-            <a:spAutoFit/>
+          <p:cNvSpPr>
+            <a:spLocks noGrp="1"/>
+          </p:cNvSpPr>
+          <p:nvPr>
+            <p:ph idx="1"/>
+          </p:nvPr>
+        </p:nvSpPr>
+        <p:spPr/>
+        <p:txBody>
+          <a:bodyPr>
+            <a:normAutofit fontScale="92500" lnSpcReduction="10000"/>
           </a:bodyPr>
           <a:lstStyle/>
           <a:p>
             <a:r>
-              <a:rPr lang="en-US" sz="2400" dirty="0"/>
-              <a:t>RT @Stump4TrumpPAC: These are the 58 people killed in the Las Vegas massacre, the deadliest mass shooting in modern U.S. history.. 💐🙏🏻 http…</a:t>
-            </a:r>
-          </a:p>
-        </p:txBody>
-      </p:sp>
-      <p:sp>
-        <p:nvSpPr>
-          <p:cNvPr id="6" name="Rectangle 5">
-            <a:extLst>
-              <a:ext uri="{FF2B5EF4-FFF2-40B4-BE49-F238E27FC236}">
-                <a16:creationId xmlns="" xmlns:a16="http://schemas.microsoft.com/office/drawing/2014/main" id="{1B041536-BBFD-40FB-8C12-11420F37DDEA}"/>
-              </a:ext>
-            </a:extLst>
-          </p:cNvPr>
-          <p:cNvSpPr/>
-          <p:nvPr/>
-        </p:nvSpPr>
-        <p:spPr>
-          <a:xfrm>
-            <a:off x="735330" y="4819140"/>
-            <a:ext cx="8016239" cy="1200329"/>
-          </a:xfrm>
-          <a:prstGeom prst="rect">
-            <a:avLst/>
-          </a:prstGeom>
-        </p:spPr>
-        <p:txBody>
-          <a:bodyPr wrap="square">
-            <a:spAutoFit/>
-          </a:bodyPr>
-          <a:lstStyle/>
-          <a:p>
-            <a:r>
-              <a:rPr lang="en-US" sz="2400" dirty="0"/>
-              <a:t>RT @</a:t>
-            </a:r>
-            <a:r>
-              <a:rPr lang="en-US" sz="2400" dirty="0" err="1"/>
-              <a:t>dragoner_JP</a:t>
-            </a:r>
-            <a:r>
-              <a:rPr lang="en-US" sz="2400" dirty="0"/>
-              <a:t>: うげえ……「ラスベガス銃撃の(カナダ人)犠牲者が巨額の医療費に直面」→ Las Vegas shooting victims facing large medical bills https://</a:t>
-            </a:r>
-            <a:r>
-              <a:rPr lang="en-US" sz="2400" dirty="0" err="1"/>
-              <a:t>t.co</a:t>
-            </a:r>
-            <a:r>
-              <a:rPr lang="en-US" sz="2400" dirty="0"/>
-              <a:t>/1F3bgH17Jv</a:t>
+              <a:rPr lang="en-US"/>
+              <a:t>Context-based advantages of data-driven, knowledge-driven or hybrid approaches</a:t>
+            </a:r>
+          </a:p>
+          <a:p>
+            <a:r>
+              <a:rPr lang="en-US"/>
+              <a:t>Understanding the limitations of specific event extraction techniques</a:t>
+            </a:r>
+          </a:p>
+          <a:p>
+            <a:r>
+              <a:rPr lang="en-US"/>
+              <a:t>The domain-dependency of event extraction procedures, affecting both their flexibility and effectiveness</a:t>
+            </a:r>
+          </a:p>
+          <a:p>
+            <a:r>
+              <a:rPr lang="en-US"/>
+              <a:t>The scalability of event extraction approaches when dealing with Big Data</a:t>
+            </a:r>
+          </a:p>
+          <a:p>
+            <a:r>
+              <a:rPr lang="en-US"/>
+              <a:t>The complexity of extracted events</a:t>
+            </a:r>
+          </a:p>
+          <a:p>
+            <a:r>
+              <a:rPr lang="en-US">
+                <a:solidFill>
+                  <a:srgbClr val="7030A0"/>
+                </a:solidFill>
+              </a:rPr>
+              <a:t>Extraction from noisy sources like Twitter</a:t>
             </a:r>
           </a:p>
         </p:txBody>
@@ -6471,7 +6482,7 @@
     </p:spTree>
     <p:extLst>
       <p:ext uri="{BB962C8B-B14F-4D97-AF65-F5344CB8AC3E}">
-        <p14:creationId xmlns:p14="http://schemas.microsoft.com/office/powerpoint/2010/main" val="1556995143"/>
+        <p14:creationId xmlns:p14="http://schemas.microsoft.com/office/powerpoint/2010/main" val="874142107"/>
       </p:ext>
     </p:extLst>
   </p:cSld>

</xml_diff>

<commit_message>
minor changes to event extraction slides
</commit_message>
<xml_diff>
--- a/slides/pptx/5-event-extraction.pptx
+++ b/slides/pptx/5-event-extraction.pptx
@@ -5,22 +5,26 @@
     <p:sldMasterId id="2147483660" r:id="rId1"/>
   </p:sldMasterIdLst>
   <p:notesMasterIdLst>
-    <p:notesMasterId r:id="rId15"/>
+    <p:notesMasterId r:id="rId19"/>
   </p:notesMasterIdLst>
   <p:sldIdLst>
     <p:sldId id="332" r:id="rId2"/>
     <p:sldId id="333" r:id="rId3"/>
     <p:sldId id="334" r:id="rId4"/>
-    <p:sldId id="346" r:id="rId5"/>
-    <p:sldId id="340" r:id="rId6"/>
-    <p:sldId id="335" r:id="rId7"/>
-    <p:sldId id="336" r:id="rId8"/>
-    <p:sldId id="337" r:id="rId9"/>
-    <p:sldId id="341" r:id="rId10"/>
-    <p:sldId id="342" r:id="rId11"/>
-    <p:sldId id="343" r:id="rId12"/>
-    <p:sldId id="339" r:id="rId13"/>
-    <p:sldId id="345" r:id="rId14"/>
+    <p:sldId id="347" r:id="rId5"/>
+    <p:sldId id="348" r:id="rId6"/>
+    <p:sldId id="349" r:id="rId7"/>
+    <p:sldId id="346" r:id="rId8"/>
+    <p:sldId id="340" r:id="rId9"/>
+    <p:sldId id="335" r:id="rId10"/>
+    <p:sldId id="336" r:id="rId11"/>
+    <p:sldId id="337" r:id="rId12"/>
+    <p:sldId id="341" r:id="rId13"/>
+    <p:sldId id="342" r:id="rId14"/>
+    <p:sldId id="343" r:id="rId15"/>
+    <p:sldId id="339" r:id="rId16"/>
+    <p:sldId id="345" r:id="rId17"/>
+    <p:sldId id="350" r:id="rId18"/>
   </p:sldIdLst>
   <p:sldSz cx="9144000" cy="6858000" type="screen4x3"/>
   <p:notesSz cx="6858000" cy="9144000"/>
@@ -520,7 +524,10 @@
           <a:bodyPr/>
           <a:lstStyle/>
           <a:p>
-            <a:endParaRPr lang="en-US"/>
+            <a:r>
+              <a:rPr lang="en-US"/>
+              <a:t>We show </a:t>
+            </a:r>
           </a:p>
         </p:txBody>
       </p:sp>
@@ -542,6 +549,90 @@
             <a:fld id="{9D3E0FAC-92B7-4344-B8CE-D78B9752AB0B}" type="slidenum">
               <a:rPr lang="en-US" smtClean="0"/>
               <a:t>12</a:t>
+            </a:fld>
+            <a:endParaRPr lang="en-US"/>
+          </a:p>
+        </p:txBody>
+      </p:sp>
+    </p:spTree>
+    <p:extLst>
+      <p:ext uri="{BB962C8B-B14F-4D97-AF65-F5344CB8AC3E}">
+        <p14:creationId xmlns:p14="http://schemas.microsoft.com/office/powerpoint/2010/main" val="1540851223"/>
+      </p:ext>
+    </p:extLst>
+  </p:cSld>
+  <p:clrMapOvr>
+    <a:masterClrMapping/>
+  </p:clrMapOvr>
+</p:notes>
+</file>
+
+<file path=ppt/notesSlides/notesSlide2.xml><?xml version="1.0" encoding="utf-8"?>
+<p:notes xmlns:a="http://schemas.openxmlformats.org/drawingml/2006/main" xmlns:r="http://schemas.openxmlformats.org/officeDocument/2006/relationships" xmlns:p="http://schemas.openxmlformats.org/presentationml/2006/main">
+  <p:cSld>
+    <p:spTree>
+      <p:nvGrpSpPr>
+        <p:cNvPr id="1" name=""/>
+        <p:cNvGrpSpPr/>
+        <p:nvPr/>
+      </p:nvGrpSpPr>
+      <p:grpSpPr>
+        <a:xfrm>
+          <a:off x="0" y="0"/>
+          <a:ext cx="0" cy="0"/>
+          <a:chOff x="0" y="0"/>
+          <a:chExt cx="0" cy="0"/>
+        </a:xfrm>
+      </p:grpSpPr>
+      <p:sp>
+        <p:nvSpPr>
+          <p:cNvPr id="2" name="Slide Image Placeholder 1"/>
+          <p:cNvSpPr>
+            <a:spLocks noGrp="1" noRot="1" noChangeAspect="1"/>
+          </p:cNvSpPr>
+          <p:nvPr>
+            <p:ph type="sldImg"/>
+          </p:nvPr>
+        </p:nvSpPr>
+        <p:spPr/>
+      </p:sp>
+      <p:sp>
+        <p:nvSpPr>
+          <p:cNvPr id="3" name="Notes Placeholder 2"/>
+          <p:cNvSpPr>
+            <a:spLocks noGrp="1"/>
+          </p:cNvSpPr>
+          <p:nvPr>
+            <p:ph type="body" idx="1"/>
+          </p:nvPr>
+        </p:nvSpPr>
+        <p:spPr/>
+        <p:txBody>
+          <a:bodyPr/>
+          <a:lstStyle/>
+          <a:p>
+            <a:endParaRPr lang="en-US"/>
+          </a:p>
+        </p:txBody>
+      </p:sp>
+      <p:sp>
+        <p:nvSpPr>
+          <p:cNvPr id="4" name="Slide Number Placeholder 3"/>
+          <p:cNvSpPr>
+            <a:spLocks noGrp="1"/>
+          </p:cNvSpPr>
+          <p:nvPr>
+            <p:ph type="sldNum" sz="quarter" idx="10"/>
+          </p:nvPr>
+        </p:nvSpPr>
+        <p:spPr/>
+        <p:txBody>
+          <a:bodyPr/>
+          <a:lstStyle/>
+          <a:p>
+            <a:fld id="{9D3E0FAC-92B7-4344-B8CE-D78B9752AB0B}" type="slidenum">
+              <a:rPr lang="en-US" smtClean="0"/>
+              <a:t>15</a:t>
             </a:fld>
             <a:endParaRPr lang="en-US"/>
           </a:p>
@@ -4389,7 +4480,7 @@
           <p:cNvPr id="2" name="Title 1">
             <a:extLst>
               <a:ext uri="{FF2B5EF4-FFF2-40B4-BE49-F238E27FC236}">
-                <a16:creationId xmlns="" xmlns:a16="http://schemas.microsoft.com/office/drawing/2014/main" id="{F5EA10E8-179C-48CA-A962-83AC7A417653}"/>
+                <a16:creationId xmlns:a16="http://schemas.microsoft.com/office/drawing/2014/main" xmlns="" id="{B4CF79A2-9503-4AD1-9E75-1E1A5C90BD69}"/>
               </a:ext>
             </a:extLst>
           </p:cNvPr>
@@ -4407,17 +4498,17 @@
           <a:p>
             <a:r>
               <a:rPr lang="en-US"/>
-              <a:t>Detection Techniques and Feature Representation</a:t>
+              <a:t>A Second Workflow</a:t>
             </a:r>
           </a:p>
         </p:txBody>
       </p:sp>
       <p:pic>
         <p:nvPicPr>
-          <p:cNvPr id="4" name="Picture 3">
+          <p:cNvPr id="5" name="Picture 4">
             <a:extLst>
               <a:ext uri="{FF2B5EF4-FFF2-40B4-BE49-F238E27FC236}">
-                <a16:creationId xmlns="" xmlns:a16="http://schemas.microsoft.com/office/drawing/2014/main" id="{3B9B8793-346A-43E4-A56F-D565544760F6}"/>
+                <a16:creationId xmlns:a16="http://schemas.microsoft.com/office/drawing/2014/main" xmlns="" id="{0FC4BCA5-E0C5-4BB0-88EE-29E619BEB388}"/>
               </a:ext>
             </a:extLst>
           </p:cNvPr>
@@ -4434,8 +4525,8 @@
         </p:blipFill>
         <p:spPr>
           <a:xfrm>
-            <a:off x="0" y="1690689"/>
-            <a:ext cx="9144000" cy="4606925"/>
+            <a:off x="493184" y="1580623"/>
+            <a:ext cx="7547943" cy="4735511"/>
           </a:xfrm>
           <a:prstGeom prst="rect">
             <a:avLst/>
@@ -4445,7 +4536,7 @@
     </p:spTree>
     <p:extLst>
       <p:ext uri="{BB962C8B-B14F-4D97-AF65-F5344CB8AC3E}">
-        <p14:creationId xmlns:p14="http://schemas.microsoft.com/office/powerpoint/2010/main" val="3240889219"/>
+        <p14:creationId xmlns:p14="http://schemas.microsoft.com/office/powerpoint/2010/main" val="3673727299"/>
       </p:ext>
     </p:extLst>
   </p:cSld>
@@ -4484,7 +4575,7 @@
           <p:cNvPr id="2" name="Title 1">
             <a:extLst>
               <a:ext uri="{FF2B5EF4-FFF2-40B4-BE49-F238E27FC236}">
-                <a16:creationId xmlns="" xmlns:a16="http://schemas.microsoft.com/office/drawing/2014/main" id="{F5EA10E8-179C-48CA-A962-83AC7A417653}"/>
+                <a16:creationId xmlns:a16="http://schemas.microsoft.com/office/drawing/2014/main" xmlns="" id="{D6B083CC-4209-47D3-8AFB-A755190E41BB}"/>
               </a:ext>
             </a:extLst>
           </p:cNvPr>
@@ -4502,102 +4593,7 @@
           <a:p>
             <a:r>
               <a:rPr lang="en-US"/>
-              <a:t>Cont’d</a:t>
-            </a:r>
-          </a:p>
-        </p:txBody>
-      </p:sp>
-      <p:pic>
-        <p:nvPicPr>
-          <p:cNvPr id="3" name="Picture 2">
-            <a:extLst>
-              <a:ext uri="{FF2B5EF4-FFF2-40B4-BE49-F238E27FC236}">
-                <a16:creationId xmlns="" xmlns:a16="http://schemas.microsoft.com/office/drawing/2014/main" id="{47C8D744-821F-442B-8D37-F20DB15467EA}"/>
-              </a:ext>
-            </a:extLst>
-          </p:cNvPr>
-          <p:cNvPicPr>
-            <a:picLocks noChangeAspect="1"/>
-          </p:cNvPicPr>
-          <p:nvPr/>
-        </p:nvPicPr>
-        <p:blipFill>
-          <a:blip r:embed="rId2"/>
-          <a:stretch>
-            <a:fillRect/>
-          </a:stretch>
-        </p:blipFill>
-        <p:spPr>
-          <a:xfrm>
-            <a:off x="128587" y="1868489"/>
-            <a:ext cx="8591932" cy="3503611"/>
-          </a:xfrm>
-          <a:prstGeom prst="rect">
-            <a:avLst/>
-          </a:prstGeom>
-        </p:spPr>
-      </p:pic>
-    </p:spTree>
-    <p:extLst>
-      <p:ext uri="{BB962C8B-B14F-4D97-AF65-F5344CB8AC3E}">
-        <p14:creationId xmlns:p14="http://schemas.microsoft.com/office/powerpoint/2010/main" val="3279014792"/>
-      </p:ext>
-    </p:extLst>
-  </p:cSld>
-  <p:clrMapOvr>
-    <a:masterClrMapping/>
-  </p:clrMapOvr>
-  <p:timing>
-    <p:tnLst>
-      <p:par>
-        <p:cTn id="1" dur="indefinite" restart="never" nodeType="tmRoot"/>
-      </p:par>
-    </p:tnLst>
-  </p:timing>
-</p:sld>
-</file>
-
-<file path=ppt/slides/slide12.xml><?xml version="1.0" encoding="utf-8"?>
-<p:sld xmlns:a="http://schemas.openxmlformats.org/drawingml/2006/main" xmlns:r="http://schemas.openxmlformats.org/officeDocument/2006/relationships" xmlns:p="http://schemas.openxmlformats.org/presentationml/2006/main">
-  <p:cSld>
-    <p:spTree>
-      <p:nvGrpSpPr>
-        <p:cNvPr id="1" name=""/>
-        <p:cNvGrpSpPr/>
-        <p:nvPr/>
-      </p:nvGrpSpPr>
-      <p:grpSpPr>
-        <a:xfrm>
-          <a:off x="0" y="0"/>
-          <a:ext cx="0" cy="0"/>
-          <a:chOff x="0" y="0"/>
-          <a:chExt cx="0" cy="0"/>
-        </a:xfrm>
-      </p:grpSpPr>
-      <p:sp>
-        <p:nvSpPr>
-          <p:cNvPr id="2" name="Title 1">
-            <a:extLst>
-              <a:ext uri="{FF2B5EF4-FFF2-40B4-BE49-F238E27FC236}">
-                <a16:creationId xmlns="" xmlns:a16="http://schemas.microsoft.com/office/drawing/2014/main" id="{8537C631-3420-40A0-B136-850967FD898E}"/>
-              </a:ext>
-            </a:extLst>
-          </p:cNvPr>
-          <p:cNvSpPr>
-            <a:spLocks noGrp="1"/>
-          </p:cNvSpPr>
-          <p:nvPr>
-            <p:ph type="title"/>
-          </p:nvPr>
-        </p:nvSpPr>
-        <p:spPr/>
-        <p:txBody>
-          <a:bodyPr/>
-          <a:lstStyle/>
-          <a:p>
-            <a:r>
-              <a:rPr lang="en-US"/>
-              <a:t>Open Research Issues</a:t>
+              <a:t>Classification of Techniques</a:t>
             </a:r>
           </a:p>
         </p:txBody>
@@ -4607,1230 +4603,7 @@
           <p:cNvPr id="3" name="Content Placeholder 2">
             <a:extLst>
               <a:ext uri="{FF2B5EF4-FFF2-40B4-BE49-F238E27FC236}">
-                <a16:creationId xmlns="" xmlns:a16="http://schemas.microsoft.com/office/drawing/2014/main" id="{F1CD4C0B-C44A-44A7-B3C4-2460C4A5D01B}"/>
-              </a:ext>
-            </a:extLst>
-          </p:cNvPr>
-          <p:cNvSpPr>
-            <a:spLocks noGrp="1"/>
-          </p:cNvSpPr>
-          <p:nvPr>
-            <p:ph idx="1"/>
-          </p:nvPr>
-        </p:nvSpPr>
-        <p:spPr>
-          <a:xfrm>
-            <a:off x="628649" y="1825625"/>
-            <a:ext cx="8388351" cy="4736042"/>
-          </a:xfrm>
-        </p:spPr>
-        <p:txBody>
-          <a:bodyPr>
-            <a:normAutofit fontScale="92500"/>
-          </a:bodyPr>
-          <a:lstStyle/>
-          <a:p>
-            <a:r>
-              <a:rPr lang="en-US"/>
-              <a:t>Context-based advantages of data-driven, knowledge-driven or hybrid approaches</a:t>
-            </a:r>
-          </a:p>
-          <a:p>
-            <a:r>
-              <a:rPr lang="en-US"/>
-              <a:t>Understanding the limitations of specific event extraction techniques</a:t>
-            </a:r>
-          </a:p>
-          <a:p>
-            <a:r>
-              <a:rPr lang="en-US"/>
-              <a:t>The domain-dependency of event extraction procedures, affecting both their flexibility and effectiveness</a:t>
-            </a:r>
-          </a:p>
-          <a:p>
-            <a:r>
-              <a:rPr lang="en-US"/>
-              <a:t>The scalability of event extraction approaches when dealing with Big Data</a:t>
-            </a:r>
-          </a:p>
-          <a:p>
-            <a:r>
-              <a:rPr lang="en-US"/>
-              <a:t>The complexity of extracted events</a:t>
-            </a:r>
-          </a:p>
-          <a:p>
-            <a:r>
-              <a:rPr lang="en-US"/>
-              <a:t>Better extraction from noisy sources, including social media</a:t>
-            </a:r>
-          </a:p>
-        </p:txBody>
-      </p:sp>
-    </p:spTree>
-    <p:extLst>
-      <p:ext uri="{BB962C8B-B14F-4D97-AF65-F5344CB8AC3E}">
-        <p14:creationId xmlns:p14="http://schemas.microsoft.com/office/powerpoint/2010/main" val="874142107"/>
-      </p:ext>
-    </p:extLst>
-  </p:cSld>
-  <p:clrMapOvr>
-    <a:masterClrMapping/>
-  </p:clrMapOvr>
-  <p:timing>
-    <p:tnLst>
-      <p:par>
-        <p:cTn id="1" dur="indefinite" restart="never" nodeType="tmRoot"/>
-      </p:par>
-    </p:tnLst>
-  </p:timing>
-</p:sld>
-</file>
-
-<file path=ppt/slides/slide13.xml><?xml version="1.0" encoding="utf-8"?>
-<p:sld xmlns:a="http://schemas.openxmlformats.org/drawingml/2006/main" xmlns:r="http://schemas.openxmlformats.org/officeDocument/2006/relationships" xmlns:p="http://schemas.openxmlformats.org/presentationml/2006/main">
-  <p:cSld>
-    <p:spTree>
-      <p:nvGrpSpPr>
-        <p:cNvPr id="1" name=""/>
-        <p:cNvGrpSpPr/>
-        <p:nvPr/>
-      </p:nvGrpSpPr>
-      <p:grpSpPr>
-        <a:xfrm>
-          <a:off x="0" y="0"/>
-          <a:ext cx="0" cy="0"/>
-          <a:chOff x="0" y="0"/>
-          <a:chExt cx="0" cy="0"/>
-        </a:xfrm>
-      </p:grpSpPr>
-      <p:sp>
-        <p:nvSpPr>
-          <p:cNvPr id="2" name="Title 1">
-            <a:extLst>
-              <a:ext uri="{FF2B5EF4-FFF2-40B4-BE49-F238E27FC236}">
-                <a16:creationId xmlns="" xmlns:a16="http://schemas.microsoft.com/office/drawing/2014/main" id="{E1C3A720-E34E-4BB6-B515-B3C2EF039BC8}"/>
-              </a:ext>
-            </a:extLst>
-          </p:cNvPr>
-          <p:cNvSpPr>
-            <a:spLocks noGrp="1"/>
-          </p:cNvSpPr>
-          <p:nvPr>
-            <p:ph type="title"/>
-          </p:nvPr>
-        </p:nvSpPr>
-        <p:spPr/>
-        <p:txBody>
-          <a:bodyPr/>
-          <a:lstStyle/>
-          <a:p>
-            <a:r>
-              <a:rPr lang="en-US"/>
-              <a:t>Open Research Issues</a:t>
-            </a:r>
-          </a:p>
-        </p:txBody>
-      </p:sp>
-      <p:sp>
-        <p:nvSpPr>
-          <p:cNvPr id="3" name="Content Placeholder 2">
-            <a:extLst>
-              <a:ext uri="{FF2B5EF4-FFF2-40B4-BE49-F238E27FC236}">
-                <a16:creationId xmlns="" xmlns:a16="http://schemas.microsoft.com/office/drawing/2014/main" id="{D16B1CA5-8025-464F-80E9-9942274912F8}"/>
-              </a:ext>
-            </a:extLst>
-          </p:cNvPr>
-          <p:cNvSpPr>
-            <a:spLocks noGrp="1"/>
-          </p:cNvSpPr>
-          <p:nvPr>
-            <p:ph idx="1"/>
-          </p:nvPr>
-        </p:nvSpPr>
-        <p:spPr/>
-        <p:txBody>
-          <a:bodyPr/>
-          <a:lstStyle/>
-          <a:p>
-            <a:r>
-              <a:rPr lang="en-US"/>
-              <a:t>More accurate filtering</a:t>
-            </a:r>
-          </a:p>
-          <a:p>
-            <a:r>
-              <a:rPr lang="en-US"/>
-              <a:t>Improved techniques to combine and analyze information from multiple sources and languages</a:t>
-            </a:r>
-          </a:p>
-          <a:p>
-            <a:r>
-              <a:rPr lang="en-US"/>
-              <a:t>Enhanced summarization and visualization</a:t>
-            </a:r>
-          </a:p>
-          <a:p>
-            <a:r>
-              <a:rPr lang="en-US"/>
-              <a:t>Non-static and non-stationarity assumptions</a:t>
-            </a:r>
-          </a:p>
-          <a:p>
-            <a:r>
-              <a:rPr lang="en-US"/>
-              <a:t>More principled and robust evaluations</a:t>
-            </a:r>
-          </a:p>
-        </p:txBody>
-      </p:sp>
-    </p:spTree>
-    <p:extLst>
-      <p:ext uri="{BB962C8B-B14F-4D97-AF65-F5344CB8AC3E}">
-        <p14:creationId xmlns:p14="http://schemas.microsoft.com/office/powerpoint/2010/main" val="3569979996"/>
-      </p:ext>
-    </p:extLst>
-  </p:cSld>
-  <p:clrMapOvr>
-    <a:masterClrMapping/>
-  </p:clrMapOvr>
-  <p:timing>
-    <p:tnLst>
-      <p:par>
-        <p:cTn id="1" dur="indefinite" restart="never" nodeType="tmRoot"/>
-      </p:par>
-    </p:tnLst>
-  </p:timing>
-</p:sld>
-</file>
-
-<file path=ppt/slides/slide2.xml><?xml version="1.0" encoding="utf-8"?>
-<p:sld xmlns:a="http://schemas.openxmlformats.org/drawingml/2006/main" xmlns:r="http://schemas.openxmlformats.org/officeDocument/2006/relationships" xmlns:p="http://schemas.openxmlformats.org/presentationml/2006/main">
-  <p:cSld>
-    <p:spTree>
-      <p:nvGrpSpPr>
-        <p:cNvPr id="1" name=""/>
-        <p:cNvGrpSpPr/>
-        <p:nvPr/>
-      </p:nvGrpSpPr>
-      <p:grpSpPr>
-        <a:xfrm>
-          <a:off x="0" y="0"/>
-          <a:ext cx="0" cy="0"/>
-          <a:chOff x="0" y="0"/>
-          <a:chExt cx="0" cy="0"/>
-        </a:xfrm>
-      </p:grpSpPr>
-      <p:sp>
-        <p:nvSpPr>
-          <p:cNvPr id="2" name="Title 1">
-            <a:extLst>
-              <a:ext uri="{FF2B5EF4-FFF2-40B4-BE49-F238E27FC236}">
-                <a16:creationId xmlns="" xmlns:a16="http://schemas.microsoft.com/office/drawing/2014/main" id="{47E09107-4194-4BB3-9118-E9B9EDF2C558}"/>
-              </a:ext>
-            </a:extLst>
-          </p:cNvPr>
-          <p:cNvSpPr>
-            <a:spLocks noGrp="1"/>
-          </p:cNvSpPr>
-          <p:nvPr>
-            <p:ph type="title"/>
-          </p:nvPr>
-        </p:nvSpPr>
-        <p:spPr/>
-        <p:txBody>
-          <a:bodyPr/>
-          <a:lstStyle/>
-          <a:p>
-            <a:r>
-              <a:rPr lang="en-US"/>
-              <a:t>Simple Motivating Example</a:t>
-            </a:r>
-          </a:p>
-        </p:txBody>
-      </p:sp>
-      <p:pic>
-        <p:nvPicPr>
-          <p:cNvPr id="4" name="Picture 3">
-            <a:extLst>
-              <a:ext uri="{FF2B5EF4-FFF2-40B4-BE49-F238E27FC236}">
-                <a16:creationId xmlns="" xmlns:a16="http://schemas.microsoft.com/office/drawing/2014/main" id="{A2CCD1F4-74E1-4EA7-93C2-50DD90CBF94E}"/>
-              </a:ext>
-            </a:extLst>
-          </p:cNvPr>
-          <p:cNvPicPr>
-            <a:picLocks noChangeAspect="1"/>
-          </p:cNvPicPr>
-          <p:nvPr/>
-        </p:nvPicPr>
-        <p:blipFill>
-          <a:blip r:embed="rId2"/>
-          <a:stretch>
-            <a:fillRect/>
-          </a:stretch>
-        </p:blipFill>
-        <p:spPr>
-          <a:xfrm>
-            <a:off x="1534736" y="2431522"/>
-            <a:ext cx="5805864" cy="2712500"/>
-          </a:xfrm>
-          <a:prstGeom prst="rect">
-            <a:avLst/>
-          </a:prstGeom>
-        </p:spPr>
-      </p:pic>
-    </p:spTree>
-    <p:extLst>
-      <p:ext uri="{BB962C8B-B14F-4D97-AF65-F5344CB8AC3E}">
-        <p14:creationId xmlns:p14="http://schemas.microsoft.com/office/powerpoint/2010/main" val="101288211"/>
-      </p:ext>
-    </p:extLst>
-  </p:cSld>
-  <p:clrMapOvr>
-    <a:masterClrMapping/>
-  </p:clrMapOvr>
-  <p:timing>
-    <p:tnLst>
-      <p:par>
-        <p:cTn id="1" dur="indefinite" restart="never" nodeType="tmRoot"/>
-      </p:par>
-    </p:tnLst>
-  </p:timing>
-</p:sld>
-</file>
-
-<file path=ppt/slides/slide3.xml><?xml version="1.0" encoding="utf-8"?>
-<p:sld xmlns:a="http://schemas.openxmlformats.org/drawingml/2006/main" xmlns:r="http://schemas.openxmlformats.org/officeDocument/2006/relationships" xmlns:p="http://schemas.openxmlformats.org/presentationml/2006/main">
-  <p:cSld>
-    <p:spTree>
-      <p:nvGrpSpPr>
-        <p:cNvPr id="1" name=""/>
-        <p:cNvGrpSpPr/>
-        <p:nvPr/>
-      </p:nvGrpSpPr>
-      <p:grpSpPr>
-        <a:xfrm>
-          <a:off x="0" y="0"/>
-          <a:ext cx="0" cy="0"/>
-          <a:chOff x="0" y="0"/>
-          <a:chExt cx="0" cy="0"/>
-        </a:xfrm>
-      </p:grpSpPr>
-      <p:sp>
-        <p:nvSpPr>
-          <p:cNvPr id="2" name="Title 1"/>
-          <p:cNvSpPr>
-            <a:spLocks noGrp="1"/>
-          </p:cNvSpPr>
-          <p:nvPr>
-            <p:ph type="title"/>
-          </p:nvPr>
-        </p:nvSpPr>
-        <p:spPr>
-          <a:xfrm>
-            <a:off x="400050" y="365126"/>
-            <a:ext cx="8515350" cy="1325563"/>
-          </a:xfrm>
-        </p:spPr>
-        <p:txBody>
-          <a:bodyPr/>
-          <a:lstStyle/>
-          <a:p>
-            <a:r>
-              <a:rPr lang="en-US"/>
-              <a:t>(More Complex) Motivating Example</a:t>
-            </a:r>
-            <a:endParaRPr lang="en-US" dirty="0"/>
-          </a:p>
-        </p:txBody>
-      </p:sp>
-      <p:pic>
-        <p:nvPicPr>
-          <p:cNvPr id="4" name="Content Placeholder 3"/>
-          <p:cNvPicPr>
-            <a:picLocks noGrp="1" noChangeAspect="1"/>
-          </p:cNvPicPr>
-          <p:nvPr>
-            <p:ph idx="1"/>
-          </p:nvPr>
-        </p:nvPicPr>
-        <p:blipFill>
-          <a:blip r:embed="rId2">
-            <a:extLst>
-              <a:ext uri="{28A0092B-C50C-407E-A947-70E740481C1C}">
-                <a14:useLocalDpi xmlns:a14="http://schemas.microsoft.com/office/drawing/2010/main" val="0"/>
-              </a:ext>
-            </a:extLst>
-          </a:blip>
-          <a:stretch>
-            <a:fillRect/>
-          </a:stretch>
-        </p:blipFill>
-        <p:spPr>
-          <a:xfrm>
-            <a:off x="805383" y="3266958"/>
-            <a:ext cx="5064078" cy="1642404"/>
-          </a:xfrm>
-        </p:spPr>
-      </p:pic>
-      <p:cxnSp>
-        <p:nvCxnSpPr>
-          <p:cNvPr id="5" name="Straight Arrow Connector 4">
-            <a:extLst>
-              <a:ext uri="{FF2B5EF4-FFF2-40B4-BE49-F238E27FC236}">
-                <a16:creationId xmlns="" xmlns:a16="http://schemas.microsoft.com/office/drawing/2014/main" id="{F462F756-659C-4710-82DE-942B1B17E5B8}"/>
-              </a:ext>
-            </a:extLst>
-          </p:cNvPr>
-          <p:cNvCxnSpPr>
-            <a:cxnSpLocks/>
-            <a:stCxn id="9" idx="1"/>
-          </p:cNvCxnSpPr>
-          <p:nvPr/>
-        </p:nvCxnSpPr>
-        <p:spPr>
-          <a:xfrm flipH="1">
-            <a:off x="3214037" y="2880640"/>
-            <a:ext cx="3227858" cy="749274"/>
-          </a:xfrm>
-          <a:prstGeom prst="straightConnector1">
-            <a:avLst/>
-          </a:prstGeom>
-          <a:ln w="28575">
-            <a:tailEnd type="triangle"/>
-          </a:ln>
-        </p:spPr>
-        <p:style>
-          <a:lnRef idx="1">
-            <a:schemeClr val="accent1"/>
-          </a:lnRef>
-          <a:fillRef idx="0">
-            <a:schemeClr val="accent1"/>
-          </a:fillRef>
-          <a:effectRef idx="0">
-            <a:schemeClr val="accent1"/>
-          </a:effectRef>
-          <a:fontRef idx="minor">
-            <a:schemeClr val="tx1"/>
-          </a:fontRef>
-        </p:style>
-      </p:cxnSp>
-      <p:cxnSp>
-        <p:nvCxnSpPr>
-          <p:cNvPr id="6" name="Straight Arrow Connector 5">
-            <a:extLst>
-              <a:ext uri="{FF2B5EF4-FFF2-40B4-BE49-F238E27FC236}">
-                <a16:creationId xmlns="" xmlns:a16="http://schemas.microsoft.com/office/drawing/2014/main" id="{2EB44B3D-A1BD-41F6-A459-EE6FE6AAF2B4}"/>
-              </a:ext>
-            </a:extLst>
-          </p:cNvPr>
-          <p:cNvCxnSpPr>
-            <a:cxnSpLocks/>
-            <a:stCxn id="10" idx="1"/>
-          </p:cNvCxnSpPr>
-          <p:nvPr/>
-        </p:nvCxnSpPr>
-        <p:spPr>
-          <a:xfrm flipH="1" flipV="1">
-            <a:off x="3821919" y="4720103"/>
-            <a:ext cx="2376960" cy="447418"/>
-          </a:xfrm>
-          <a:prstGeom prst="straightConnector1">
-            <a:avLst/>
-          </a:prstGeom>
-          <a:ln>
-            <a:tailEnd type="triangle"/>
-          </a:ln>
-        </p:spPr>
-        <p:style>
-          <a:lnRef idx="1">
-            <a:schemeClr val="accent1"/>
-          </a:lnRef>
-          <a:fillRef idx="0">
-            <a:schemeClr val="accent1"/>
-          </a:fillRef>
-          <a:effectRef idx="0">
-            <a:schemeClr val="accent1"/>
-          </a:effectRef>
-          <a:fontRef idx="minor">
-            <a:schemeClr val="tx1"/>
-          </a:fontRef>
-        </p:style>
-      </p:cxnSp>
-      <p:sp>
-        <p:nvSpPr>
-          <p:cNvPr id="9" name="TextBox 8">
-            <a:extLst>
-              <a:ext uri="{FF2B5EF4-FFF2-40B4-BE49-F238E27FC236}">
-                <a16:creationId xmlns="" xmlns:a16="http://schemas.microsoft.com/office/drawing/2014/main" id="{4BC24041-891F-4770-8AA2-5EE9E1E12059}"/>
-              </a:ext>
-            </a:extLst>
-          </p:cNvPr>
-          <p:cNvSpPr txBox="1"/>
-          <p:nvPr/>
-        </p:nvSpPr>
-        <p:spPr>
-          <a:xfrm>
-            <a:off x="6441895" y="2649807"/>
-            <a:ext cx="2043829" cy="461665"/>
-          </a:xfrm>
-          <a:prstGeom prst="rect">
-            <a:avLst/>
-          </a:prstGeom>
-          <a:noFill/>
-        </p:spPr>
-        <p:txBody>
-          <a:bodyPr wrap="none" rtlCol="0">
-            <a:spAutoFit/>
-          </a:bodyPr>
-          <a:lstStyle/>
-          <a:p>
-            <a:r>
-              <a:rPr lang="en-US" sz="2400"/>
-              <a:t>Event 1 anchor</a:t>
-            </a:r>
-          </a:p>
-        </p:txBody>
-      </p:sp>
-      <p:sp>
-        <p:nvSpPr>
-          <p:cNvPr id="10" name="TextBox 9">
-            <a:extLst>
-              <a:ext uri="{FF2B5EF4-FFF2-40B4-BE49-F238E27FC236}">
-                <a16:creationId xmlns="" xmlns:a16="http://schemas.microsoft.com/office/drawing/2014/main" id="{A4884E0B-0E26-42F8-A8BC-8ABAE815804F}"/>
-              </a:ext>
-            </a:extLst>
-          </p:cNvPr>
-          <p:cNvSpPr txBox="1"/>
-          <p:nvPr/>
-        </p:nvSpPr>
-        <p:spPr>
-          <a:xfrm>
-            <a:off x="6198879" y="4936688"/>
-            <a:ext cx="2043829" cy="461665"/>
-          </a:xfrm>
-          <a:prstGeom prst="rect">
-            <a:avLst/>
-          </a:prstGeom>
-          <a:noFill/>
-        </p:spPr>
-        <p:txBody>
-          <a:bodyPr wrap="none" rtlCol="0">
-            <a:spAutoFit/>
-          </a:bodyPr>
-          <a:lstStyle/>
-          <a:p>
-            <a:r>
-              <a:rPr lang="en-US" sz="2400"/>
-              <a:t>Event 2 anchor</a:t>
-            </a:r>
-          </a:p>
-        </p:txBody>
-      </p:sp>
-      <p:sp>
-        <p:nvSpPr>
-          <p:cNvPr id="11" name="TextBox 10">
-            <a:extLst>
-              <a:ext uri="{FF2B5EF4-FFF2-40B4-BE49-F238E27FC236}">
-                <a16:creationId xmlns="" xmlns:a16="http://schemas.microsoft.com/office/drawing/2014/main" id="{DECCFEC6-9813-4E58-B12C-F055AF0312C0}"/>
-              </a:ext>
-            </a:extLst>
-          </p:cNvPr>
-          <p:cNvSpPr txBox="1"/>
-          <p:nvPr/>
-        </p:nvSpPr>
-        <p:spPr>
-          <a:xfrm>
-            <a:off x="1460501" y="5766088"/>
-            <a:ext cx="6162713" cy="584775"/>
-          </a:xfrm>
-          <a:prstGeom prst="rect">
-            <a:avLst/>
-          </a:prstGeom>
-          <a:noFill/>
-        </p:spPr>
-        <p:txBody>
-          <a:bodyPr wrap="none" rtlCol="0">
-            <a:spAutoFit/>
-          </a:bodyPr>
-          <a:lstStyle/>
-          <a:p>
-            <a:r>
-              <a:rPr lang="en-US" sz="3200"/>
-              <a:t>Event 1 provides </a:t>
-            </a:r>
-            <a:r>
-              <a:rPr lang="en-US" sz="3200" b="1"/>
-              <a:t>context</a:t>
-            </a:r>
-            <a:r>
-              <a:rPr lang="en-US" sz="3200"/>
-              <a:t> for Event 2</a:t>
-            </a:r>
-          </a:p>
-        </p:txBody>
-      </p:sp>
-      <p:sp>
-        <p:nvSpPr>
-          <p:cNvPr id="15" name="TextBox 14">
-            <a:extLst>
-              <a:ext uri="{FF2B5EF4-FFF2-40B4-BE49-F238E27FC236}">
-                <a16:creationId xmlns="" xmlns:a16="http://schemas.microsoft.com/office/drawing/2014/main" id="{63849605-0246-411E-A2F1-308CC50FEB7C}"/>
-              </a:ext>
-            </a:extLst>
-          </p:cNvPr>
-          <p:cNvSpPr txBox="1"/>
-          <p:nvPr/>
-        </p:nvSpPr>
-        <p:spPr>
-          <a:xfrm>
-            <a:off x="1527215" y="2055362"/>
-            <a:ext cx="6220549" cy="461665"/>
-          </a:xfrm>
-          <a:prstGeom prst="rect">
-            <a:avLst/>
-          </a:prstGeom>
-          <a:noFill/>
-        </p:spPr>
-        <p:txBody>
-          <a:bodyPr wrap="none" rtlCol="0">
-            <a:spAutoFit/>
-          </a:bodyPr>
-          <a:lstStyle/>
-          <a:p>
-            <a:r>
-              <a:rPr lang="en-US" sz="2400" i="1"/>
-              <a:t>&lt;Entities and spatio-temporal info are italicized&gt;</a:t>
-            </a:r>
-          </a:p>
-        </p:txBody>
-      </p:sp>
-    </p:spTree>
-    <p:extLst>
-      <p:ext uri="{BB962C8B-B14F-4D97-AF65-F5344CB8AC3E}">
-        <p14:creationId xmlns:p14="http://schemas.microsoft.com/office/powerpoint/2010/main" val="628255729"/>
-      </p:ext>
-    </p:extLst>
-  </p:cSld>
-  <p:clrMapOvr>
-    <a:masterClrMapping/>
-  </p:clrMapOvr>
-  <p:timing>
-    <p:tnLst>
-      <p:par>
-        <p:cTn id="1" dur="indefinite" restart="never" nodeType="tmRoot"/>
-      </p:par>
-    </p:tnLst>
-  </p:timing>
-</p:sld>
-</file>
-
-<file path=ppt/slides/slide4.xml><?xml version="1.0" encoding="utf-8"?>
-<p:sld xmlns:a="http://schemas.openxmlformats.org/drawingml/2006/main" xmlns:r="http://schemas.openxmlformats.org/officeDocument/2006/relationships" xmlns:p="http://schemas.openxmlformats.org/presentationml/2006/main">
-  <p:cSld>
-    <p:spTree>
-      <p:nvGrpSpPr>
-        <p:cNvPr id="1" name=""/>
-        <p:cNvGrpSpPr/>
-        <p:nvPr/>
-      </p:nvGrpSpPr>
-      <p:grpSpPr>
-        <a:xfrm>
-          <a:off x="0" y="0"/>
-          <a:ext cx="0" cy="0"/>
-          <a:chOff x="0" y="0"/>
-          <a:chExt cx="0" cy="0"/>
-        </a:xfrm>
-      </p:grpSpPr>
-      <p:sp>
-        <p:nvSpPr>
-          <p:cNvPr id="2" name="Title 1"/>
-          <p:cNvSpPr>
-            <a:spLocks noGrp="1"/>
-          </p:cNvSpPr>
-          <p:nvPr>
-            <p:ph type="title"/>
-          </p:nvPr>
-        </p:nvSpPr>
-        <p:spPr/>
-        <p:txBody>
-          <a:bodyPr/>
-          <a:lstStyle/>
-          <a:p>
-            <a:r>
-              <a:rPr lang="en-US"/>
-              <a:t>In Social Media</a:t>
-            </a:r>
-            <a:r>
-              <a:rPr lang="mr-IN"/>
-              <a:t>…</a:t>
-            </a:r>
-            <a:endParaRPr lang="en-US"/>
-          </a:p>
-        </p:txBody>
-      </p:sp>
-      <p:sp>
-        <p:nvSpPr>
-          <p:cNvPr id="3" name="Content Placeholder 2"/>
-          <p:cNvSpPr>
-            <a:spLocks noGrp="1"/>
-          </p:cNvSpPr>
-          <p:nvPr>
-            <p:ph idx="1"/>
-          </p:nvPr>
-        </p:nvSpPr>
-        <p:spPr/>
-        <p:txBody>
-          <a:bodyPr/>
-          <a:lstStyle/>
-          <a:p>
-            <a:r>
-              <a:rPr lang="en-US"/>
-              <a:t>Additional problem of first </a:t>
-            </a:r>
-            <a:r>
-              <a:rPr lang="en-US" b="1"/>
-              <a:t>detecting</a:t>
-            </a:r>
-            <a:r>
-              <a:rPr lang="en-US"/>
-              <a:t> whether the tweet is describing an event</a:t>
-            </a:r>
-          </a:p>
-          <a:p>
-            <a:r>
-              <a:rPr lang="en-US"/>
-              <a:t>Short text of tweet makes this essential for performance</a:t>
-            </a:r>
-          </a:p>
-          <a:p>
-            <a:r>
-              <a:rPr lang="en-US"/>
-              <a:t>Detection and extraction complement each other</a:t>
-            </a:r>
-          </a:p>
-          <a:p>
-            <a:pPr lvl="1"/>
-            <a:r>
-              <a:rPr lang="en-US"/>
-              <a:t>Forces us to decide what an event really is, for the purposes of extraction/detection/inference</a:t>
-            </a:r>
-          </a:p>
-        </p:txBody>
-      </p:sp>
-    </p:spTree>
-    <p:extLst>
-      <p:ext uri="{BB962C8B-B14F-4D97-AF65-F5344CB8AC3E}">
-        <p14:creationId xmlns:p14="http://schemas.microsoft.com/office/powerpoint/2010/main" val="260022398"/>
-      </p:ext>
-    </p:extLst>
-  </p:cSld>
-  <p:clrMapOvr>
-    <a:masterClrMapping/>
-  </p:clrMapOvr>
-</p:sld>
-</file>
-
-<file path=ppt/slides/slide5.xml><?xml version="1.0" encoding="utf-8"?>
-<p:sld xmlns:a="http://schemas.openxmlformats.org/drawingml/2006/main" xmlns:r="http://schemas.openxmlformats.org/officeDocument/2006/relationships" xmlns:p="http://schemas.openxmlformats.org/presentationml/2006/main">
-  <p:cSld>
-    <p:spTree>
-      <p:nvGrpSpPr>
-        <p:cNvPr id="1" name=""/>
-        <p:cNvGrpSpPr/>
-        <p:nvPr/>
-      </p:nvGrpSpPr>
-      <p:grpSpPr>
-        <a:xfrm>
-          <a:off x="0" y="0"/>
-          <a:ext cx="0" cy="0"/>
-          <a:chOff x="0" y="0"/>
-          <a:chExt cx="0" cy="0"/>
-        </a:xfrm>
-      </p:grpSpPr>
-      <p:sp>
-        <p:nvSpPr>
-          <p:cNvPr id="2" name="Title 1">
-            <a:extLst>
-              <a:ext uri="{FF2B5EF4-FFF2-40B4-BE49-F238E27FC236}">
-                <a16:creationId xmlns="" xmlns:a16="http://schemas.microsoft.com/office/drawing/2014/main" id="{789F0914-9F89-48D5-A04A-EB8506D20677}"/>
-              </a:ext>
-            </a:extLst>
-          </p:cNvPr>
-          <p:cNvSpPr>
-            <a:spLocks noGrp="1"/>
-          </p:cNvSpPr>
-          <p:nvPr>
-            <p:ph type="title"/>
-          </p:nvPr>
-        </p:nvSpPr>
-        <p:spPr>
-          <a:xfrm>
-            <a:off x="289560" y="365126"/>
-            <a:ext cx="8686800" cy="1325563"/>
-          </a:xfrm>
-        </p:spPr>
-        <p:txBody>
-          <a:bodyPr/>
-          <a:lstStyle/>
-          <a:p>
-            <a:r>
-              <a:rPr lang="en-US"/>
-              <a:t>Event Detection in Twitter: Examples</a:t>
-            </a:r>
-          </a:p>
-        </p:txBody>
-      </p:sp>
-      <p:sp>
-        <p:nvSpPr>
-          <p:cNvPr id="5" name="Rectangle 4">
-            <a:extLst>
-              <a:ext uri="{FF2B5EF4-FFF2-40B4-BE49-F238E27FC236}">
-                <a16:creationId xmlns="" xmlns:a16="http://schemas.microsoft.com/office/drawing/2014/main" id="{D5F8127B-3EAF-4D79-B961-9CDCF5DA2CA6}"/>
-              </a:ext>
-            </a:extLst>
-          </p:cNvPr>
-          <p:cNvSpPr/>
-          <p:nvPr/>
-        </p:nvSpPr>
-        <p:spPr>
-          <a:xfrm>
-            <a:off x="735330" y="3295596"/>
-            <a:ext cx="8012430" cy="1200329"/>
-          </a:xfrm>
-          <a:prstGeom prst="rect">
-            <a:avLst/>
-          </a:prstGeom>
-        </p:spPr>
-        <p:txBody>
-          <a:bodyPr wrap="square">
-            <a:spAutoFit/>
-          </a:bodyPr>
-          <a:lstStyle/>
-          <a:p>
-            <a:r>
-              <a:rPr lang="en-US" sz="2400" dirty="0"/>
-              <a:t>RT </a:t>
-            </a:r>
-            <a:r>
-              <a:rPr lang="en-US" sz="2400" dirty="0">
-                <a:solidFill>
-                  <a:srgbClr val="0070C0"/>
-                </a:solidFill>
-              </a:rPr>
-              <a:t>@Stump4TrumpPAC</a:t>
-            </a:r>
-            <a:r>
-              <a:rPr lang="en-US" sz="2400" dirty="0"/>
-              <a:t>: These are the 58 people killed in the Las Vegas massacre, the deadliest mass shooting in modern U.S. history.. 💐🙏🏻 http…</a:t>
-            </a:r>
-          </a:p>
-        </p:txBody>
-      </p:sp>
-      <p:sp>
-        <p:nvSpPr>
-          <p:cNvPr id="6" name="Rectangle 5">
-            <a:extLst>
-              <a:ext uri="{FF2B5EF4-FFF2-40B4-BE49-F238E27FC236}">
-                <a16:creationId xmlns="" xmlns:a16="http://schemas.microsoft.com/office/drawing/2014/main" id="{1B041536-BBFD-40FB-8C12-11420F37DDEA}"/>
-              </a:ext>
-            </a:extLst>
-          </p:cNvPr>
-          <p:cNvSpPr/>
-          <p:nvPr/>
-        </p:nvSpPr>
-        <p:spPr>
-          <a:xfrm>
-            <a:off x="735330" y="4819140"/>
-            <a:ext cx="8016239" cy="1200329"/>
-          </a:xfrm>
-          <a:prstGeom prst="rect">
-            <a:avLst/>
-          </a:prstGeom>
-        </p:spPr>
-        <p:txBody>
-          <a:bodyPr wrap="square">
-            <a:spAutoFit/>
-          </a:bodyPr>
-          <a:lstStyle/>
-          <a:p>
-            <a:r>
-              <a:rPr lang="en-US" sz="2400" dirty="0"/>
-              <a:t>RT </a:t>
-            </a:r>
-            <a:r>
-              <a:rPr lang="en-US" sz="2400" dirty="0">
-                <a:solidFill>
-                  <a:srgbClr val="0070C0"/>
-                </a:solidFill>
-              </a:rPr>
-              <a:t>@</a:t>
-            </a:r>
-            <a:r>
-              <a:rPr lang="en-US" sz="2400" dirty="0" err="1">
-                <a:solidFill>
-                  <a:srgbClr val="0070C0"/>
-                </a:solidFill>
-              </a:rPr>
-              <a:t>dragoner_JP</a:t>
-            </a:r>
-            <a:r>
-              <a:rPr lang="en-US" sz="2400" dirty="0"/>
-              <a:t>: うげえ……「ラスベガス銃撃の(カナダ人)犠牲者が巨額の医療費に直面」→ Las Vegas shooting victims facing large medical bills </a:t>
-            </a:r>
-            <a:r>
-              <a:rPr lang="en-US" sz="2400" dirty="0">
-                <a:solidFill>
-                  <a:srgbClr val="0070C0"/>
-                </a:solidFill>
-              </a:rPr>
-              <a:t>https://</a:t>
-            </a:r>
-            <a:r>
-              <a:rPr lang="en-US" sz="2400" dirty="0" err="1">
-                <a:solidFill>
-                  <a:srgbClr val="0070C0"/>
-                </a:solidFill>
-              </a:rPr>
-              <a:t>t.co</a:t>
-            </a:r>
-            <a:r>
-              <a:rPr lang="en-US" sz="2400" dirty="0">
-                <a:solidFill>
-                  <a:srgbClr val="0070C0"/>
-                </a:solidFill>
-              </a:rPr>
-              <a:t>/1F3bgH17Jv</a:t>
-            </a:r>
-          </a:p>
-        </p:txBody>
-      </p:sp>
-      <p:sp>
-        <p:nvSpPr>
-          <p:cNvPr id="7" name="Rectangle 6">
-            <a:extLst>
-              <a:ext uri="{FF2B5EF4-FFF2-40B4-BE49-F238E27FC236}">
-                <a16:creationId xmlns="" xmlns:a16="http://schemas.microsoft.com/office/drawing/2014/main" id="{D5F8127B-3EAF-4D79-B961-9CDCF5DA2CA6}"/>
-              </a:ext>
-            </a:extLst>
-          </p:cNvPr>
-          <p:cNvSpPr/>
-          <p:nvPr/>
-        </p:nvSpPr>
-        <p:spPr>
-          <a:xfrm>
-            <a:off x="735330" y="1772052"/>
-            <a:ext cx="8012430" cy="1200329"/>
-          </a:xfrm>
-          <a:prstGeom prst="rect">
-            <a:avLst/>
-          </a:prstGeom>
-        </p:spPr>
-        <p:txBody>
-          <a:bodyPr wrap="square">
-            <a:spAutoFit/>
-          </a:bodyPr>
-          <a:lstStyle/>
-          <a:p>
-            <a:r>
-              <a:rPr lang="en-US" sz="2400" dirty="0"/>
-              <a:t>RT </a:t>
-            </a:r>
-            <a:r>
-              <a:rPr lang="en-US" sz="2400" dirty="0">
-                <a:solidFill>
-                  <a:srgbClr val="0070C0"/>
-                </a:solidFill>
-              </a:rPr>
-              <a:t>@jc_stubbs</a:t>
-            </a:r>
-            <a:r>
-              <a:rPr lang="en-US" sz="2400" dirty="0"/>
-              <a:t>: Another tragic day in </a:t>
-            </a:r>
-            <a:r>
-              <a:rPr lang="en-US" sz="2400" dirty="0">
-                <a:solidFill>
-                  <a:srgbClr val="0070C0"/>
-                </a:solidFill>
-              </a:rPr>
-              <a:t>#Ukraine </a:t>
-            </a:r>
-            <a:r>
-              <a:rPr lang="mr-IN" sz="2400" dirty="0"/>
-              <a:t>–</a:t>
-            </a:r>
-            <a:r>
-              <a:rPr lang="en-US" sz="2400" dirty="0"/>
-              <a:t> More than 50 rebels killed as new leader unleashes assault: </a:t>
-            </a:r>
-            <a:r>
-              <a:rPr lang="en-US" sz="2400" dirty="0">
-                <a:solidFill>
-                  <a:srgbClr val="0070C0"/>
-                </a:solidFill>
-              </a:rPr>
-              <a:t>http://t.co/wcfU3kyAFX</a:t>
-            </a:r>
-          </a:p>
-        </p:txBody>
-      </p:sp>
-    </p:spTree>
-    <p:extLst>
-      <p:ext uri="{BB962C8B-B14F-4D97-AF65-F5344CB8AC3E}">
-        <p14:creationId xmlns:p14="http://schemas.microsoft.com/office/powerpoint/2010/main" val="1556995143"/>
-      </p:ext>
-    </p:extLst>
-  </p:cSld>
-  <p:clrMapOvr>
-    <a:masterClrMapping/>
-  </p:clrMapOvr>
-  <p:timing>
-    <p:tnLst>
-      <p:par>
-        <p:cTn id="1" dur="indefinite" restart="never" nodeType="tmRoot"/>
-      </p:par>
-    </p:tnLst>
-  </p:timing>
-</p:sld>
-</file>
-
-<file path=ppt/slides/slide6.xml><?xml version="1.0" encoding="utf-8"?>
-<p:sld xmlns:a="http://schemas.openxmlformats.org/drawingml/2006/main" xmlns:r="http://schemas.openxmlformats.org/officeDocument/2006/relationships" xmlns:p="http://schemas.openxmlformats.org/presentationml/2006/main">
-  <p:cSld>
-    <p:spTree>
-      <p:nvGrpSpPr>
-        <p:cNvPr id="1" name=""/>
-        <p:cNvGrpSpPr/>
-        <p:nvPr/>
-      </p:nvGrpSpPr>
-      <p:grpSpPr>
-        <a:xfrm>
-          <a:off x="0" y="0"/>
-          <a:ext cx="0" cy="0"/>
-          <a:chOff x="0" y="0"/>
-          <a:chExt cx="0" cy="0"/>
-        </a:xfrm>
-      </p:grpSpPr>
-      <p:sp>
-        <p:nvSpPr>
-          <p:cNvPr id="2" name="Title 1"/>
-          <p:cNvSpPr>
-            <a:spLocks noGrp="1"/>
-          </p:cNvSpPr>
-          <p:nvPr>
-            <p:ph type="title"/>
-          </p:nvPr>
-        </p:nvSpPr>
-        <p:spPr/>
-        <p:txBody>
-          <a:bodyPr/>
-          <a:lstStyle/>
-          <a:p>
-            <a:r>
-              <a:rPr lang="en-US"/>
-              <a:t>An Example Workflow</a:t>
-            </a:r>
-            <a:endParaRPr lang="en-US" dirty="0"/>
-          </a:p>
-        </p:txBody>
-      </p:sp>
-      <p:pic>
-        <p:nvPicPr>
-          <p:cNvPr id="4" name="Picture 3">
-            <a:extLst>
-              <a:ext uri="{FF2B5EF4-FFF2-40B4-BE49-F238E27FC236}">
-                <a16:creationId xmlns="" xmlns:a16="http://schemas.microsoft.com/office/drawing/2014/main" id="{A5FA5E3F-93A3-49D6-87CB-54DA033C241C}"/>
-              </a:ext>
-            </a:extLst>
-          </p:cNvPr>
-          <p:cNvPicPr>
-            <a:picLocks noChangeAspect="1"/>
-          </p:cNvPicPr>
-          <p:nvPr/>
-        </p:nvPicPr>
-        <p:blipFill>
-          <a:blip r:embed="rId2"/>
-          <a:stretch>
-            <a:fillRect/>
-          </a:stretch>
-        </p:blipFill>
-        <p:spPr>
-          <a:xfrm>
-            <a:off x="1468967" y="1825625"/>
-            <a:ext cx="6206066" cy="3955624"/>
-          </a:xfrm>
-          <a:prstGeom prst="rect">
-            <a:avLst/>
-          </a:prstGeom>
-        </p:spPr>
-      </p:pic>
-    </p:spTree>
-    <p:extLst>
-      <p:ext uri="{BB962C8B-B14F-4D97-AF65-F5344CB8AC3E}">
-        <p14:creationId xmlns:p14="http://schemas.microsoft.com/office/powerpoint/2010/main" val="569283612"/>
-      </p:ext>
-    </p:extLst>
-  </p:cSld>
-  <p:clrMapOvr>
-    <a:masterClrMapping/>
-  </p:clrMapOvr>
-  <p:timing>
-    <p:tnLst>
-      <p:par>
-        <p:cTn id="1" dur="indefinite" restart="never" nodeType="tmRoot"/>
-      </p:par>
-    </p:tnLst>
-  </p:timing>
-</p:sld>
-</file>
-
-<file path=ppt/slides/slide7.xml><?xml version="1.0" encoding="utf-8"?>
-<p:sld xmlns:a="http://schemas.openxmlformats.org/drawingml/2006/main" xmlns:r="http://schemas.openxmlformats.org/officeDocument/2006/relationships" xmlns:p="http://schemas.openxmlformats.org/presentationml/2006/main">
-  <p:cSld>
-    <p:spTree>
-      <p:nvGrpSpPr>
-        <p:cNvPr id="1" name=""/>
-        <p:cNvGrpSpPr/>
-        <p:nvPr/>
-      </p:nvGrpSpPr>
-      <p:grpSpPr>
-        <a:xfrm>
-          <a:off x="0" y="0"/>
-          <a:ext cx="0" cy="0"/>
-          <a:chOff x="0" y="0"/>
-          <a:chExt cx="0" cy="0"/>
-        </a:xfrm>
-      </p:grpSpPr>
-      <p:sp>
-        <p:nvSpPr>
-          <p:cNvPr id="2" name="Title 1">
-            <a:extLst>
-              <a:ext uri="{FF2B5EF4-FFF2-40B4-BE49-F238E27FC236}">
-                <a16:creationId xmlns="" xmlns:a16="http://schemas.microsoft.com/office/drawing/2014/main" id="{B4CF79A2-9503-4AD1-9E75-1E1A5C90BD69}"/>
-              </a:ext>
-            </a:extLst>
-          </p:cNvPr>
-          <p:cNvSpPr>
-            <a:spLocks noGrp="1"/>
-          </p:cNvSpPr>
-          <p:nvPr>
-            <p:ph type="title"/>
-          </p:nvPr>
-        </p:nvSpPr>
-        <p:spPr/>
-        <p:txBody>
-          <a:bodyPr/>
-          <a:lstStyle/>
-          <a:p>
-            <a:r>
-              <a:rPr lang="en-US"/>
-              <a:t>A Second Workflow</a:t>
-            </a:r>
-          </a:p>
-        </p:txBody>
-      </p:sp>
-      <p:pic>
-        <p:nvPicPr>
-          <p:cNvPr id="5" name="Picture 4">
-            <a:extLst>
-              <a:ext uri="{FF2B5EF4-FFF2-40B4-BE49-F238E27FC236}">
-                <a16:creationId xmlns="" xmlns:a16="http://schemas.microsoft.com/office/drawing/2014/main" id="{0FC4BCA5-E0C5-4BB0-88EE-29E619BEB388}"/>
-              </a:ext>
-            </a:extLst>
-          </p:cNvPr>
-          <p:cNvPicPr>
-            <a:picLocks noChangeAspect="1"/>
-          </p:cNvPicPr>
-          <p:nvPr/>
-        </p:nvPicPr>
-        <p:blipFill>
-          <a:blip r:embed="rId2"/>
-          <a:stretch>
-            <a:fillRect/>
-          </a:stretch>
-        </p:blipFill>
-        <p:spPr>
-          <a:xfrm>
-            <a:off x="628650" y="1817689"/>
-            <a:ext cx="7547943" cy="4735511"/>
-          </a:xfrm>
-          <a:prstGeom prst="rect">
-            <a:avLst/>
-          </a:prstGeom>
-        </p:spPr>
-      </p:pic>
-    </p:spTree>
-    <p:extLst>
-      <p:ext uri="{BB962C8B-B14F-4D97-AF65-F5344CB8AC3E}">
-        <p14:creationId xmlns:p14="http://schemas.microsoft.com/office/powerpoint/2010/main" val="3673727299"/>
-      </p:ext>
-    </p:extLst>
-  </p:cSld>
-  <p:clrMapOvr>
-    <a:masterClrMapping/>
-  </p:clrMapOvr>
-  <p:timing>
-    <p:tnLst>
-      <p:par>
-        <p:cTn id="1" dur="indefinite" restart="never" nodeType="tmRoot"/>
-      </p:par>
-    </p:tnLst>
-  </p:timing>
-</p:sld>
-</file>
-
-<file path=ppt/slides/slide8.xml><?xml version="1.0" encoding="utf-8"?>
-<p:sld xmlns:a="http://schemas.openxmlformats.org/drawingml/2006/main" xmlns:r="http://schemas.openxmlformats.org/officeDocument/2006/relationships" xmlns:p="http://schemas.openxmlformats.org/presentationml/2006/main">
-  <p:cSld>
-    <p:spTree>
-      <p:nvGrpSpPr>
-        <p:cNvPr id="1" name=""/>
-        <p:cNvGrpSpPr/>
-        <p:nvPr/>
-      </p:nvGrpSpPr>
-      <p:grpSpPr>
-        <a:xfrm>
-          <a:off x="0" y="0"/>
-          <a:ext cx="0" cy="0"/>
-          <a:chOff x="0" y="0"/>
-          <a:chExt cx="0" cy="0"/>
-        </a:xfrm>
-      </p:grpSpPr>
-      <p:sp>
-        <p:nvSpPr>
-          <p:cNvPr id="2" name="Title 1">
-            <a:extLst>
-              <a:ext uri="{FF2B5EF4-FFF2-40B4-BE49-F238E27FC236}">
-                <a16:creationId xmlns="" xmlns:a16="http://schemas.microsoft.com/office/drawing/2014/main" id="{D6B083CC-4209-47D3-8AFB-A755190E41BB}"/>
-              </a:ext>
-            </a:extLst>
-          </p:cNvPr>
-          <p:cNvSpPr>
-            <a:spLocks noGrp="1"/>
-          </p:cNvSpPr>
-          <p:nvPr>
-            <p:ph type="title"/>
-          </p:nvPr>
-        </p:nvSpPr>
-        <p:spPr/>
-        <p:txBody>
-          <a:bodyPr/>
-          <a:lstStyle/>
-          <a:p>
-            <a:r>
-              <a:rPr lang="en-US"/>
-              <a:t>Classification of Techniques</a:t>
-            </a:r>
-          </a:p>
-        </p:txBody>
-      </p:sp>
-      <p:sp>
-        <p:nvSpPr>
-          <p:cNvPr id="3" name="Content Placeholder 2">
-            <a:extLst>
-              <a:ext uri="{FF2B5EF4-FFF2-40B4-BE49-F238E27FC236}">
-                <a16:creationId xmlns="" xmlns:a16="http://schemas.microsoft.com/office/drawing/2014/main" id="{21A045AF-1B0C-473F-B2BD-16CC029381CC}"/>
+                <a16:creationId xmlns:a16="http://schemas.microsoft.com/office/drawing/2014/main" xmlns="" id="{21A045AF-1B0C-473F-B2BD-16CC029381CC}"/>
               </a:ext>
             </a:extLst>
           </p:cNvPr>
@@ -5893,7 +4666,7 @@
           <p:cNvPr id="4" name="Content Placeholder 2">
             <a:extLst>
               <a:ext uri="{FF2B5EF4-FFF2-40B4-BE49-F238E27FC236}">
-                <a16:creationId xmlns="" xmlns:a16="http://schemas.microsoft.com/office/drawing/2014/main" id="{560166D7-7B6D-4B68-B8AE-1C1CC6E70202}"/>
+                <a16:creationId xmlns:a16="http://schemas.microsoft.com/office/drawing/2014/main" xmlns="" id="{560166D7-7B6D-4B68-B8AE-1C1CC6E70202}"/>
               </a:ext>
             </a:extLst>
           </p:cNvPr>
@@ -6120,7 +4893,7 @@
           <p:cNvPr id="5" name="Arrow: Right 4">
             <a:extLst>
               <a:ext uri="{FF2B5EF4-FFF2-40B4-BE49-F238E27FC236}">
-                <a16:creationId xmlns="" xmlns:a16="http://schemas.microsoft.com/office/drawing/2014/main" id="{D1E8C985-9E37-43C2-AD20-259A38EF2B2D}"/>
+                <a16:creationId xmlns:a16="http://schemas.microsoft.com/office/drawing/2014/main" xmlns="" id="{D1E8C985-9E37-43C2-AD20-259A38EF2B2D}"/>
               </a:ext>
             </a:extLst>
           </p:cNvPr>
@@ -6171,7 +4944,7 @@
           <p:cNvPr id="7" name="Content Placeholder 2">
             <a:extLst>
               <a:ext uri="{FF2B5EF4-FFF2-40B4-BE49-F238E27FC236}">
-                <a16:creationId xmlns="" xmlns:a16="http://schemas.microsoft.com/office/drawing/2014/main" id="{5DE865FC-39D0-4B3E-808A-72F7CCD94CD8}"/>
+                <a16:creationId xmlns:a16="http://schemas.microsoft.com/office/drawing/2014/main" xmlns="" id="{5DE865FC-39D0-4B3E-808A-72F7CCD94CD8}"/>
               </a:ext>
             </a:extLst>
           </p:cNvPr>
@@ -6378,7 +5151,7 @@
           <p:cNvPr id="8" name="Arrow: Right 7">
             <a:extLst>
               <a:ext uri="{FF2B5EF4-FFF2-40B4-BE49-F238E27FC236}">
-                <a16:creationId xmlns="" xmlns:a16="http://schemas.microsoft.com/office/drawing/2014/main" id="{3AB65389-B784-4AB6-BC15-A38C68139767}"/>
+                <a16:creationId xmlns:a16="http://schemas.microsoft.com/office/drawing/2014/main" xmlns="" id="{3AB65389-B784-4AB6-BC15-A38C68139767}"/>
               </a:ext>
             </a:extLst>
           </p:cNvPr>
@@ -6428,6 +5201,2035 @@
     <p:extLst>
       <p:ext uri="{BB962C8B-B14F-4D97-AF65-F5344CB8AC3E}">
         <p14:creationId xmlns:p14="http://schemas.microsoft.com/office/powerpoint/2010/main" val="446995910"/>
+      </p:ext>
+    </p:extLst>
+  </p:cSld>
+  <p:clrMapOvr>
+    <a:masterClrMapping/>
+  </p:clrMapOvr>
+  <p:timing>
+    <p:tnLst>
+      <p:par>
+        <p:cTn id="1" dur="indefinite" restart="never" nodeType="tmRoot"/>
+      </p:par>
+    </p:tnLst>
+  </p:timing>
+</p:sld>
+</file>
+
+<file path=ppt/slides/slide12.xml><?xml version="1.0" encoding="utf-8"?>
+<p:sld xmlns:a="http://schemas.openxmlformats.org/drawingml/2006/main" xmlns:r="http://schemas.openxmlformats.org/officeDocument/2006/relationships" xmlns:p="http://schemas.openxmlformats.org/presentationml/2006/main">
+  <p:cSld>
+    <p:spTree>
+      <p:nvGrpSpPr>
+        <p:cNvPr id="1" name=""/>
+        <p:cNvGrpSpPr/>
+        <p:nvPr/>
+      </p:nvGrpSpPr>
+      <p:grpSpPr>
+        <a:xfrm>
+          <a:off x="0" y="0"/>
+          <a:ext cx="0" cy="0"/>
+          <a:chOff x="0" y="0"/>
+          <a:chExt cx="0" cy="0"/>
+        </a:xfrm>
+      </p:grpSpPr>
+      <p:sp>
+        <p:nvSpPr>
+          <p:cNvPr id="2" name="Title 1"/>
+          <p:cNvSpPr>
+            <a:spLocks noGrp="1"/>
+          </p:cNvSpPr>
+          <p:nvPr>
+            <p:ph type="title"/>
+          </p:nvPr>
+        </p:nvSpPr>
+        <p:spPr>
+          <a:xfrm>
+            <a:off x="146050" y="603252"/>
+            <a:ext cx="8743950" cy="1325563"/>
+          </a:xfrm>
+        </p:spPr>
+        <p:txBody>
+          <a:bodyPr>
+            <a:normAutofit/>
+          </a:bodyPr>
+          <a:lstStyle/>
+          <a:p>
+            <a:r>
+              <a:rPr lang="en-US" sz="4000"/>
+              <a:t>Event Detection in Twitter: A Taxonomy</a:t>
+            </a:r>
+            <a:endParaRPr lang="en-US" sz="4000" dirty="0"/>
+          </a:p>
+        </p:txBody>
+      </p:sp>
+      <p:pic>
+        <p:nvPicPr>
+          <p:cNvPr id="4" name="Picture 3">
+            <a:extLst>
+              <a:ext uri="{FF2B5EF4-FFF2-40B4-BE49-F238E27FC236}">
+                <a16:creationId xmlns:a16="http://schemas.microsoft.com/office/drawing/2014/main" xmlns="" id="{0B14148A-CDBC-4010-8E64-009C4BA6BA7A}"/>
+              </a:ext>
+            </a:extLst>
+          </p:cNvPr>
+          <p:cNvPicPr>
+            <a:picLocks noChangeAspect="1"/>
+          </p:cNvPicPr>
+          <p:nvPr/>
+        </p:nvPicPr>
+        <p:blipFill>
+          <a:blip r:embed="rId3"/>
+          <a:stretch>
+            <a:fillRect/>
+          </a:stretch>
+        </p:blipFill>
+        <p:spPr>
+          <a:xfrm>
+            <a:off x="1170515" y="2995615"/>
+            <a:ext cx="6502127" cy="3185052"/>
+          </a:xfrm>
+          <a:prstGeom prst="rect">
+            <a:avLst/>
+          </a:prstGeom>
+        </p:spPr>
+      </p:pic>
+      <p:sp>
+        <p:nvSpPr>
+          <p:cNvPr id="3" name="Rectangle 2"/>
+          <p:cNvSpPr/>
+          <p:nvPr/>
+        </p:nvSpPr>
+        <p:spPr>
+          <a:xfrm>
+            <a:off x="1388533" y="5156201"/>
+            <a:ext cx="6275642" cy="143933"/>
+          </a:xfrm>
+          <a:prstGeom prst="rect">
+            <a:avLst/>
+          </a:prstGeom>
+          <a:noFill/>
+          <a:ln>
+            <a:solidFill>
+              <a:srgbClr val="F80608"/>
+            </a:solidFill>
+          </a:ln>
+        </p:spPr>
+        <p:style>
+          <a:lnRef idx="2">
+            <a:schemeClr val="accent1">
+              <a:shade val="50000"/>
+            </a:schemeClr>
+          </a:lnRef>
+          <a:fillRef idx="1">
+            <a:schemeClr val="accent1"/>
+          </a:fillRef>
+          <a:effectRef idx="0">
+            <a:schemeClr val="accent1"/>
+          </a:effectRef>
+          <a:fontRef idx="minor">
+            <a:schemeClr val="lt1"/>
+          </a:fontRef>
+        </p:style>
+        <p:txBody>
+          <a:bodyPr rtlCol="0" anchor="ctr"/>
+          <a:lstStyle/>
+          <a:p>
+            <a:pPr algn="ctr"/>
+            <a:endParaRPr lang="en-US">
+              <a:solidFill>
+                <a:srgbClr val="F80608"/>
+              </a:solidFill>
+            </a:endParaRPr>
+          </a:p>
+        </p:txBody>
+      </p:sp>
+    </p:spTree>
+    <p:extLst>
+      <p:ext uri="{BB962C8B-B14F-4D97-AF65-F5344CB8AC3E}">
+        <p14:creationId xmlns:p14="http://schemas.microsoft.com/office/powerpoint/2010/main" val="351011376"/>
+      </p:ext>
+    </p:extLst>
+  </p:cSld>
+  <p:clrMapOvr>
+    <a:masterClrMapping/>
+  </p:clrMapOvr>
+  <p:timing>
+    <p:tnLst>
+      <p:par>
+        <p:cTn id="1" dur="indefinite" restart="never" nodeType="tmRoot"/>
+      </p:par>
+    </p:tnLst>
+  </p:timing>
+</p:sld>
+</file>
+
+<file path=ppt/slides/slide13.xml><?xml version="1.0" encoding="utf-8"?>
+<p:sld xmlns:a="http://schemas.openxmlformats.org/drawingml/2006/main" xmlns:r="http://schemas.openxmlformats.org/officeDocument/2006/relationships" xmlns:p="http://schemas.openxmlformats.org/presentationml/2006/main">
+  <p:cSld>
+    <p:spTree>
+      <p:nvGrpSpPr>
+        <p:cNvPr id="1" name=""/>
+        <p:cNvGrpSpPr/>
+        <p:nvPr/>
+      </p:nvGrpSpPr>
+      <p:grpSpPr>
+        <a:xfrm>
+          <a:off x="0" y="0"/>
+          <a:ext cx="0" cy="0"/>
+          <a:chOff x="0" y="0"/>
+          <a:chExt cx="0" cy="0"/>
+        </a:xfrm>
+      </p:grpSpPr>
+      <p:sp>
+        <p:nvSpPr>
+          <p:cNvPr id="2" name="Title 1">
+            <a:extLst>
+              <a:ext uri="{FF2B5EF4-FFF2-40B4-BE49-F238E27FC236}">
+                <a16:creationId xmlns:a16="http://schemas.microsoft.com/office/drawing/2014/main" xmlns="" id="{F5EA10E8-179C-48CA-A962-83AC7A417653}"/>
+              </a:ext>
+            </a:extLst>
+          </p:cNvPr>
+          <p:cNvSpPr>
+            <a:spLocks noGrp="1"/>
+          </p:cNvSpPr>
+          <p:nvPr>
+            <p:ph type="title"/>
+          </p:nvPr>
+        </p:nvSpPr>
+        <p:spPr/>
+        <p:txBody>
+          <a:bodyPr/>
+          <a:lstStyle/>
+          <a:p>
+            <a:r>
+              <a:rPr lang="en-US"/>
+              <a:t>Feature Representation</a:t>
+            </a:r>
+          </a:p>
+        </p:txBody>
+      </p:sp>
+      <p:pic>
+        <p:nvPicPr>
+          <p:cNvPr id="4" name="Picture 3">
+            <a:extLst>
+              <a:ext uri="{FF2B5EF4-FFF2-40B4-BE49-F238E27FC236}">
+                <a16:creationId xmlns:a16="http://schemas.microsoft.com/office/drawing/2014/main" xmlns="" id="{3B9B8793-346A-43E4-A56F-D565544760F6}"/>
+              </a:ext>
+            </a:extLst>
+          </p:cNvPr>
+          <p:cNvPicPr>
+            <a:picLocks noChangeAspect="1"/>
+          </p:cNvPicPr>
+          <p:nvPr/>
+        </p:nvPicPr>
+        <p:blipFill>
+          <a:blip r:embed="rId2"/>
+          <a:stretch>
+            <a:fillRect/>
+          </a:stretch>
+        </p:blipFill>
+        <p:spPr>
+          <a:xfrm>
+            <a:off x="838201" y="2630490"/>
+            <a:ext cx="6756400" cy="3404006"/>
+          </a:xfrm>
+          <a:prstGeom prst="rect">
+            <a:avLst/>
+          </a:prstGeom>
+        </p:spPr>
+      </p:pic>
+    </p:spTree>
+    <p:extLst>
+      <p:ext uri="{BB962C8B-B14F-4D97-AF65-F5344CB8AC3E}">
+        <p14:creationId xmlns:p14="http://schemas.microsoft.com/office/powerpoint/2010/main" val="3240889219"/>
+      </p:ext>
+    </p:extLst>
+  </p:cSld>
+  <p:clrMapOvr>
+    <a:masterClrMapping/>
+  </p:clrMapOvr>
+  <p:timing>
+    <p:tnLst>
+      <p:par>
+        <p:cTn id="1" dur="indefinite" restart="never" nodeType="tmRoot"/>
+      </p:par>
+    </p:tnLst>
+  </p:timing>
+</p:sld>
+</file>
+
+<file path=ppt/slides/slide14.xml><?xml version="1.0" encoding="utf-8"?>
+<p:sld xmlns:a="http://schemas.openxmlformats.org/drawingml/2006/main" xmlns:r="http://schemas.openxmlformats.org/officeDocument/2006/relationships" xmlns:p="http://schemas.openxmlformats.org/presentationml/2006/main">
+  <p:cSld>
+    <p:spTree>
+      <p:nvGrpSpPr>
+        <p:cNvPr id="1" name=""/>
+        <p:cNvGrpSpPr/>
+        <p:nvPr/>
+      </p:nvGrpSpPr>
+      <p:grpSpPr>
+        <a:xfrm>
+          <a:off x="0" y="0"/>
+          <a:ext cx="0" cy="0"/>
+          <a:chOff x="0" y="0"/>
+          <a:chExt cx="0" cy="0"/>
+        </a:xfrm>
+      </p:grpSpPr>
+      <p:sp>
+        <p:nvSpPr>
+          <p:cNvPr id="2" name="Title 1">
+            <a:extLst>
+              <a:ext uri="{FF2B5EF4-FFF2-40B4-BE49-F238E27FC236}">
+                <a16:creationId xmlns:a16="http://schemas.microsoft.com/office/drawing/2014/main" xmlns="" id="{F5EA10E8-179C-48CA-A962-83AC7A417653}"/>
+              </a:ext>
+            </a:extLst>
+          </p:cNvPr>
+          <p:cNvSpPr>
+            <a:spLocks noGrp="1"/>
+          </p:cNvSpPr>
+          <p:nvPr>
+            <p:ph type="title"/>
+          </p:nvPr>
+        </p:nvSpPr>
+        <p:spPr/>
+        <p:txBody>
+          <a:bodyPr/>
+          <a:lstStyle/>
+          <a:p>
+            <a:r>
+              <a:rPr lang="en-US"/>
+              <a:t>Continued</a:t>
+            </a:r>
+          </a:p>
+        </p:txBody>
+      </p:sp>
+      <p:pic>
+        <p:nvPicPr>
+          <p:cNvPr id="3" name="Picture 2">
+            <a:extLst>
+              <a:ext uri="{FF2B5EF4-FFF2-40B4-BE49-F238E27FC236}">
+                <a16:creationId xmlns:a16="http://schemas.microsoft.com/office/drawing/2014/main" xmlns="" id="{47C8D744-821F-442B-8D37-F20DB15467EA}"/>
+              </a:ext>
+            </a:extLst>
+          </p:cNvPr>
+          <p:cNvPicPr>
+            <a:picLocks noChangeAspect="1"/>
+          </p:cNvPicPr>
+          <p:nvPr/>
+        </p:nvPicPr>
+        <p:blipFill>
+          <a:blip r:embed="rId2"/>
+          <a:stretch>
+            <a:fillRect/>
+          </a:stretch>
+        </p:blipFill>
+        <p:spPr>
+          <a:xfrm>
+            <a:off x="890585" y="2901422"/>
+            <a:ext cx="6733655" cy="2745844"/>
+          </a:xfrm>
+          <a:prstGeom prst="rect">
+            <a:avLst/>
+          </a:prstGeom>
+        </p:spPr>
+      </p:pic>
+    </p:spTree>
+    <p:extLst>
+      <p:ext uri="{BB962C8B-B14F-4D97-AF65-F5344CB8AC3E}">
+        <p14:creationId xmlns:p14="http://schemas.microsoft.com/office/powerpoint/2010/main" val="3279014792"/>
+      </p:ext>
+    </p:extLst>
+  </p:cSld>
+  <p:clrMapOvr>
+    <a:masterClrMapping/>
+  </p:clrMapOvr>
+  <p:timing>
+    <p:tnLst>
+      <p:par>
+        <p:cTn id="1" dur="indefinite" restart="never" nodeType="tmRoot"/>
+      </p:par>
+    </p:tnLst>
+  </p:timing>
+</p:sld>
+</file>
+
+<file path=ppt/slides/slide15.xml><?xml version="1.0" encoding="utf-8"?>
+<p:sld xmlns:a="http://schemas.openxmlformats.org/drawingml/2006/main" xmlns:r="http://schemas.openxmlformats.org/officeDocument/2006/relationships" xmlns:p="http://schemas.openxmlformats.org/presentationml/2006/main">
+  <p:cSld>
+    <p:spTree>
+      <p:nvGrpSpPr>
+        <p:cNvPr id="1" name=""/>
+        <p:cNvGrpSpPr/>
+        <p:nvPr/>
+      </p:nvGrpSpPr>
+      <p:grpSpPr>
+        <a:xfrm>
+          <a:off x="0" y="0"/>
+          <a:ext cx="0" cy="0"/>
+          <a:chOff x="0" y="0"/>
+          <a:chExt cx="0" cy="0"/>
+        </a:xfrm>
+      </p:grpSpPr>
+      <p:sp>
+        <p:nvSpPr>
+          <p:cNvPr id="2" name="Title 1">
+            <a:extLst>
+              <a:ext uri="{FF2B5EF4-FFF2-40B4-BE49-F238E27FC236}">
+                <a16:creationId xmlns:a16="http://schemas.microsoft.com/office/drawing/2014/main" xmlns="" id="{8537C631-3420-40A0-B136-850967FD898E}"/>
+              </a:ext>
+            </a:extLst>
+          </p:cNvPr>
+          <p:cNvSpPr>
+            <a:spLocks noGrp="1"/>
+          </p:cNvSpPr>
+          <p:nvPr>
+            <p:ph type="title"/>
+          </p:nvPr>
+        </p:nvSpPr>
+        <p:spPr/>
+        <p:txBody>
+          <a:bodyPr/>
+          <a:lstStyle/>
+          <a:p>
+            <a:r>
+              <a:rPr lang="en-US"/>
+              <a:t>Open Research Issues</a:t>
+            </a:r>
+          </a:p>
+        </p:txBody>
+      </p:sp>
+      <p:sp>
+        <p:nvSpPr>
+          <p:cNvPr id="3" name="Content Placeholder 2">
+            <a:extLst>
+              <a:ext uri="{FF2B5EF4-FFF2-40B4-BE49-F238E27FC236}">
+                <a16:creationId xmlns:a16="http://schemas.microsoft.com/office/drawing/2014/main" xmlns="" id="{F1CD4C0B-C44A-44A7-B3C4-2460C4A5D01B}"/>
+              </a:ext>
+            </a:extLst>
+          </p:cNvPr>
+          <p:cNvSpPr>
+            <a:spLocks noGrp="1"/>
+          </p:cNvSpPr>
+          <p:nvPr>
+            <p:ph idx="1"/>
+          </p:nvPr>
+        </p:nvSpPr>
+        <p:spPr>
+          <a:xfrm>
+            <a:off x="628649" y="1825625"/>
+            <a:ext cx="8388351" cy="4736042"/>
+          </a:xfrm>
+        </p:spPr>
+        <p:txBody>
+          <a:bodyPr>
+            <a:normAutofit fontScale="92500"/>
+          </a:bodyPr>
+          <a:lstStyle/>
+          <a:p>
+            <a:r>
+              <a:rPr lang="en-US"/>
+              <a:t>Context-based advantages of data-driven, knowledge-driven or hybrid approaches</a:t>
+            </a:r>
+          </a:p>
+          <a:p>
+            <a:r>
+              <a:rPr lang="en-US"/>
+              <a:t>Understanding the limitations of specific event extraction techniques</a:t>
+            </a:r>
+          </a:p>
+          <a:p>
+            <a:r>
+              <a:rPr lang="en-US"/>
+              <a:t>The domain-dependency of event extraction procedures, affecting both their flexibility and effectiveness</a:t>
+            </a:r>
+          </a:p>
+          <a:p>
+            <a:r>
+              <a:rPr lang="en-US"/>
+              <a:t>The scalability of event extraction approaches when dealing with Big Data</a:t>
+            </a:r>
+          </a:p>
+          <a:p>
+            <a:r>
+              <a:rPr lang="en-US"/>
+              <a:t>The complexity of extracted events</a:t>
+            </a:r>
+          </a:p>
+          <a:p>
+            <a:r>
+              <a:rPr lang="en-US"/>
+              <a:t>Better extraction from noisy sources, including social media</a:t>
+            </a:r>
+          </a:p>
+        </p:txBody>
+      </p:sp>
+    </p:spTree>
+    <p:extLst>
+      <p:ext uri="{BB962C8B-B14F-4D97-AF65-F5344CB8AC3E}">
+        <p14:creationId xmlns:p14="http://schemas.microsoft.com/office/powerpoint/2010/main" val="874142107"/>
+      </p:ext>
+    </p:extLst>
+  </p:cSld>
+  <p:clrMapOvr>
+    <a:masterClrMapping/>
+  </p:clrMapOvr>
+  <p:timing>
+    <p:tnLst>
+      <p:par>
+        <p:cTn id="1" dur="indefinite" restart="never" nodeType="tmRoot"/>
+      </p:par>
+    </p:tnLst>
+  </p:timing>
+</p:sld>
+</file>
+
+<file path=ppt/slides/slide16.xml><?xml version="1.0" encoding="utf-8"?>
+<p:sld xmlns:a="http://schemas.openxmlformats.org/drawingml/2006/main" xmlns:r="http://schemas.openxmlformats.org/officeDocument/2006/relationships" xmlns:p="http://schemas.openxmlformats.org/presentationml/2006/main">
+  <p:cSld>
+    <p:spTree>
+      <p:nvGrpSpPr>
+        <p:cNvPr id="1" name=""/>
+        <p:cNvGrpSpPr/>
+        <p:nvPr/>
+      </p:nvGrpSpPr>
+      <p:grpSpPr>
+        <a:xfrm>
+          <a:off x="0" y="0"/>
+          <a:ext cx="0" cy="0"/>
+          <a:chOff x="0" y="0"/>
+          <a:chExt cx="0" cy="0"/>
+        </a:xfrm>
+      </p:grpSpPr>
+      <p:sp>
+        <p:nvSpPr>
+          <p:cNvPr id="2" name="Title 1">
+            <a:extLst>
+              <a:ext uri="{FF2B5EF4-FFF2-40B4-BE49-F238E27FC236}">
+                <a16:creationId xmlns:a16="http://schemas.microsoft.com/office/drawing/2014/main" xmlns="" id="{E1C3A720-E34E-4BB6-B515-B3C2EF039BC8}"/>
+              </a:ext>
+            </a:extLst>
+          </p:cNvPr>
+          <p:cNvSpPr>
+            <a:spLocks noGrp="1"/>
+          </p:cNvSpPr>
+          <p:nvPr>
+            <p:ph type="title"/>
+          </p:nvPr>
+        </p:nvSpPr>
+        <p:spPr/>
+        <p:txBody>
+          <a:bodyPr/>
+          <a:lstStyle/>
+          <a:p>
+            <a:r>
+              <a:rPr lang="en-US"/>
+              <a:t>Open Research Issues</a:t>
+            </a:r>
+          </a:p>
+        </p:txBody>
+      </p:sp>
+      <p:sp>
+        <p:nvSpPr>
+          <p:cNvPr id="3" name="Content Placeholder 2">
+            <a:extLst>
+              <a:ext uri="{FF2B5EF4-FFF2-40B4-BE49-F238E27FC236}">
+                <a16:creationId xmlns:a16="http://schemas.microsoft.com/office/drawing/2014/main" xmlns="" id="{D16B1CA5-8025-464F-80E9-9942274912F8}"/>
+              </a:ext>
+            </a:extLst>
+          </p:cNvPr>
+          <p:cNvSpPr>
+            <a:spLocks noGrp="1"/>
+          </p:cNvSpPr>
+          <p:nvPr>
+            <p:ph idx="1"/>
+          </p:nvPr>
+        </p:nvSpPr>
+        <p:spPr/>
+        <p:txBody>
+          <a:bodyPr/>
+          <a:lstStyle/>
+          <a:p>
+            <a:r>
+              <a:rPr lang="en-US"/>
+              <a:t>More accurate filtering</a:t>
+            </a:r>
+          </a:p>
+          <a:p>
+            <a:r>
+              <a:rPr lang="en-US"/>
+              <a:t>Improved techniques to combine and analyze information from multiple sources and languages</a:t>
+            </a:r>
+          </a:p>
+          <a:p>
+            <a:r>
+              <a:rPr lang="en-US"/>
+              <a:t>Enhanced summarization and visualization</a:t>
+            </a:r>
+          </a:p>
+          <a:p>
+            <a:r>
+              <a:rPr lang="en-US"/>
+              <a:t>Non-static and non-stationarity assumptions</a:t>
+            </a:r>
+          </a:p>
+          <a:p>
+            <a:r>
+              <a:rPr lang="en-US"/>
+              <a:t>More principled and robust evaluations</a:t>
+            </a:r>
+          </a:p>
+        </p:txBody>
+      </p:sp>
+    </p:spTree>
+    <p:extLst>
+      <p:ext uri="{BB962C8B-B14F-4D97-AF65-F5344CB8AC3E}">
+        <p14:creationId xmlns:p14="http://schemas.microsoft.com/office/powerpoint/2010/main" val="3569979996"/>
+      </p:ext>
+    </p:extLst>
+  </p:cSld>
+  <p:clrMapOvr>
+    <a:masterClrMapping/>
+  </p:clrMapOvr>
+  <p:timing>
+    <p:tnLst>
+      <p:par>
+        <p:cTn id="1" dur="indefinite" restart="never" nodeType="tmRoot"/>
+      </p:par>
+    </p:tnLst>
+  </p:timing>
+</p:sld>
+</file>
+
+<file path=ppt/slides/slide17.xml><?xml version="1.0" encoding="utf-8"?>
+<p:sld xmlns:a="http://schemas.openxmlformats.org/drawingml/2006/main" xmlns:r="http://schemas.openxmlformats.org/officeDocument/2006/relationships" xmlns:p="http://schemas.openxmlformats.org/presentationml/2006/main">
+  <p:cSld>
+    <p:spTree>
+      <p:nvGrpSpPr>
+        <p:cNvPr id="1" name=""/>
+        <p:cNvGrpSpPr/>
+        <p:nvPr/>
+      </p:nvGrpSpPr>
+      <p:grpSpPr>
+        <a:xfrm>
+          <a:off x="0" y="0"/>
+          <a:ext cx="0" cy="0"/>
+          <a:chOff x="0" y="0"/>
+          <a:chExt cx="0" cy="0"/>
+        </a:xfrm>
+      </p:grpSpPr>
+      <p:sp>
+        <p:nvSpPr>
+          <p:cNvPr id="2" name="Title 1"/>
+          <p:cNvSpPr>
+            <a:spLocks noGrp="1"/>
+          </p:cNvSpPr>
+          <p:nvPr>
+            <p:ph type="title"/>
+          </p:nvPr>
+        </p:nvSpPr>
+        <p:spPr/>
+        <p:txBody>
+          <a:bodyPr/>
+          <a:lstStyle/>
+          <a:p>
+            <a:r>
+              <a:rPr lang="en-US"/>
+              <a:t>Summary</a:t>
+            </a:r>
+          </a:p>
+        </p:txBody>
+      </p:sp>
+      <p:sp>
+        <p:nvSpPr>
+          <p:cNvPr id="3" name="Content Placeholder 2"/>
+          <p:cNvSpPr>
+            <a:spLocks noGrp="1"/>
+          </p:cNvSpPr>
+          <p:nvPr>
+            <p:ph idx="1"/>
+          </p:nvPr>
+        </p:nvSpPr>
+        <p:spPr/>
+        <p:txBody>
+          <a:bodyPr/>
+          <a:lstStyle/>
+          <a:p>
+            <a:endParaRPr lang="en-US"/>
+          </a:p>
+        </p:txBody>
+      </p:sp>
+    </p:spTree>
+    <p:extLst>
+      <p:ext uri="{BB962C8B-B14F-4D97-AF65-F5344CB8AC3E}">
+        <p14:creationId xmlns:p14="http://schemas.microsoft.com/office/powerpoint/2010/main" val="396642358"/>
+      </p:ext>
+    </p:extLst>
+  </p:cSld>
+  <p:clrMapOvr>
+    <a:masterClrMapping/>
+  </p:clrMapOvr>
+</p:sld>
+</file>
+
+<file path=ppt/slides/slide2.xml><?xml version="1.0" encoding="utf-8"?>
+<p:sld xmlns:a="http://schemas.openxmlformats.org/drawingml/2006/main" xmlns:r="http://schemas.openxmlformats.org/officeDocument/2006/relationships" xmlns:p="http://schemas.openxmlformats.org/presentationml/2006/main">
+  <p:cSld>
+    <p:spTree>
+      <p:nvGrpSpPr>
+        <p:cNvPr id="1" name=""/>
+        <p:cNvGrpSpPr/>
+        <p:nvPr/>
+      </p:nvGrpSpPr>
+      <p:grpSpPr>
+        <a:xfrm>
+          <a:off x="0" y="0"/>
+          <a:ext cx="0" cy="0"/>
+          <a:chOff x="0" y="0"/>
+          <a:chExt cx="0" cy="0"/>
+        </a:xfrm>
+      </p:grpSpPr>
+      <p:sp>
+        <p:nvSpPr>
+          <p:cNvPr id="2" name="Title 1">
+            <a:extLst>
+              <a:ext uri="{FF2B5EF4-FFF2-40B4-BE49-F238E27FC236}">
+                <a16:creationId xmlns:a16="http://schemas.microsoft.com/office/drawing/2014/main" xmlns="" id="{47E09107-4194-4BB3-9118-E9B9EDF2C558}"/>
+              </a:ext>
+            </a:extLst>
+          </p:cNvPr>
+          <p:cNvSpPr>
+            <a:spLocks noGrp="1"/>
+          </p:cNvSpPr>
+          <p:nvPr>
+            <p:ph type="title"/>
+          </p:nvPr>
+        </p:nvSpPr>
+        <p:spPr/>
+        <p:txBody>
+          <a:bodyPr/>
+          <a:lstStyle/>
+          <a:p>
+            <a:r>
+              <a:rPr lang="en-US"/>
+              <a:t>Simple Motivating Example</a:t>
+            </a:r>
+          </a:p>
+        </p:txBody>
+      </p:sp>
+      <p:pic>
+        <p:nvPicPr>
+          <p:cNvPr id="4" name="Picture 3">
+            <a:extLst>
+              <a:ext uri="{FF2B5EF4-FFF2-40B4-BE49-F238E27FC236}">
+                <a16:creationId xmlns:a16="http://schemas.microsoft.com/office/drawing/2014/main" xmlns="" id="{A2CCD1F4-74E1-4EA7-93C2-50DD90CBF94E}"/>
+              </a:ext>
+            </a:extLst>
+          </p:cNvPr>
+          <p:cNvPicPr>
+            <a:picLocks noChangeAspect="1"/>
+          </p:cNvPicPr>
+          <p:nvPr/>
+        </p:nvPicPr>
+        <p:blipFill>
+          <a:blip r:embed="rId2"/>
+          <a:stretch>
+            <a:fillRect/>
+          </a:stretch>
+        </p:blipFill>
+        <p:spPr>
+          <a:xfrm>
+            <a:off x="1534736" y="2431522"/>
+            <a:ext cx="5805864" cy="2712500"/>
+          </a:xfrm>
+          <a:prstGeom prst="rect">
+            <a:avLst/>
+          </a:prstGeom>
+        </p:spPr>
+      </p:pic>
+    </p:spTree>
+    <p:extLst>
+      <p:ext uri="{BB962C8B-B14F-4D97-AF65-F5344CB8AC3E}">
+        <p14:creationId xmlns:p14="http://schemas.microsoft.com/office/powerpoint/2010/main" val="101288211"/>
+      </p:ext>
+    </p:extLst>
+  </p:cSld>
+  <p:clrMapOvr>
+    <a:masterClrMapping/>
+  </p:clrMapOvr>
+  <p:timing>
+    <p:tnLst>
+      <p:par>
+        <p:cTn id="1" dur="indefinite" restart="never" nodeType="tmRoot"/>
+      </p:par>
+    </p:tnLst>
+  </p:timing>
+</p:sld>
+</file>
+
+<file path=ppt/slides/slide3.xml><?xml version="1.0" encoding="utf-8"?>
+<p:sld xmlns:a="http://schemas.openxmlformats.org/drawingml/2006/main" xmlns:r="http://schemas.openxmlformats.org/officeDocument/2006/relationships" xmlns:p="http://schemas.openxmlformats.org/presentationml/2006/main">
+  <p:cSld>
+    <p:spTree>
+      <p:nvGrpSpPr>
+        <p:cNvPr id="1" name=""/>
+        <p:cNvGrpSpPr/>
+        <p:nvPr/>
+      </p:nvGrpSpPr>
+      <p:grpSpPr>
+        <a:xfrm>
+          <a:off x="0" y="0"/>
+          <a:ext cx="0" cy="0"/>
+          <a:chOff x="0" y="0"/>
+          <a:chExt cx="0" cy="0"/>
+        </a:xfrm>
+      </p:grpSpPr>
+      <p:sp>
+        <p:nvSpPr>
+          <p:cNvPr id="2" name="Title 1"/>
+          <p:cNvSpPr>
+            <a:spLocks noGrp="1"/>
+          </p:cNvSpPr>
+          <p:nvPr>
+            <p:ph type="title"/>
+          </p:nvPr>
+        </p:nvSpPr>
+        <p:spPr>
+          <a:xfrm>
+            <a:off x="400050" y="365126"/>
+            <a:ext cx="8515350" cy="1325563"/>
+          </a:xfrm>
+        </p:spPr>
+        <p:txBody>
+          <a:bodyPr/>
+          <a:lstStyle/>
+          <a:p>
+            <a:r>
+              <a:rPr lang="en-US"/>
+              <a:t>(More Complex) Motivating Example</a:t>
+            </a:r>
+            <a:endParaRPr lang="en-US" dirty="0"/>
+          </a:p>
+        </p:txBody>
+      </p:sp>
+      <p:pic>
+        <p:nvPicPr>
+          <p:cNvPr id="4" name="Content Placeholder 3"/>
+          <p:cNvPicPr>
+            <a:picLocks noGrp="1" noChangeAspect="1"/>
+          </p:cNvPicPr>
+          <p:nvPr>
+            <p:ph idx="1"/>
+          </p:nvPr>
+        </p:nvPicPr>
+        <p:blipFill>
+          <a:blip r:embed="rId2">
+            <a:extLst>
+              <a:ext uri="{28A0092B-C50C-407E-A947-70E740481C1C}">
+                <a14:useLocalDpi xmlns:a14="http://schemas.microsoft.com/office/drawing/2010/main" val="0"/>
+              </a:ext>
+            </a:extLst>
+          </a:blip>
+          <a:stretch>
+            <a:fillRect/>
+          </a:stretch>
+        </p:blipFill>
+        <p:spPr>
+          <a:xfrm>
+            <a:off x="805383" y="3266958"/>
+            <a:ext cx="5064078" cy="1642404"/>
+          </a:xfrm>
+        </p:spPr>
+      </p:pic>
+      <p:cxnSp>
+        <p:nvCxnSpPr>
+          <p:cNvPr id="5" name="Straight Arrow Connector 4">
+            <a:extLst>
+              <a:ext uri="{FF2B5EF4-FFF2-40B4-BE49-F238E27FC236}">
+                <a16:creationId xmlns:a16="http://schemas.microsoft.com/office/drawing/2014/main" xmlns="" id="{F462F756-659C-4710-82DE-942B1B17E5B8}"/>
+              </a:ext>
+            </a:extLst>
+          </p:cNvPr>
+          <p:cNvCxnSpPr>
+            <a:cxnSpLocks/>
+            <a:stCxn id="9" idx="1"/>
+          </p:cNvCxnSpPr>
+          <p:nvPr/>
+        </p:nvCxnSpPr>
+        <p:spPr>
+          <a:xfrm flipH="1">
+            <a:off x="3214037" y="2880640"/>
+            <a:ext cx="3227858" cy="749274"/>
+          </a:xfrm>
+          <a:prstGeom prst="straightConnector1">
+            <a:avLst/>
+          </a:prstGeom>
+          <a:ln w="28575">
+            <a:tailEnd type="triangle"/>
+          </a:ln>
+        </p:spPr>
+        <p:style>
+          <a:lnRef idx="1">
+            <a:schemeClr val="accent1"/>
+          </a:lnRef>
+          <a:fillRef idx="0">
+            <a:schemeClr val="accent1"/>
+          </a:fillRef>
+          <a:effectRef idx="0">
+            <a:schemeClr val="accent1"/>
+          </a:effectRef>
+          <a:fontRef idx="minor">
+            <a:schemeClr val="tx1"/>
+          </a:fontRef>
+        </p:style>
+      </p:cxnSp>
+      <p:cxnSp>
+        <p:nvCxnSpPr>
+          <p:cNvPr id="6" name="Straight Arrow Connector 5">
+            <a:extLst>
+              <a:ext uri="{FF2B5EF4-FFF2-40B4-BE49-F238E27FC236}">
+                <a16:creationId xmlns:a16="http://schemas.microsoft.com/office/drawing/2014/main" xmlns="" id="{2EB44B3D-A1BD-41F6-A459-EE6FE6AAF2B4}"/>
+              </a:ext>
+            </a:extLst>
+          </p:cNvPr>
+          <p:cNvCxnSpPr>
+            <a:cxnSpLocks/>
+            <a:stCxn id="10" idx="1"/>
+          </p:cNvCxnSpPr>
+          <p:nvPr/>
+        </p:nvCxnSpPr>
+        <p:spPr>
+          <a:xfrm flipH="1" flipV="1">
+            <a:off x="3821919" y="4720103"/>
+            <a:ext cx="2376960" cy="447418"/>
+          </a:xfrm>
+          <a:prstGeom prst="straightConnector1">
+            <a:avLst/>
+          </a:prstGeom>
+          <a:ln w="28575">
+            <a:tailEnd type="triangle"/>
+          </a:ln>
+        </p:spPr>
+        <p:style>
+          <a:lnRef idx="1">
+            <a:schemeClr val="accent1"/>
+          </a:lnRef>
+          <a:fillRef idx="0">
+            <a:schemeClr val="accent1"/>
+          </a:fillRef>
+          <a:effectRef idx="0">
+            <a:schemeClr val="accent1"/>
+          </a:effectRef>
+          <a:fontRef idx="minor">
+            <a:schemeClr val="tx1"/>
+          </a:fontRef>
+        </p:style>
+      </p:cxnSp>
+      <p:sp>
+        <p:nvSpPr>
+          <p:cNvPr id="9" name="TextBox 8">
+            <a:extLst>
+              <a:ext uri="{FF2B5EF4-FFF2-40B4-BE49-F238E27FC236}">
+                <a16:creationId xmlns:a16="http://schemas.microsoft.com/office/drawing/2014/main" xmlns="" id="{4BC24041-891F-4770-8AA2-5EE9E1E12059}"/>
+              </a:ext>
+            </a:extLst>
+          </p:cNvPr>
+          <p:cNvSpPr txBox="1"/>
+          <p:nvPr/>
+        </p:nvSpPr>
+        <p:spPr>
+          <a:xfrm>
+            <a:off x="6441895" y="2649807"/>
+            <a:ext cx="2043829" cy="461665"/>
+          </a:xfrm>
+          <a:prstGeom prst="rect">
+            <a:avLst/>
+          </a:prstGeom>
+          <a:noFill/>
+        </p:spPr>
+        <p:txBody>
+          <a:bodyPr wrap="none" rtlCol="0">
+            <a:spAutoFit/>
+          </a:bodyPr>
+          <a:lstStyle/>
+          <a:p>
+            <a:r>
+              <a:rPr lang="en-US" sz="2400"/>
+              <a:t>Event 1 anchor</a:t>
+            </a:r>
+          </a:p>
+        </p:txBody>
+      </p:sp>
+      <p:sp>
+        <p:nvSpPr>
+          <p:cNvPr id="10" name="TextBox 9">
+            <a:extLst>
+              <a:ext uri="{FF2B5EF4-FFF2-40B4-BE49-F238E27FC236}">
+                <a16:creationId xmlns:a16="http://schemas.microsoft.com/office/drawing/2014/main" xmlns="" id="{A4884E0B-0E26-42F8-A8BC-8ABAE815804F}"/>
+              </a:ext>
+            </a:extLst>
+          </p:cNvPr>
+          <p:cNvSpPr txBox="1"/>
+          <p:nvPr/>
+        </p:nvSpPr>
+        <p:spPr>
+          <a:xfrm>
+            <a:off x="6198879" y="4936688"/>
+            <a:ext cx="2043829" cy="461665"/>
+          </a:xfrm>
+          <a:prstGeom prst="rect">
+            <a:avLst/>
+          </a:prstGeom>
+          <a:noFill/>
+        </p:spPr>
+        <p:txBody>
+          <a:bodyPr wrap="none" rtlCol="0">
+            <a:spAutoFit/>
+          </a:bodyPr>
+          <a:lstStyle/>
+          <a:p>
+            <a:r>
+              <a:rPr lang="en-US" sz="2400"/>
+              <a:t>Event 2 anchor</a:t>
+            </a:r>
+          </a:p>
+        </p:txBody>
+      </p:sp>
+      <p:sp>
+        <p:nvSpPr>
+          <p:cNvPr id="11" name="TextBox 10">
+            <a:extLst>
+              <a:ext uri="{FF2B5EF4-FFF2-40B4-BE49-F238E27FC236}">
+                <a16:creationId xmlns:a16="http://schemas.microsoft.com/office/drawing/2014/main" xmlns="" id="{DECCFEC6-9813-4E58-B12C-F055AF0312C0}"/>
+              </a:ext>
+            </a:extLst>
+          </p:cNvPr>
+          <p:cNvSpPr txBox="1"/>
+          <p:nvPr/>
+        </p:nvSpPr>
+        <p:spPr>
+          <a:xfrm>
+            <a:off x="1460501" y="5614938"/>
+            <a:ext cx="4687437" cy="461665"/>
+          </a:xfrm>
+          <a:prstGeom prst="rect">
+            <a:avLst/>
+          </a:prstGeom>
+          <a:noFill/>
+        </p:spPr>
+        <p:txBody>
+          <a:bodyPr wrap="none" rtlCol="0">
+            <a:spAutoFit/>
+          </a:bodyPr>
+          <a:lstStyle/>
+          <a:p>
+            <a:r>
+              <a:rPr lang="en-US" sz="2400"/>
+              <a:t>Event 1 provides </a:t>
+            </a:r>
+            <a:r>
+              <a:rPr lang="en-US" sz="2400" b="1"/>
+              <a:t>context</a:t>
+            </a:r>
+            <a:r>
+              <a:rPr lang="en-US" sz="2400"/>
+              <a:t> for Event 2</a:t>
+            </a:r>
+          </a:p>
+        </p:txBody>
+      </p:sp>
+      <p:sp>
+        <p:nvSpPr>
+          <p:cNvPr id="15" name="TextBox 14">
+            <a:extLst>
+              <a:ext uri="{FF2B5EF4-FFF2-40B4-BE49-F238E27FC236}">
+                <a16:creationId xmlns:a16="http://schemas.microsoft.com/office/drawing/2014/main" xmlns="" id="{63849605-0246-411E-A2F1-308CC50FEB7C}"/>
+              </a:ext>
+            </a:extLst>
+          </p:cNvPr>
+          <p:cNvSpPr txBox="1"/>
+          <p:nvPr/>
+        </p:nvSpPr>
+        <p:spPr>
+          <a:xfrm>
+            <a:off x="1460501" y="2066187"/>
+            <a:ext cx="6220549" cy="461665"/>
+          </a:xfrm>
+          <a:prstGeom prst="rect">
+            <a:avLst/>
+          </a:prstGeom>
+          <a:noFill/>
+        </p:spPr>
+        <p:txBody>
+          <a:bodyPr wrap="none" rtlCol="0">
+            <a:spAutoFit/>
+          </a:bodyPr>
+          <a:lstStyle/>
+          <a:p>
+            <a:r>
+              <a:rPr lang="en-US" sz="2400" i="1"/>
+              <a:t>&lt;</a:t>
+            </a:r>
+            <a:r>
+              <a:rPr lang="en-US" sz="2400"/>
+              <a:t>Entities and spatio-temporal info are</a:t>
+            </a:r>
+            <a:r>
+              <a:rPr lang="en-US" sz="2400" i="1"/>
+              <a:t> italicized&gt;</a:t>
+            </a:r>
+          </a:p>
+        </p:txBody>
+      </p:sp>
+      <p:sp>
+        <p:nvSpPr>
+          <p:cNvPr id="3" name="Rectangle 2"/>
+          <p:cNvSpPr/>
+          <p:nvPr/>
+        </p:nvSpPr>
+        <p:spPr>
+          <a:xfrm>
+            <a:off x="1295400" y="3111472"/>
+            <a:ext cx="4258733" cy="1825216"/>
+          </a:xfrm>
+          <a:prstGeom prst="rect">
+            <a:avLst/>
+          </a:prstGeom>
+          <a:noFill/>
+          <a:ln>
+            <a:solidFill>
+              <a:srgbClr val="F80608"/>
+            </a:solidFill>
+          </a:ln>
+        </p:spPr>
+        <p:style>
+          <a:lnRef idx="2">
+            <a:schemeClr val="accent1">
+              <a:shade val="50000"/>
+            </a:schemeClr>
+          </a:lnRef>
+          <a:fillRef idx="1">
+            <a:schemeClr val="accent1"/>
+          </a:fillRef>
+          <a:effectRef idx="0">
+            <a:schemeClr val="accent1"/>
+          </a:effectRef>
+          <a:fontRef idx="minor">
+            <a:schemeClr val="lt1"/>
+          </a:fontRef>
+        </p:style>
+        <p:txBody>
+          <a:bodyPr rtlCol="0" anchor="ctr"/>
+          <a:lstStyle/>
+          <a:p>
+            <a:pPr algn="ctr"/>
+            <a:endParaRPr lang="en-US"/>
+          </a:p>
+        </p:txBody>
+      </p:sp>
+    </p:spTree>
+    <p:extLst>
+      <p:ext uri="{BB962C8B-B14F-4D97-AF65-F5344CB8AC3E}">
+        <p14:creationId xmlns:p14="http://schemas.microsoft.com/office/powerpoint/2010/main" val="628255729"/>
+      </p:ext>
+    </p:extLst>
+  </p:cSld>
+  <p:clrMapOvr>
+    <a:masterClrMapping/>
+  </p:clrMapOvr>
+  <p:timing>
+    <p:tnLst>
+      <p:par>
+        <p:cTn id="1" dur="indefinite" restart="never" nodeType="tmRoot"/>
+      </p:par>
+    </p:tnLst>
+  </p:timing>
+</p:sld>
+</file>
+
+<file path=ppt/slides/slide4.xml><?xml version="1.0" encoding="utf-8"?>
+<p:sld xmlns:a="http://schemas.openxmlformats.org/drawingml/2006/main" xmlns:r="http://schemas.openxmlformats.org/officeDocument/2006/relationships" xmlns:p="http://schemas.openxmlformats.org/presentationml/2006/main">
+  <p:cSld>
+    <p:spTree>
+      <p:nvGrpSpPr>
+        <p:cNvPr id="1" name=""/>
+        <p:cNvGrpSpPr/>
+        <p:nvPr/>
+      </p:nvGrpSpPr>
+      <p:grpSpPr>
+        <a:xfrm>
+          <a:off x="0" y="0"/>
+          <a:ext cx="0" cy="0"/>
+          <a:chOff x="0" y="0"/>
+          <a:chExt cx="0" cy="0"/>
+        </a:xfrm>
+      </p:grpSpPr>
+      <p:sp>
+        <p:nvSpPr>
+          <p:cNvPr id="2" name="Title 1"/>
+          <p:cNvSpPr>
+            <a:spLocks noGrp="1"/>
+          </p:cNvSpPr>
+          <p:nvPr>
+            <p:ph type="title"/>
+          </p:nvPr>
+        </p:nvSpPr>
+        <p:spPr/>
+        <p:txBody>
+          <a:bodyPr/>
+          <a:lstStyle/>
+          <a:p>
+            <a:r>
+              <a:rPr lang="en-US"/>
+              <a:t>Definition: Event Extraction</a:t>
+            </a:r>
+          </a:p>
+        </p:txBody>
+      </p:sp>
+      <p:sp>
+        <p:nvSpPr>
+          <p:cNvPr id="3" name="Content Placeholder 2"/>
+          <p:cNvSpPr>
+            <a:spLocks noGrp="1"/>
+          </p:cNvSpPr>
+          <p:nvPr>
+            <p:ph idx="1"/>
+          </p:nvPr>
+        </p:nvSpPr>
+        <p:spPr/>
+        <p:txBody>
+          <a:bodyPr/>
+          <a:lstStyle/>
+          <a:p>
+            <a:r>
+              <a:rPr lang="en-US"/>
+              <a:t>Given an </a:t>
+            </a:r>
+            <a:r>
+              <a:rPr lang="en-US" i="1"/>
+              <a:t>event ontology O</a:t>
+            </a:r>
+            <a:r>
+              <a:rPr lang="en-US"/>
+              <a:t>, and a text corpus of documents, </a:t>
+            </a:r>
+            <a:r>
+              <a:rPr lang="en-US" b="1"/>
+              <a:t>event extraction </a:t>
+            </a:r>
+            <a:r>
+              <a:rPr lang="en-US"/>
+              <a:t>is the problem of automatically extracting </a:t>
+            </a:r>
+            <a:r>
+              <a:rPr lang="en-US" i="1"/>
+              <a:t>instances</a:t>
+            </a:r>
+            <a:r>
+              <a:rPr lang="en-US"/>
+              <a:t> (‘events’) in terms of the </a:t>
+            </a:r>
+            <a:r>
+              <a:rPr lang="en-US" i="1"/>
+              <a:t>event classes </a:t>
+            </a:r>
+            <a:r>
+              <a:rPr lang="en-US"/>
+              <a:t>in </a:t>
+            </a:r>
+            <a:r>
+              <a:rPr lang="en-US" i="1"/>
+              <a:t>O</a:t>
+            </a:r>
+          </a:p>
+          <a:p>
+            <a:pPr lvl="1"/>
+            <a:r>
+              <a:rPr lang="en-US"/>
+              <a:t>Because of the ontology, events are structured representations amenable to querying/analytics</a:t>
+            </a:r>
+          </a:p>
+          <a:p>
+            <a:pPr lvl="1"/>
+            <a:r>
+              <a:rPr lang="en-US"/>
+              <a:t>What do real-world event ontologies ‘look’ like?</a:t>
+            </a:r>
+          </a:p>
+        </p:txBody>
+      </p:sp>
+    </p:spTree>
+    <p:extLst>
+      <p:ext uri="{BB962C8B-B14F-4D97-AF65-F5344CB8AC3E}">
+        <p14:creationId xmlns:p14="http://schemas.microsoft.com/office/powerpoint/2010/main" val="1680590766"/>
+      </p:ext>
+    </p:extLst>
+  </p:cSld>
+  <p:clrMapOvr>
+    <a:masterClrMapping/>
+  </p:clrMapOvr>
+  <p:timing>
+    <p:tnLst>
+      <p:par>
+        <p:cTn id="1" dur="indefinite" restart="never" nodeType="tmRoot"/>
+      </p:par>
+    </p:tnLst>
+  </p:timing>
+</p:sld>
+</file>
+
+<file path=ppt/slides/slide5.xml><?xml version="1.0" encoding="utf-8"?>
+<p:sld xmlns:a="http://schemas.openxmlformats.org/drawingml/2006/main" xmlns:r="http://schemas.openxmlformats.org/officeDocument/2006/relationships" xmlns:p="http://schemas.openxmlformats.org/presentationml/2006/main">
+  <p:cSld>
+    <p:spTree>
+      <p:nvGrpSpPr>
+        <p:cNvPr id="1" name=""/>
+        <p:cNvGrpSpPr/>
+        <p:nvPr/>
+      </p:nvGrpSpPr>
+      <p:grpSpPr>
+        <a:xfrm>
+          <a:off x="0" y="0"/>
+          <a:ext cx="0" cy="0"/>
+          <a:chOff x="0" y="0"/>
+          <a:chExt cx="0" cy="0"/>
+        </a:xfrm>
+      </p:grpSpPr>
+      <p:sp>
+        <p:nvSpPr>
+          <p:cNvPr id="2" name="Title 1"/>
+          <p:cNvSpPr>
+            <a:spLocks noGrp="1"/>
+          </p:cNvSpPr>
+          <p:nvPr>
+            <p:ph type="title"/>
+          </p:nvPr>
+        </p:nvSpPr>
+        <p:spPr/>
+        <p:txBody>
+          <a:bodyPr/>
+          <a:lstStyle/>
+          <a:p>
+            <a:r>
+              <a:rPr lang="en-US"/>
+              <a:t>Examples of event classes in CAMEO ontology</a:t>
+            </a:r>
+          </a:p>
+        </p:txBody>
+      </p:sp>
+      <p:pic>
+        <p:nvPicPr>
+          <p:cNvPr id="4" name="Content Placeholder 3"/>
+          <p:cNvPicPr>
+            <a:picLocks noGrp="1" noChangeAspect="1"/>
+          </p:cNvPicPr>
+          <p:nvPr>
+            <p:ph idx="1"/>
+          </p:nvPr>
+        </p:nvPicPr>
+        <p:blipFill>
+          <a:blip r:embed="rId2">
+            <a:extLst>
+              <a:ext uri="{28A0092B-C50C-407E-A947-70E740481C1C}">
+                <a14:useLocalDpi xmlns:a14="http://schemas.microsoft.com/office/drawing/2010/main" val="0"/>
+              </a:ext>
+            </a:extLst>
+          </a:blip>
+          <a:stretch>
+            <a:fillRect/>
+          </a:stretch>
+        </p:blipFill>
+        <p:spPr>
+          <a:xfrm>
+            <a:off x="103717" y="2226066"/>
+            <a:ext cx="4341283" cy="1989480"/>
+          </a:xfrm>
+        </p:spPr>
+      </p:pic>
+      <p:pic>
+        <p:nvPicPr>
+          <p:cNvPr id="5" name="Picture 4"/>
+          <p:cNvPicPr>
+            <a:picLocks noChangeAspect="1"/>
+          </p:cNvPicPr>
+          <p:nvPr/>
+        </p:nvPicPr>
+        <p:blipFill>
+          <a:blip r:embed="rId3">
+            <a:extLst>
+              <a:ext uri="{28A0092B-C50C-407E-A947-70E740481C1C}">
+                <a14:useLocalDpi xmlns:a14="http://schemas.microsoft.com/office/drawing/2010/main" val="0"/>
+              </a:ext>
+            </a:extLst>
+          </a:blip>
+          <a:stretch>
+            <a:fillRect/>
+          </a:stretch>
+        </p:blipFill>
+        <p:spPr>
+          <a:xfrm>
+            <a:off x="1548456" y="4373030"/>
+            <a:ext cx="6621878" cy="2118179"/>
+          </a:xfrm>
+          <a:prstGeom prst="rect">
+            <a:avLst/>
+          </a:prstGeom>
+        </p:spPr>
+      </p:pic>
+      <p:pic>
+        <p:nvPicPr>
+          <p:cNvPr id="6" name="Picture 5"/>
+          <p:cNvPicPr>
+            <a:picLocks noChangeAspect="1"/>
+          </p:cNvPicPr>
+          <p:nvPr/>
+        </p:nvPicPr>
+        <p:blipFill>
+          <a:blip r:embed="rId4">
+            <a:extLst>
+              <a:ext uri="{28A0092B-C50C-407E-A947-70E740481C1C}">
+                <a14:useLocalDpi xmlns:a14="http://schemas.microsoft.com/office/drawing/2010/main" val="0"/>
+              </a:ext>
+            </a:extLst>
+          </a:blip>
+          <a:stretch>
+            <a:fillRect/>
+          </a:stretch>
+        </p:blipFill>
+        <p:spPr>
+          <a:xfrm>
+            <a:off x="4445000" y="2226066"/>
+            <a:ext cx="4485900" cy="1995328"/>
+          </a:xfrm>
+          <a:prstGeom prst="rect">
+            <a:avLst/>
+          </a:prstGeom>
+        </p:spPr>
+      </p:pic>
+    </p:spTree>
+    <p:extLst>
+      <p:ext uri="{BB962C8B-B14F-4D97-AF65-F5344CB8AC3E}">
+        <p14:creationId xmlns:p14="http://schemas.microsoft.com/office/powerpoint/2010/main" val="1684918947"/>
+      </p:ext>
+    </p:extLst>
+  </p:cSld>
+  <p:clrMapOvr>
+    <a:masterClrMapping/>
+  </p:clrMapOvr>
+</p:sld>
+</file>
+
+<file path=ppt/slides/slide6.xml><?xml version="1.0" encoding="utf-8"?>
+<p:sld xmlns:a="http://schemas.openxmlformats.org/drawingml/2006/main" xmlns:r="http://schemas.openxmlformats.org/officeDocument/2006/relationships" xmlns:p="http://schemas.openxmlformats.org/presentationml/2006/main">
+  <p:cSld>
+    <p:spTree>
+      <p:nvGrpSpPr>
+        <p:cNvPr id="1" name=""/>
+        <p:cNvGrpSpPr/>
+        <p:nvPr/>
+      </p:nvGrpSpPr>
+      <p:grpSpPr>
+        <a:xfrm>
+          <a:off x="0" y="0"/>
+          <a:ext cx="0" cy="0"/>
+          <a:chOff x="0" y="0"/>
+          <a:chExt cx="0" cy="0"/>
+        </a:xfrm>
+      </p:grpSpPr>
+      <p:sp>
+        <p:nvSpPr>
+          <p:cNvPr id="2" name="Title 1"/>
+          <p:cNvSpPr>
+            <a:spLocks noGrp="1"/>
+          </p:cNvSpPr>
+          <p:nvPr>
+            <p:ph type="title"/>
+          </p:nvPr>
+        </p:nvSpPr>
+        <p:spPr/>
+        <p:txBody>
+          <a:bodyPr/>
+          <a:lstStyle/>
+          <a:p>
+            <a:r>
+              <a:rPr lang="en-US"/>
+              <a:t>Events involve entities, relations, triggers, verbs, modifiers</a:t>
+            </a:r>
+            <a:r>
+              <a:rPr lang="mr-IN"/>
+              <a:t>…</a:t>
+            </a:r>
+            <a:endParaRPr lang="en-US"/>
+          </a:p>
+        </p:txBody>
+      </p:sp>
+      <p:pic>
+        <p:nvPicPr>
+          <p:cNvPr id="4" name="Content Placeholder 3"/>
+          <p:cNvPicPr>
+            <a:picLocks noGrp="1" noChangeAspect="1"/>
+          </p:cNvPicPr>
+          <p:nvPr>
+            <p:ph idx="1"/>
+          </p:nvPr>
+        </p:nvPicPr>
+        <p:blipFill>
+          <a:blip r:embed="rId2">
+            <a:extLst>
+              <a:ext uri="{28A0092B-C50C-407E-A947-70E740481C1C}">
+                <a14:useLocalDpi xmlns:a14="http://schemas.microsoft.com/office/drawing/2010/main" val="0"/>
+              </a:ext>
+            </a:extLst>
+          </a:blip>
+          <a:stretch>
+            <a:fillRect/>
+          </a:stretch>
+        </p:blipFill>
+        <p:spPr>
+          <a:xfrm>
+            <a:off x="103717" y="2226066"/>
+            <a:ext cx="4341283" cy="1989480"/>
+          </a:xfrm>
+        </p:spPr>
+      </p:pic>
+      <p:pic>
+        <p:nvPicPr>
+          <p:cNvPr id="5" name="Picture 4"/>
+          <p:cNvPicPr>
+            <a:picLocks noChangeAspect="1"/>
+          </p:cNvPicPr>
+          <p:nvPr/>
+        </p:nvPicPr>
+        <p:blipFill>
+          <a:blip r:embed="rId3">
+            <a:extLst>
+              <a:ext uri="{28A0092B-C50C-407E-A947-70E740481C1C}">
+                <a14:useLocalDpi xmlns:a14="http://schemas.microsoft.com/office/drawing/2010/main" val="0"/>
+              </a:ext>
+            </a:extLst>
+          </a:blip>
+          <a:stretch>
+            <a:fillRect/>
+          </a:stretch>
+        </p:blipFill>
+        <p:spPr>
+          <a:xfrm>
+            <a:off x="1548456" y="4373030"/>
+            <a:ext cx="6621878" cy="2118179"/>
+          </a:xfrm>
+          <a:prstGeom prst="rect">
+            <a:avLst/>
+          </a:prstGeom>
+        </p:spPr>
+      </p:pic>
+      <p:pic>
+        <p:nvPicPr>
+          <p:cNvPr id="6" name="Picture 5"/>
+          <p:cNvPicPr>
+            <a:picLocks noChangeAspect="1"/>
+          </p:cNvPicPr>
+          <p:nvPr/>
+        </p:nvPicPr>
+        <p:blipFill>
+          <a:blip r:embed="rId4">
+            <a:extLst>
+              <a:ext uri="{28A0092B-C50C-407E-A947-70E740481C1C}">
+                <a14:useLocalDpi xmlns:a14="http://schemas.microsoft.com/office/drawing/2010/main" val="0"/>
+              </a:ext>
+            </a:extLst>
+          </a:blip>
+          <a:stretch>
+            <a:fillRect/>
+          </a:stretch>
+        </p:blipFill>
+        <p:spPr>
+          <a:xfrm>
+            <a:off x="4445000" y="2226066"/>
+            <a:ext cx="4485900" cy="1995328"/>
+          </a:xfrm>
+          <a:prstGeom prst="rect">
+            <a:avLst/>
+          </a:prstGeom>
+        </p:spPr>
+      </p:pic>
+      <p:sp>
+        <p:nvSpPr>
+          <p:cNvPr id="7" name="Rectangle 6">
+            <a:extLst>
+              <a:ext uri="{FF2B5EF4-FFF2-40B4-BE49-F238E27FC236}">
+                <a16:creationId xmlns="" xmlns:a16="http://schemas.microsoft.com/office/drawing/2014/main" id="{30DBC704-3387-4A5D-A8E1-6CA6EEB5ADF6}"/>
+              </a:ext>
+            </a:extLst>
+          </p:cNvPr>
+          <p:cNvSpPr/>
+          <p:nvPr/>
+        </p:nvSpPr>
+        <p:spPr>
+          <a:xfrm>
+            <a:off x="182880" y="1989667"/>
+            <a:ext cx="8748020" cy="2225879"/>
+          </a:xfrm>
+          <a:prstGeom prst="rect">
+            <a:avLst/>
+          </a:prstGeom>
+          <a:solidFill>
+            <a:schemeClr val="accent6">
+              <a:lumMod val="40000"/>
+              <a:lumOff val="60000"/>
+              <a:alpha val="93000"/>
+            </a:schemeClr>
+          </a:solidFill>
+          <a:ln>
+            <a:noFill/>
+          </a:ln>
+        </p:spPr>
+        <p:style>
+          <a:lnRef idx="2">
+            <a:schemeClr val="accent1">
+              <a:shade val="50000"/>
+            </a:schemeClr>
+          </a:lnRef>
+          <a:fillRef idx="1">
+            <a:schemeClr val="accent1"/>
+          </a:fillRef>
+          <a:effectRef idx="0">
+            <a:schemeClr val="accent1"/>
+          </a:effectRef>
+          <a:fontRef idx="minor">
+            <a:schemeClr val="lt1"/>
+          </a:fontRef>
+        </p:style>
+        <p:txBody>
+          <a:bodyPr rtlCol="0" anchor="ctr"/>
+          <a:lstStyle/>
+          <a:p>
+            <a:pPr marL="285750" indent="-285750">
+              <a:buFont typeface="Arial" charset="0"/>
+              <a:buChar char="•"/>
+            </a:pPr>
+            <a:r>
+              <a:rPr lang="en-US" sz="2000">
+                <a:solidFill>
+                  <a:schemeClr val="tx1"/>
+                </a:solidFill>
+              </a:rPr>
+              <a:t>A much harder problem than just extracting entities!</a:t>
+            </a:r>
+          </a:p>
+          <a:p>
+            <a:pPr marL="285750" indent="-285750">
+              <a:buFont typeface="Arial" charset="0"/>
+              <a:buChar char="•"/>
+            </a:pPr>
+            <a:r>
+              <a:rPr lang="en-US" sz="2000">
+                <a:solidFill>
+                  <a:schemeClr val="tx1"/>
+                </a:solidFill>
+              </a:rPr>
+              <a:t>Correctly classifying an extracted event with respect to an event type in ontologies like CAMEO (containing hundreds of types) also difficult</a:t>
+            </a:r>
+          </a:p>
+          <a:p>
+            <a:pPr marL="285750" indent="-285750">
+              <a:buFont typeface="Arial" charset="0"/>
+              <a:buChar char="•"/>
+            </a:pPr>
+            <a:r>
+              <a:rPr lang="en-US" sz="2000">
+                <a:solidFill>
+                  <a:schemeClr val="tx1"/>
+                </a:solidFill>
+              </a:rPr>
+              <a:t>Event co-reference resolution also a hard problem: F-measures well below 50% in state of the art systems </a:t>
+            </a:r>
+            <a:endParaRPr lang="en-US" sz="2000">
+              <a:solidFill>
+                <a:schemeClr val="tx1"/>
+              </a:solidFill>
+            </a:endParaRPr>
+          </a:p>
+        </p:txBody>
+      </p:sp>
+    </p:spTree>
+    <p:extLst>
+      <p:ext uri="{BB962C8B-B14F-4D97-AF65-F5344CB8AC3E}">
+        <p14:creationId xmlns:p14="http://schemas.microsoft.com/office/powerpoint/2010/main" val="146941717"/>
+      </p:ext>
+    </p:extLst>
+  </p:cSld>
+  <p:clrMapOvr>
+    <a:masterClrMapping/>
+  </p:clrMapOvr>
+</p:sld>
+</file>
+
+<file path=ppt/slides/slide7.xml><?xml version="1.0" encoding="utf-8"?>
+<p:sld xmlns:a="http://schemas.openxmlformats.org/drawingml/2006/main" xmlns:r="http://schemas.openxmlformats.org/officeDocument/2006/relationships" xmlns:p="http://schemas.openxmlformats.org/presentationml/2006/main">
+  <p:cSld>
+    <p:spTree>
+      <p:nvGrpSpPr>
+        <p:cNvPr id="1" name=""/>
+        <p:cNvGrpSpPr/>
+        <p:nvPr/>
+      </p:nvGrpSpPr>
+      <p:grpSpPr>
+        <a:xfrm>
+          <a:off x="0" y="0"/>
+          <a:ext cx="0" cy="0"/>
+          <a:chOff x="0" y="0"/>
+          <a:chExt cx="0" cy="0"/>
+        </a:xfrm>
+      </p:grpSpPr>
+      <p:sp>
+        <p:nvSpPr>
+          <p:cNvPr id="2" name="Title 1"/>
+          <p:cNvSpPr>
+            <a:spLocks noGrp="1"/>
+          </p:cNvSpPr>
+          <p:nvPr>
+            <p:ph type="title"/>
+          </p:nvPr>
+        </p:nvSpPr>
+        <p:spPr/>
+        <p:txBody>
+          <a:bodyPr/>
+          <a:lstStyle/>
+          <a:p>
+            <a:r>
+              <a:rPr lang="en-US"/>
+              <a:t>In Social Media</a:t>
+            </a:r>
+            <a:r>
+              <a:rPr lang="mr-IN"/>
+              <a:t>…</a:t>
+            </a:r>
+            <a:endParaRPr lang="en-US"/>
+          </a:p>
+        </p:txBody>
+      </p:sp>
+      <p:sp>
+        <p:nvSpPr>
+          <p:cNvPr id="3" name="Content Placeholder 2"/>
+          <p:cNvSpPr>
+            <a:spLocks noGrp="1"/>
+          </p:cNvSpPr>
+          <p:nvPr>
+            <p:ph idx="1"/>
+          </p:nvPr>
+        </p:nvSpPr>
+        <p:spPr/>
+        <p:txBody>
+          <a:bodyPr/>
+          <a:lstStyle/>
+          <a:p>
+            <a:r>
+              <a:rPr lang="en-US"/>
+              <a:t>Additional problem of first </a:t>
+            </a:r>
+            <a:r>
+              <a:rPr lang="en-US" b="1"/>
+              <a:t>detecting</a:t>
+            </a:r>
+            <a:r>
+              <a:rPr lang="en-US"/>
+              <a:t> whether the tweet is describing an event</a:t>
+            </a:r>
+          </a:p>
+          <a:p>
+            <a:pPr lvl="1"/>
+            <a:r>
+              <a:rPr lang="en-US"/>
+              <a:t>Can be defined as a binary classification problem: </a:t>
+            </a:r>
+            <a:r>
+              <a:rPr lang="en-US" i="1"/>
+              <a:t>does the tweet describe an event or not?</a:t>
+            </a:r>
+            <a:endParaRPr lang="en-US" i="1"/>
+          </a:p>
+          <a:p>
+            <a:r>
+              <a:rPr lang="en-US"/>
+              <a:t>Short text of tweet makes this essential for performance</a:t>
+            </a:r>
+          </a:p>
+          <a:p>
+            <a:r>
+              <a:rPr lang="en-US"/>
+              <a:t>Detection and extraction complement each other</a:t>
+            </a:r>
+          </a:p>
+          <a:p>
+            <a:pPr lvl="1"/>
+            <a:r>
+              <a:rPr lang="en-US"/>
+              <a:t>Forces us to decide what an event really is, for the purposes of extraction/detection/inference</a:t>
+            </a:r>
+          </a:p>
+        </p:txBody>
+      </p:sp>
+    </p:spTree>
+    <p:extLst>
+      <p:ext uri="{BB962C8B-B14F-4D97-AF65-F5344CB8AC3E}">
+        <p14:creationId xmlns:p14="http://schemas.microsoft.com/office/powerpoint/2010/main" val="260022398"/>
+      </p:ext>
+    </p:extLst>
+  </p:cSld>
+  <p:clrMapOvr>
+    <a:masterClrMapping/>
+  </p:clrMapOvr>
+</p:sld>
+</file>
+
+<file path=ppt/slides/slide8.xml><?xml version="1.0" encoding="utf-8"?>
+<p:sld xmlns:a="http://schemas.openxmlformats.org/drawingml/2006/main" xmlns:r="http://schemas.openxmlformats.org/officeDocument/2006/relationships" xmlns:p="http://schemas.openxmlformats.org/presentationml/2006/main">
+  <p:cSld>
+    <p:spTree>
+      <p:nvGrpSpPr>
+        <p:cNvPr id="1" name=""/>
+        <p:cNvGrpSpPr/>
+        <p:nvPr/>
+      </p:nvGrpSpPr>
+      <p:grpSpPr>
+        <a:xfrm>
+          <a:off x="0" y="0"/>
+          <a:ext cx="0" cy="0"/>
+          <a:chOff x="0" y="0"/>
+          <a:chExt cx="0" cy="0"/>
+        </a:xfrm>
+      </p:grpSpPr>
+      <p:sp>
+        <p:nvSpPr>
+          <p:cNvPr id="2" name="Title 1">
+            <a:extLst>
+              <a:ext uri="{FF2B5EF4-FFF2-40B4-BE49-F238E27FC236}">
+                <a16:creationId xmlns:a16="http://schemas.microsoft.com/office/drawing/2014/main" xmlns="" id="{789F0914-9F89-48D5-A04A-EB8506D20677}"/>
+              </a:ext>
+            </a:extLst>
+          </p:cNvPr>
+          <p:cNvSpPr>
+            <a:spLocks noGrp="1"/>
+          </p:cNvSpPr>
+          <p:nvPr>
+            <p:ph type="title"/>
+          </p:nvPr>
+        </p:nvSpPr>
+        <p:spPr>
+          <a:xfrm>
+            <a:off x="289560" y="365126"/>
+            <a:ext cx="8686800" cy="1325563"/>
+          </a:xfrm>
+        </p:spPr>
+        <p:txBody>
+          <a:bodyPr/>
+          <a:lstStyle/>
+          <a:p>
+            <a:r>
+              <a:rPr lang="en-US"/>
+              <a:t>Event Detection in Twitter: Examples</a:t>
+            </a:r>
+          </a:p>
+        </p:txBody>
+      </p:sp>
+      <p:sp>
+        <p:nvSpPr>
+          <p:cNvPr id="5" name="Rectangle 4">
+            <a:extLst>
+              <a:ext uri="{FF2B5EF4-FFF2-40B4-BE49-F238E27FC236}">
+                <a16:creationId xmlns:a16="http://schemas.microsoft.com/office/drawing/2014/main" xmlns="" id="{D5F8127B-3EAF-4D79-B961-9CDCF5DA2CA6}"/>
+              </a:ext>
+            </a:extLst>
+          </p:cNvPr>
+          <p:cNvSpPr/>
+          <p:nvPr/>
+        </p:nvSpPr>
+        <p:spPr>
+          <a:xfrm>
+            <a:off x="735330" y="3295596"/>
+            <a:ext cx="8012430" cy="1200329"/>
+          </a:xfrm>
+          <a:prstGeom prst="rect">
+            <a:avLst/>
+          </a:prstGeom>
+        </p:spPr>
+        <p:txBody>
+          <a:bodyPr wrap="square">
+            <a:spAutoFit/>
+          </a:bodyPr>
+          <a:lstStyle/>
+          <a:p>
+            <a:r>
+              <a:rPr lang="en-US" sz="2400" dirty="0"/>
+              <a:t>RT </a:t>
+            </a:r>
+            <a:r>
+              <a:rPr lang="en-US" sz="2400" dirty="0">
+                <a:solidFill>
+                  <a:srgbClr val="0070C0"/>
+                </a:solidFill>
+              </a:rPr>
+              <a:t>@Stump4TrumpPAC</a:t>
+            </a:r>
+            <a:r>
+              <a:rPr lang="en-US" sz="2400" dirty="0"/>
+              <a:t>: These are the 58 people killed in the Las Vegas massacre, the deadliest mass shooting in modern U.S. history.. 💐🙏🏻 http…</a:t>
+            </a:r>
+          </a:p>
+        </p:txBody>
+      </p:sp>
+      <p:sp>
+        <p:nvSpPr>
+          <p:cNvPr id="6" name="Rectangle 5">
+            <a:extLst>
+              <a:ext uri="{FF2B5EF4-FFF2-40B4-BE49-F238E27FC236}">
+                <a16:creationId xmlns:a16="http://schemas.microsoft.com/office/drawing/2014/main" xmlns="" id="{1B041536-BBFD-40FB-8C12-11420F37DDEA}"/>
+              </a:ext>
+            </a:extLst>
+          </p:cNvPr>
+          <p:cNvSpPr/>
+          <p:nvPr/>
+        </p:nvSpPr>
+        <p:spPr>
+          <a:xfrm>
+            <a:off x="735330" y="4819140"/>
+            <a:ext cx="8016239" cy="1200329"/>
+          </a:xfrm>
+          <a:prstGeom prst="rect">
+            <a:avLst/>
+          </a:prstGeom>
+        </p:spPr>
+        <p:txBody>
+          <a:bodyPr wrap="square">
+            <a:spAutoFit/>
+          </a:bodyPr>
+          <a:lstStyle/>
+          <a:p>
+            <a:r>
+              <a:rPr lang="en-US" sz="2400" dirty="0"/>
+              <a:t>RT </a:t>
+            </a:r>
+            <a:r>
+              <a:rPr lang="en-US" sz="2400" dirty="0">
+                <a:solidFill>
+                  <a:srgbClr val="0070C0"/>
+                </a:solidFill>
+              </a:rPr>
+              <a:t>@</a:t>
+            </a:r>
+            <a:r>
+              <a:rPr lang="en-US" sz="2400" dirty="0" err="1">
+                <a:solidFill>
+                  <a:srgbClr val="0070C0"/>
+                </a:solidFill>
+              </a:rPr>
+              <a:t>dragoner_JP</a:t>
+            </a:r>
+            <a:r>
+              <a:rPr lang="en-US" sz="2400" dirty="0"/>
+              <a:t>: うげえ……「ラスベガス銃撃の(カナダ人)犠牲者が巨額の医療費に直面」→ Las Vegas shooting victims facing large medical bills </a:t>
+            </a:r>
+            <a:r>
+              <a:rPr lang="en-US" sz="2400" dirty="0">
+                <a:solidFill>
+                  <a:srgbClr val="0070C0"/>
+                </a:solidFill>
+              </a:rPr>
+              <a:t>https://</a:t>
+            </a:r>
+            <a:r>
+              <a:rPr lang="en-US" sz="2400" dirty="0" err="1">
+                <a:solidFill>
+                  <a:srgbClr val="0070C0"/>
+                </a:solidFill>
+              </a:rPr>
+              <a:t>t.co</a:t>
+            </a:r>
+            <a:r>
+              <a:rPr lang="en-US" sz="2400" dirty="0">
+                <a:solidFill>
+                  <a:srgbClr val="0070C0"/>
+                </a:solidFill>
+              </a:rPr>
+              <a:t>/1F3bgH17Jv</a:t>
+            </a:r>
+          </a:p>
+        </p:txBody>
+      </p:sp>
+      <p:sp>
+        <p:nvSpPr>
+          <p:cNvPr id="7" name="Rectangle 6">
+            <a:extLst>
+              <a:ext uri="{FF2B5EF4-FFF2-40B4-BE49-F238E27FC236}">
+                <a16:creationId xmlns:a16="http://schemas.microsoft.com/office/drawing/2014/main" xmlns="" id="{D5F8127B-3EAF-4D79-B961-9CDCF5DA2CA6}"/>
+              </a:ext>
+            </a:extLst>
+          </p:cNvPr>
+          <p:cNvSpPr/>
+          <p:nvPr/>
+        </p:nvSpPr>
+        <p:spPr>
+          <a:xfrm>
+            <a:off x="735330" y="1772052"/>
+            <a:ext cx="8012430" cy="1200329"/>
+          </a:xfrm>
+          <a:prstGeom prst="rect">
+            <a:avLst/>
+          </a:prstGeom>
+        </p:spPr>
+        <p:txBody>
+          <a:bodyPr wrap="square">
+            <a:spAutoFit/>
+          </a:bodyPr>
+          <a:lstStyle/>
+          <a:p>
+            <a:r>
+              <a:rPr lang="en-US" sz="2400" dirty="0"/>
+              <a:t>RT </a:t>
+            </a:r>
+            <a:r>
+              <a:rPr lang="en-US" sz="2400" dirty="0">
+                <a:solidFill>
+                  <a:srgbClr val="0070C0"/>
+                </a:solidFill>
+              </a:rPr>
+              <a:t>@jc_stubbs</a:t>
+            </a:r>
+            <a:r>
+              <a:rPr lang="en-US" sz="2400" dirty="0"/>
+              <a:t>: Another tragic day in </a:t>
+            </a:r>
+            <a:r>
+              <a:rPr lang="en-US" sz="2400" dirty="0">
+                <a:solidFill>
+                  <a:srgbClr val="0070C0"/>
+                </a:solidFill>
+              </a:rPr>
+              <a:t>#Ukraine </a:t>
+            </a:r>
+            <a:r>
+              <a:rPr lang="mr-IN" sz="2400" dirty="0"/>
+              <a:t>–</a:t>
+            </a:r>
+            <a:r>
+              <a:rPr lang="en-US" sz="2400" dirty="0"/>
+              <a:t> More than 50 rebels killed as new leader unleashes assault: </a:t>
+            </a:r>
+            <a:r>
+              <a:rPr lang="en-US" sz="2400" dirty="0">
+                <a:solidFill>
+                  <a:srgbClr val="0070C0"/>
+                </a:solidFill>
+              </a:rPr>
+              <a:t>http://t.co/wcfU3kyAFX</a:t>
+            </a:r>
+          </a:p>
+        </p:txBody>
+      </p:sp>
+    </p:spTree>
+    <p:extLst>
+      <p:ext uri="{BB962C8B-B14F-4D97-AF65-F5344CB8AC3E}">
+        <p14:creationId xmlns:p14="http://schemas.microsoft.com/office/powerpoint/2010/main" val="1556995143"/>
       </p:ext>
     </p:extLst>
   </p:cSld>
@@ -6471,23 +7273,16 @@
             <p:ph type="title"/>
           </p:nvPr>
         </p:nvSpPr>
-        <p:spPr>
-          <a:xfrm>
-            <a:off x="146050" y="603252"/>
-            <a:ext cx="8743950" cy="1325563"/>
-          </a:xfrm>
-        </p:spPr>
-        <p:txBody>
-          <a:bodyPr>
-            <a:normAutofit/>
-          </a:bodyPr>
-          <a:lstStyle/>
-          <a:p>
-            <a:r>
-              <a:rPr lang="en-US" sz="4000"/>
-              <a:t>Event Detection in Twitter: A Taxonomy</a:t>
-            </a:r>
-            <a:endParaRPr lang="en-US" sz="4000" dirty="0"/>
+        <p:spPr/>
+        <p:txBody>
+          <a:bodyPr/>
+          <a:lstStyle/>
+          <a:p>
+            <a:r>
+              <a:rPr lang="en-US"/>
+              <a:t>An Example Workflow</a:t>
+            </a:r>
+            <a:endParaRPr lang="en-US" dirty="0"/>
           </a:p>
         </p:txBody>
       </p:sp>
@@ -6496,7 +7291,7 @@
           <p:cNvPr id="4" name="Picture 3">
             <a:extLst>
               <a:ext uri="{FF2B5EF4-FFF2-40B4-BE49-F238E27FC236}">
-                <a16:creationId xmlns="" xmlns:a16="http://schemas.microsoft.com/office/drawing/2014/main" id="{0B14148A-CDBC-4010-8E64-009C4BA6BA7A}"/>
+                <a16:creationId xmlns:a16="http://schemas.microsoft.com/office/drawing/2014/main" xmlns="" id="{A5FA5E3F-93A3-49D6-87CB-54DA033C241C}"/>
               </a:ext>
             </a:extLst>
           </p:cNvPr>
@@ -6513,8 +7308,8 @@
         </p:blipFill>
         <p:spPr>
           <a:xfrm>
-            <a:off x="146050" y="2233614"/>
-            <a:ext cx="8455250" cy="4141785"/>
+            <a:off x="1468967" y="1825625"/>
+            <a:ext cx="6206066" cy="3955624"/>
           </a:xfrm>
           <a:prstGeom prst="rect">
             <a:avLst/>
@@ -6524,7 +7319,7 @@
     </p:spTree>
     <p:extLst>
       <p:ext uri="{BB962C8B-B14F-4D97-AF65-F5344CB8AC3E}">
-        <p14:creationId xmlns:p14="http://schemas.microsoft.com/office/powerpoint/2010/main" val="351011376"/>
+        <p14:creationId xmlns:p14="http://schemas.microsoft.com/office/powerpoint/2010/main" val="569283612"/>
       </p:ext>
     </p:extLst>
   </p:cSld>

</xml_diff>

<commit_message>
made changes to event extraction slides
</commit_message>
<xml_diff>
--- a/slides/pptx/5-event-extraction.pptx
+++ b/slides/pptx/5-event-extraction.pptx
@@ -5,26 +5,29 @@
     <p:sldMasterId id="2147483660" r:id="rId1"/>
   </p:sldMasterIdLst>
   <p:notesMasterIdLst>
-    <p:notesMasterId r:id="rId19"/>
+    <p:notesMasterId r:id="rId22"/>
   </p:notesMasterIdLst>
   <p:sldIdLst>
     <p:sldId id="332" r:id="rId2"/>
     <p:sldId id="333" r:id="rId3"/>
     <p:sldId id="334" r:id="rId4"/>
     <p:sldId id="347" r:id="rId5"/>
-    <p:sldId id="348" r:id="rId6"/>
-    <p:sldId id="349" r:id="rId7"/>
-    <p:sldId id="346" r:id="rId8"/>
-    <p:sldId id="340" r:id="rId9"/>
-    <p:sldId id="335" r:id="rId10"/>
-    <p:sldId id="337" r:id="rId11"/>
-    <p:sldId id="341" r:id="rId12"/>
-    <p:sldId id="342" r:id="rId13"/>
-    <p:sldId id="352" r:id="rId14"/>
-    <p:sldId id="351" r:id="rId15"/>
-    <p:sldId id="353" r:id="rId16"/>
-    <p:sldId id="339" r:id="rId17"/>
-    <p:sldId id="350" r:id="rId18"/>
+    <p:sldId id="354" r:id="rId6"/>
+    <p:sldId id="348" r:id="rId7"/>
+    <p:sldId id="349" r:id="rId8"/>
+    <p:sldId id="346" r:id="rId9"/>
+    <p:sldId id="340" r:id="rId10"/>
+    <p:sldId id="335" r:id="rId11"/>
+    <p:sldId id="355" r:id="rId12"/>
+    <p:sldId id="356" r:id="rId13"/>
+    <p:sldId id="337" r:id="rId14"/>
+    <p:sldId id="341" r:id="rId15"/>
+    <p:sldId id="342" r:id="rId16"/>
+    <p:sldId id="352" r:id="rId17"/>
+    <p:sldId id="351" r:id="rId18"/>
+    <p:sldId id="353" r:id="rId19"/>
+    <p:sldId id="339" r:id="rId20"/>
+    <p:sldId id="350" r:id="rId21"/>
   </p:sldIdLst>
   <p:sldSz cx="9144000" cy="6858000" type="screen4x3"/>
   <p:notesSz cx="6858000" cy="9144000"/>
@@ -213,7 +216,7 @@
           <a:p>
             <a:fld id="{BE1256C8-1BA4-4200-90F3-9413893DDEA5}" type="datetimeFigureOut">
               <a:rPr lang="en-US" smtClean="0"/>
-              <a:t>4/18/2018</a:t>
+              <a:t>4/19/18</a:t>
             </a:fld>
             <a:endParaRPr lang="en-US"/>
           </a:p>
@@ -722,7 +725,7 @@
           <a:p>
             <a:fld id="{9D3E0FAC-92B7-4344-B8CE-D78B9752AB0B}" type="slidenum">
               <a:rPr lang="en-US" smtClean="0"/>
-              <a:t>6</a:t>
+              <a:t>7</a:t>
             </a:fld>
             <a:endParaRPr lang="en-US"/>
           </a:p>
@@ -806,7 +809,7 @@
           <a:p>
             <a:fld id="{9D3E0FAC-92B7-4344-B8CE-D78B9752AB0B}" type="slidenum">
               <a:rPr lang="en-US" smtClean="0"/>
-              <a:t>8</a:t>
+              <a:t>9</a:t>
             </a:fld>
             <a:endParaRPr lang="en-US"/>
           </a:p>
@@ -893,7 +896,7 @@
           <a:p>
             <a:fld id="{9D3E0FAC-92B7-4344-B8CE-D78B9752AB0B}" type="slidenum">
               <a:rPr lang="en-US" smtClean="0"/>
-              <a:t>9</a:t>
+              <a:t>10</a:t>
             </a:fld>
             <a:endParaRPr lang="en-US"/>
           </a:p>
@@ -980,7 +983,7 @@
           <a:p>
             <a:fld id="{9D3E0FAC-92B7-4344-B8CE-D78B9752AB0B}" type="slidenum">
               <a:rPr lang="en-US" smtClean="0"/>
-              <a:t>11</a:t>
+              <a:t>14</a:t>
             </a:fld>
             <a:endParaRPr lang="en-US"/>
           </a:p>
@@ -1064,7 +1067,7 @@
           <a:p>
             <a:fld id="{9D3E0FAC-92B7-4344-B8CE-D78B9752AB0B}" type="slidenum">
               <a:rPr lang="en-US" smtClean="0"/>
-              <a:t>16</a:t>
+              <a:t>19</a:t>
             </a:fld>
             <a:endParaRPr lang="en-US"/>
           </a:p>
@@ -1214,7 +1217,7 @@
           <a:p>
             <a:fld id="{7CC7A2F6-2F19-4AE6-AE33-E09CFF174DCA}" type="datetimeFigureOut">
               <a:rPr lang="en-GB" smtClean="0"/>
-              <a:t>18/04/2018</a:t>
+              <a:t>19/04/2018</a:t>
             </a:fld>
             <a:endParaRPr lang="en-GB"/>
           </a:p>
@@ -1384,7 +1387,7 @@
           <a:p>
             <a:fld id="{7CC7A2F6-2F19-4AE6-AE33-E09CFF174DCA}" type="datetimeFigureOut">
               <a:rPr lang="en-GB" smtClean="0"/>
-              <a:t>18/04/2018</a:t>
+              <a:t>19/04/2018</a:t>
             </a:fld>
             <a:endParaRPr lang="en-GB"/>
           </a:p>
@@ -1564,7 +1567,7 @@
           <a:p>
             <a:fld id="{7CC7A2F6-2F19-4AE6-AE33-E09CFF174DCA}" type="datetimeFigureOut">
               <a:rPr lang="en-GB" smtClean="0"/>
-              <a:t>18/04/2018</a:t>
+              <a:t>19/04/2018</a:t>
             </a:fld>
             <a:endParaRPr lang="en-GB"/>
           </a:p>
@@ -1734,7 +1737,7 @@
           <a:p>
             <a:fld id="{7CC7A2F6-2F19-4AE6-AE33-E09CFF174DCA}" type="datetimeFigureOut">
               <a:rPr lang="en-GB" smtClean="0"/>
-              <a:t>18/04/2018</a:t>
+              <a:t>19/04/2018</a:t>
             </a:fld>
             <a:endParaRPr lang="en-GB"/>
           </a:p>
@@ -1978,7 +1981,7 @@
           <a:p>
             <a:fld id="{7CC7A2F6-2F19-4AE6-AE33-E09CFF174DCA}" type="datetimeFigureOut">
               <a:rPr lang="en-GB" smtClean="0"/>
-              <a:t>18/04/2018</a:t>
+              <a:t>19/04/2018</a:t>
             </a:fld>
             <a:endParaRPr lang="en-GB"/>
           </a:p>
@@ -2210,7 +2213,7 @@
           <a:p>
             <a:fld id="{7CC7A2F6-2F19-4AE6-AE33-E09CFF174DCA}" type="datetimeFigureOut">
               <a:rPr lang="en-GB" smtClean="0"/>
-              <a:t>18/04/2018</a:t>
+              <a:t>19/04/2018</a:t>
             </a:fld>
             <a:endParaRPr lang="en-GB"/>
           </a:p>
@@ -2577,7 +2580,7 @@
           <a:p>
             <a:fld id="{7CC7A2F6-2F19-4AE6-AE33-E09CFF174DCA}" type="datetimeFigureOut">
               <a:rPr lang="en-GB" smtClean="0"/>
-              <a:t>18/04/2018</a:t>
+              <a:t>19/04/2018</a:t>
             </a:fld>
             <a:endParaRPr lang="en-GB"/>
           </a:p>
@@ -2695,7 +2698,7 @@
           <a:p>
             <a:fld id="{7CC7A2F6-2F19-4AE6-AE33-E09CFF174DCA}" type="datetimeFigureOut">
               <a:rPr lang="en-GB" smtClean="0"/>
-              <a:t>18/04/2018</a:t>
+              <a:t>19/04/2018</a:t>
             </a:fld>
             <a:endParaRPr lang="en-GB"/>
           </a:p>
@@ -2790,7 +2793,7 @@
           <a:p>
             <a:fld id="{7CC7A2F6-2F19-4AE6-AE33-E09CFF174DCA}" type="datetimeFigureOut">
               <a:rPr lang="en-GB" smtClean="0"/>
-              <a:t>18/04/2018</a:t>
+              <a:t>19/04/2018</a:t>
             </a:fld>
             <a:endParaRPr lang="en-GB"/>
           </a:p>
@@ -3067,7 +3070,7 @@
           <a:p>
             <a:fld id="{7CC7A2F6-2F19-4AE6-AE33-E09CFF174DCA}" type="datetimeFigureOut">
               <a:rPr lang="en-GB" smtClean="0"/>
-              <a:t>18/04/2018</a:t>
+              <a:t>19/04/2018</a:t>
             </a:fld>
             <a:endParaRPr lang="en-GB"/>
           </a:p>
@@ -3324,7 +3327,7 @@
           <a:p>
             <a:fld id="{7CC7A2F6-2F19-4AE6-AE33-E09CFF174DCA}" type="datetimeFigureOut">
               <a:rPr lang="en-GB" smtClean="0"/>
-              <a:t>18/04/2018</a:t>
+              <a:t>19/04/2018</a:t>
             </a:fld>
             <a:endParaRPr lang="en-GB"/>
           </a:p>
@@ -3537,7 +3540,7 @@
           <a:p>
             <a:fld id="{7CC7A2F6-2F19-4AE6-AE33-E09CFF174DCA}" type="datetimeFigureOut">
               <a:rPr lang="en-GB" smtClean="0"/>
-              <a:t>18/04/2018</a:t>
+              <a:t>19/04/2018</a:t>
             </a:fld>
             <a:endParaRPr lang="en-GB"/>
           </a:p>
@@ -4897,10 +4900,458 @@
       </p:grpSpPr>
       <p:sp>
         <p:nvSpPr>
+          <p:cNvPr id="2" name="Title 1"/>
+          <p:cNvSpPr>
+            <a:spLocks noGrp="1"/>
+          </p:cNvSpPr>
+          <p:nvPr>
+            <p:ph type="title"/>
+          </p:nvPr>
+        </p:nvSpPr>
+        <p:spPr/>
+        <p:txBody>
+          <a:bodyPr/>
+          <a:lstStyle/>
+          <a:p>
+            <a:r>
+              <a:rPr lang="en-US"/>
+              <a:t>An Example Workflow</a:t>
+            </a:r>
+            <a:endParaRPr lang="en-US" dirty="0"/>
+          </a:p>
+        </p:txBody>
+      </p:sp>
+      <p:pic>
+        <p:nvPicPr>
+          <p:cNvPr id="4" name="Picture 3">
+            <a:extLst>
+              <a:ext uri="{FF2B5EF4-FFF2-40B4-BE49-F238E27FC236}">
+                <a16:creationId xmlns:a16="http://schemas.microsoft.com/office/drawing/2014/main" xmlns="" id="{A5FA5E3F-93A3-49D6-87CB-54DA033C241C}"/>
+              </a:ext>
+            </a:extLst>
+          </p:cNvPr>
+          <p:cNvPicPr>
+            <a:picLocks noChangeAspect="1"/>
+          </p:cNvPicPr>
+          <p:nvPr/>
+        </p:nvPicPr>
+        <p:blipFill>
+          <a:blip r:embed="rId3"/>
+          <a:stretch>
+            <a:fillRect/>
+          </a:stretch>
+        </p:blipFill>
+        <p:spPr>
+          <a:xfrm>
+            <a:off x="1468967" y="1825625"/>
+            <a:ext cx="6206066" cy="3955624"/>
+          </a:xfrm>
+          <a:prstGeom prst="rect">
+            <a:avLst/>
+          </a:prstGeom>
+        </p:spPr>
+      </p:pic>
+    </p:spTree>
+    <p:extLst>
+      <p:ext uri="{BB962C8B-B14F-4D97-AF65-F5344CB8AC3E}">
+        <p14:creationId xmlns:p14="http://schemas.microsoft.com/office/powerpoint/2010/main" val="569283612"/>
+      </p:ext>
+    </p:extLst>
+  </p:cSld>
+  <p:clrMapOvr>
+    <a:masterClrMapping/>
+  </p:clrMapOvr>
+</p:sld>
+</file>
+
+<file path=ppt/slides/slide11.xml><?xml version="1.0" encoding="utf-8"?>
+<p:sld xmlns:a="http://schemas.openxmlformats.org/drawingml/2006/main" xmlns:r="http://schemas.openxmlformats.org/officeDocument/2006/relationships" xmlns:p="http://schemas.openxmlformats.org/presentationml/2006/main">
+  <p:cSld>
+    <p:spTree>
+      <p:nvGrpSpPr>
+        <p:cNvPr id="1" name=""/>
+        <p:cNvGrpSpPr/>
+        <p:nvPr/>
+      </p:nvGrpSpPr>
+      <p:grpSpPr>
+        <a:xfrm>
+          <a:off x="0" y="0"/>
+          <a:ext cx="0" cy="0"/>
+          <a:chOff x="0" y="0"/>
+          <a:chExt cx="0" cy="0"/>
+        </a:xfrm>
+      </p:grpSpPr>
+      <p:sp>
+        <p:nvSpPr>
+          <p:cNvPr id="2" name="Title 1"/>
+          <p:cNvSpPr>
+            <a:spLocks noGrp="1"/>
+          </p:cNvSpPr>
+          <p:nvPr>
+            <p:ph type="title"/>
+          </p:nvPr>
+        </p:nvSpPr>
+        <p:spPr/>
+        <p:txBody>
+          <a:bodyPr/>
+          <a:lstStyle/>
+          <a:p>
+            <a:r>
+              <a:rPr lang="en-US"/>
+              <a:t>Event Extraction Sub-Problems</a:t>
+            </a:r>
+          </a:p>
+        </p:txBody>
+      </p:sp>
+      <p:sp>
+        <p:nvSpPr>
+          <p:cNvPr id="3" name="Content Placeholder 2"/>
+          <p:cNvSpPr>
+            <a:spLocks noGrp="1"/>
+          </p:cNvSpPr>
+          <p:nvPr>
+            <p:ph idx="1"/>
+          </p:nvPr>
+        </p:nvSpPr>
+        <p:spPr/>
+        <p:txBody>
+          <a:bodyPr>
+            <a:normAutofit fontScale="92500"/>
+          </a:bodyPr>
+          <a:lstStyle/>
+          <a:p>
+            <a:r>
+              <a:rPr lang="en-US"/>
+              <a:t>Extracting </a:t>
+            </a:r>
+            <a:r>
+              <a:rPr lang="en-US" i="1"/>
+              <a:t>entity mentions</a:t>
+            </a:r>
+          </a:p>
+          <a:p>
+            <a:r>
+              <a:rPr lang="en-US"/>
+              <a:t>Extracting </a:t>
+            </a:r>
+            <a:r>
+              <a:rPr lang="en-US" i="1"/>
+              <a:t>time expressions</a:t>
+            </a:r>
+            <a:r>
+              <a:rPr lang="en-US"/>
+              <a:t>, including dates, times of day</a:t>
+            </a:r>
+            <a:r>
+              <a:rPr lang="mr-IN"/>
+              <a:t>…</a:t>
+            </a:r>
+            <a:endParaRPr lang="en-US"/>
+          </a:p>
+          <a:p>
+            <a:r>
+              <a:rPr lang="en-US"/>
+              <a:t>Extracting </a:t>
+            </a:r>
+            <a:r>
+              <a:rPr lang="en-US" i="1"/>
+              <a:t>event mentions, </a:t>
+            </a:r>
+            <a:r>
+              <a:rPr lang="en-US"/>
+              <a:t>where a single event mention has </a:t>
+            </a:r>
+            <a:r>
+              <a:rPr lang="en-US" i="1"/>
+              <a:t>exactly one trigger</a:t>
+            </a:r>
+            <a:r>
+              <a:rPr lang="en-US"/>
+              <a:t>, and an </a:t>
+            </a:r>
+            <a:r>
+              <a:rPr lang="en-US" i="1"/>
+              <a:t>arbitrary </a:t>
+            </a:r>
+            <a:r>
+              <a:rPr lang="en-US"/>
+              <a:t>number of </a:t>
+            </a:r>
+            <a:r>
+              <a:rPr lang="en-US" i="1"/>
+              <a:t>arguments</a:t>
+            </a:r>
+          </a:p>
+          <a:p>
+            <a:pPr lvl="1"/>
+            <a:r>
+              <a:rPr lang="en-US"/>
+              <a:t>An event trigger (usually a verb or noun) is the </a:t>
+            </a:r>
+            <a:r>
+              <a:rPr lang="en-US" i="1"/>
+              <a:t>main word </a:t>
+            </a:r>
+            <a:r>
+              <a:rPr lang="en-US"/>
+              <a:t>that clearly expresses an </a:t>
+            </a:r>
+            <a:r>
+              <a:rPr lang="en-US" i="1"/>
+              <a:t>event occurrence</a:t>
+            </a:r>
+          </a:p>
+          <a:p>
+            <a:r>
+              <a:rPr lang="en-US"/>
+              <a:t>Extracting event arguments (roles), defined as </a:t>
+            </a:r>
+            <a:r>
+              <a:rPr lang="en-US" i="1"/>
+              <a:t>both </a:t>
+            </a:r>
+            <a:r>
+              <a:rPr lang="en-US"/>
+              <a:t>the entity mentions involved in an event (e.g., Baghdad) and their </a:t>
+            </a:r>
+            <a:r>
+              <a:rPr lang="en-US" i="1"/>
+              <a:t>relation </a:t>
+            </a:r>
+            <a:r>
+              <a:rPr lang="en-US"/>
+              <a:t>to the event (e.g., </a:t>
+            </a:r>
+            <a:r>
+              <a:rPr lang="en-US" i="1"/>
+              <a:t>Place</a:t>
+            </a:r>
+            <a:r>
+              <a:rPr lang="en-US"/>
+              <a:t>)</a:t>
+            </a:r>
+          </a:p>
+          <a:p>
+            <a:endParaRPr lang="en-US"/>
+          </a:p>
+        </p:txBody>
+      </p:sp>
+    </p:spTree>
+    <p:extLst>
+      <p:ext uri="{BB962C8B-B14F-4D97-AF65-F5344CB8AC3E}">
+        <p14:creationId xmlns:p14="http://schemas.microsoft.com/office/powerpoint/2010/main" val="1522685049"/>
+      </p:ext>
+    </p:extLst>
+  </p:cSld>
+  <p:clrMapOvr>
+    <a:masterClrMapping/>
+  </p:clrMapOvr>
+</p:sld>
+</file>
+
+<file path=ppt/slides/slide12.xml><?xml version="1.0" encoding="utf-8"?>
+<p:sld xmlns:a="http://schemas.openxmlformats.org/drawingml/2006/main" xmlns:r="http://schemas.openxmlformats.org/officeDocument/2006/relationships" xmlns:p="http://schemas.openxmlformats.org/presentationml/2006/main">
+  <p:cSld>
+    <p:spTree>
+      <p:nvGrpSpPr>
+        <p:cNvPr id="1" name=""/>
+        <p:cNvGrpSpPr/>
+        <p:nvPr/>
+      </p:nvGrpSpPr>
+      <p:grpSpPr>
+        <a:xfrm>
+          <a:off x="0" y="0"/>
+          <a:ext cx="0" cy="0"/>
+          <a:chOff x="0" y="0"/>
+          <a:chExt cx="0" cy="0"/>
+        </a:xfrm>
+      </p:grpSpPr>
+      <p:sp>
+        <p:nvSpPr>
+          <p:cNvPr id="2" name="Title 1"/>
+          <p:cNvSpPr>
+            <a:spLocks noGrp="1"/>
+          </p:cNvSpPr>
+          <p:nvPr>
+            <p:ph type="title"/>
+          </p:nvPr>
+        </p:nvSpPr>
+        <p:spPr/>
+        <p:txBody>
+          <a:bodyPr/>
+          <a:lstStyle/>
+          <a:p>
+            <a:r>
+              <a:rPr lang="en-US"/>
+              <a:t>Some Tasks Harder Than Others</a:t>
+            </a:r>
+          </a:p>
+        </p:txBody>
+      </p:sp>
+      <p:pic>
+        <p:nvPicPr>
+          <p:cNvPr id="4" name="Content Placeholder 3"/>
+          <p:cNvPicPr>
+            <a:picLocks noGrp="1" noChangeAspect="1"/>
+          </p:cNvPicPr>
+          <p:nvPr>
+            <p:ph idx="1"/>
+          </p:nvPr>
+        </p:nvPicPr>
+        <p:blipFill>
+          <a:blip r:embed="rId2">
+            <a:extLst>
+              <a:ext uri="{28A0092B-C50C-407E-A947-70E740481C1C}">
+                <a14:useLocalDpi xmlns:a14="http://schemas.microsoft.com/office/drawing/2010/main" val="0"/>
+              </a:ext>
+            </a:extLst>
+          </a:blip>
+          <a:stretch>
+            <a:fillRect/>
+          </a:stretch>
+        </p:blipFill>
+        <p:spPr>
+          <a:xfrm>
+            <a:off x="126741" y="2842570"/>
+            <a:ext cx="8890518" cy="3353565"/>
+          </a:xfrm>
+        </p:spPr>
+      </p:pic>
+      <p:sp>
+        <p:nvSpPr>
+          <p:cNvPr id="5" name="Rectangle 4"/>
+          <p:cNvSpPr/>
+          <p:nvPr/>
+        </p:nvSpPr>
+        <p:spPr>
+          <a:xfrm>
+            <a:off x="2806700" y="6156268"/>
+            <a:ext cx="3530600" cy="165101"/>
+          </a:xfrm>
+          <a:prstGeom prst="rect">
+            <a:avLst/>
+          </a:prstGeom>
+          <a:solidFill>
+            <a:schemeClr val="bg1"/>
+          </a:solidFill>
+          <a:ln>
+            <a:noFill/>
+          </a:ln>
+        </p:spPr>
+        <p:style>
+          <a:lnRef idx="2">
+            <a:schemeClr val="accent1">
+              <a:shade val="50000"/>
+            </a:schemeClr>
+          </a:lnRef>
+          <a:fillRef idx="1">
+            <a:schemeClr val="accent1"/>
+          </a:fillRef>
+          <a:effectRef idx="0">
+            <a:schemeClr val="accent1"/>
+          </a:effectRef>
+          <a:fontRef idx="minor">
+            <a:schemeClr val="lt1"/>
+          </a:fontRef>
+        </p:style>
+        <p:txBody>
+          <a:bodyPr rtlCol="0" anchor="ctr"/>
+          <a:lstStyle/>
+          <a:p>
+            <a:pPr algn="ctr"/>
+            <a:endParaRPr lang="en-US"/>
+          </a:p>
+        </p:txBody>
+      </p:sp>
+      <p:sp>
+        <p:nvSpPr>
+          <p:cNvPr id="6" name="Rectangle 5"/>
+          <p:cNvSpPr/>
+          <p:nvPr/>
+        </p:nvSpPr>
+        <p:spPr>
+          <a:xfrm>
+            <a:off x="832607" y="1517007"/>
+            <a:ext cx="7260834" cy="1200329"/>
+          </a:xfrm>
+          <a:prstGeom prst="rect">
+            <a:avLst/>
+          </a:prstGeom>
+        </p:spPr>
+        <p:txBody>
+          <a:bodyPr wrap="none">
+            <a:spAutoFit/>
+          </a:bodyPr>
+          <a:lstStyle/>
+          <a:p>
+            <a:pPr marL="457200" indent="-457200">
+              <a:buFont typeface="Arial" charset="0"/>
+              <a:buChar char="•"/>
+            </a:pPr>
+            <a:r>
+              <a:rPr lang="en-US" sz="2400"/>
+              <a:t>Blind test set based on ACE newswire</a:t>
+            </a:r>
+          </a:p>
+          <a:p>
+            <a:pPr marL="457200" indent="-457200">
+              <a:buFont typeface="Arial" charset="0"/>
+              <a:buChar char="•"/>
+            </a:pPr>
+            <a:r>
+              <a:rPr lang="en-US" sz="2400"/>
+              <a:t>Performance on social media much worse</a:t>
+            </a:r>
+          </a:p>
+          <a:p>
+            <a:pPr marL="457200" indent="-457200">
+              <a:buFont typeface="Arial" charset="0"/>
+              <a:buChar char="•"/>
+            </a:pPr>
+            <a:r>
+              <a:rPr lang="en-US" sz="2400"/>
+              <a:t>Even humans don’t do too well on role classification  </a:t>
+            </a:r>
+            <a:endParaRPr lang="en-US" sz="2400" i="1"/>
+          </a:p>
+        </p:txBody>
+      </p:sp>
+    </p:spTree>
+    <p:extLst>
+      <p:ext uri="{BB962C8B-B14F-4D97-AF65-F5344CB8AC3E}">
+        <p14:creationId xmlns:p14="http://schemas.microsoft.com/office/powerpoint/2010/main" val="1413672798"/>
+      </p:ext>
+    </p:extLst>
+  </p:cSld>
+  <p:clrMapOvr>
+    <a:masterClrMapping/>
+  </p:clrMapOvr>
+</p:sld>
+</file>
+
+<file path=ppt/slides/slide13.xml><?xml version="1.0" encoding="utf-8"?>
+<p:sld xmlns:a="http://schemas.openxmlformats.org/drawingml/2006/main" xmlns:r="http://schemas.openxmlformats.org/officeDocument/2006/relationships" xmlns:p="http://schemas.openxmlformats.org/presentationml/2006/main">
+  <p:cSld>
+    <p:spTree>
+      <p:nvGrpSpPr>
+        <p:cNvPr id="1" name=""/>
+        <p:cNvGrpSpPr/>
+        <p:nvPr/>
+      </p:nvGrpSpPr>
+      <p:grpSpPr>
+        <a:xfrm>
+          <a:off x="0" y="0"/>
+          <a:ext cx="0" cy="0"/>
+          <a:chOff x="0" y="0"/>
+          <a:chExt cx="0" cy="0"/>
+        </a:xfrm>
+      </p:grpSpPr>
+      <p:sp>
+        <p:nvSpPr>
           <p:cNvPr id="2" name="Title 1">
             <a:extLst>
               <a:ext uri="{FF2B5EF4-FFF2-40B4-BE49-F238E27FC236}">
-                <a16:creationId xmlns:a16="http://schemas.microsoft.com/office/drawing/2014/main" id="{D6B083CC-4209-47D3-8AFB-A755190E41BB}"/>
+                <a16:creationId xmlns:a16="http://schemas.microsoft.com/office/drawing/2014/main" xmlns="" id="{D6B083CC-4209-47D3-8AFB-A755190E41BB}"/>
               </a:ext>
             </a:extLst>
           </p:cNvPr>
@@ -4928,7 +5379,7 @@
           <p:cNvPr id="3" name="Content Placeholder 2">
             <a:extLst>
               <a:ext uri="{FF2B5EF4-FFF2-40B4-BE49-F238E27FC236}">
-                <a16:creationId xmlns:a16="http://schemas.microsoft.com/office/drawing/2014/main" id="{21A045AF-1B0C-473F-B2BD-16CC029381CC}"/>
+                <a16:creationId xmlns:a16="http://schemas.microsoft.com/office/drawing/2014/main" xmlns="" id="{21A045AF-1B0C-473F-B2BD-16CC029381CC}"/>
               </a:ext>
             </a:extLst>
           </p:cNvPr>
@@ -4991,7 +5442,7 @@
           <p:cNvPr id="4" name="Content Placeholder 2">
             <a:extLst>
               <a:ext uri="{FF2B5EF4-FFF2-40B4-BE49-F238E27FC236}">
-                <a16:creationId xmlns:a16="http://schemas.microsoft.com/office/drawing/2014/main" id="{560166D7-7B6D-4B68-B8AE-1C1CC6E70202}"/>
+                <a16:creationId xmlns:a16="http://schemas.microsoft.com/office/drawing/2014/main" xmlns="" id="{560166D7-7B6D-4B68-B8AE-1C1CC6E70202}"/>
               </a:ext>
             </a:extLst>
           </p:cNvPr>
@@ -5218,7 +5669,7 @@
           <p:cNvPr id="5" name="Arrow: Right 4">
             <a:extLst>
               <a:ext uri="{FF2B5EF4-FFF2-40B4-BE49-F238E27FC236}">
-                <a16:creationId xmlns:a16="http://schemas.microsoft.com/office/drawing/2014/main" id="{D1E8C985-9E37-43C2-AD20-259A38EF2B2D}"/>
+                <a16:creationId xmlns:a16="http://schemas.microsoft.com/office/drawing/2014/main" xmlns="" id="{D1E8C985-9E37-43C2-AD20-259A38EF2B2D}"/>
               </a:ext>
             </a:extLst>
           </p:cNvPr>
@@ -5269,7 +5720,7 @@
           <p:cNvPr id="7" name="Content Placeholder 2">
             <a:extLst>
               <a:ext uri="{FF2B5EF4-FFF2-40B4-BE49-F238E27FC236}">
-                <a16:creationId xmlns:a16="http://schemas.microsoft.com/office/drawing/2014/main" id="{5DE865FC-39D0-4B3E-808A-72F7CCD94CD8}"/>
+                <a16:creationId xmlns:a16="http://schemas.microsoft.com/office/drawing/2014/main" xmlns="" id="{5DE865FC-39D0-4B3E-808A-72F7CCD94CD8}"/>
               </a:ext>
             </a:extLst>
           </p:cNvPr>
@@ -5476,7 +5927,7 @@
           <p:cNvPr id="8" name="Arrow: Right 7">
             <a:extLst>
               <a:ext uri="{FF2B5EF4-FFF2-40B4-BE49-F238E27FC236}">
-                <a16:creationId xmlns:a16="http://schemas.microsoft.com/office/drawing/2014/main" id="{3AB65389-B784-4AB6-BC15-A38C68139767}"/>
+                <a16:creationId xmlns:a16="http://schemas.microsoft.com/office/drawing/2014/main" xmlns="" id="{3AB65389-B784-4AB6-BC15-A38C68139767}"/>
               </a:ext>
             </a:extLst>
           </p:cNvPr>
@@ -5527,7 +5978,7 @@
           <p:cNvPr id="9" name="TextBox 8">
             <a:extLst>
               <a:ext uri="{FF2B5EF4-FFF2-40B4-BE49-F238E27FC236}">
-                <a16:creationId xmlns:a16="http://schemas.microsoft.com/office/drawing/2014/main" id="{204BC1CD-1EE2-4208-818E-52B98A3ECF1E}"/>
+                <a16:creationId xmlns:a16="http://schemas.microsoft.com/office/drawing/2014/main" xmlns="" id="{204BC1CD-1EE2-4208-818E-52B98A3ECF1E}"/>
               </a:ext>
             </a:extLst>
           </p:cNvPr>
@@ -5575,7 +6026,7 @@
 </p:sld>
 </file>
 
-<file path=ppt/slides/slide11.xml><?xml version="1.0" encoding="utf-8"?>
+<file path=ppt/slides/slide14.xml><?xml version="1.0" encoding="utf-8"?>
 <p:sld xmlns:a="http://schemas.openxmlformats.org/drawingml/2006/main" xmlns:r="http://schemas.openxmlformats.org/officeDocument/2006/relationships" xmlns:p="http://schemas.openxmlformats.org/presentationml/2006/main">
   <p:cSld>
     <p:spTree>
@@ -5627,7 +6078,7 @@
           <p:cNvPr id="4" name="Picture 3">
             <a:extLst>
               <a:ext uri="{FF2B5EF4-FFF2-40B4-BE49-F238E27FC236}">
-                <a16:creationId xmlns:a16="http://schemas.microsoft.com/office/drawing/2014/main" id="{0B14148A-CDBC-4010-8E64-009C4BA6BA7A}"/>
+                <a16:creationId xmlns:a16="http://schemas.microsoft.com/office/drawing/2014/main" xmlns="" id="{0B14148A-CDBC-4010-8E64-009C4BA6BA7A}"/>
               </a:ext>
             </a:extLst>
           </p:cNvPr>
@@ -5707,7 +6158,7 @@
           <p:cNvPr id="5" name="TextBox 4">
             <a:extLst>
               <a:ext uri="{FF2B5EF4-FFF2-40B4-BE49-F238E27FC236}">
-                <a16:creationId xmlns:a16="http://schemas.microsoft.com/office/drawing/2014/main" id="{4507C763-8035-4578-80B5-FB9A63F2A85A}"/>
+                <a16:creationId xmlns:a16="http://schemas.microsoft.com/office/drawing/2014/main" xmlns="" id="{4507C763-8035-4578-80B5-FB9A63F2A85A}"/>
               </a:ext>
             </a:extLst>
           </p:cNvPr>
@@ -5776,7 +6227,7 @@
           <p:cNvPr id="6" name="TextBox 5">
             <a:extLst>
               <a:ext uri="{FF2B5EF4-FFF2-40B4-BE49-F238E27FC236}">
-                <a16:creationId xmlns:a16="http://schemas.microsoft.com/office/drawing/2014/main" id="{F03856F9-56A1-47D0-8C19-210D0A5CE5E0}"/>
+                <a16:creationId xmlns:a16="http://schemas.microsoft.com/office/drawing/2014/main" xmlns="" id="{F03856F9-56A1-47D0-8C19-210D0A5CE5E0}"/>
               </a:ext>
             </a:extLst>
           </p:cNvPr>
@@ -5824,7 +6275,7 @@
 </p:sld>
 </file>
 
-<file path=ppt/slides/slide12.xml><?xml version="1.0" encoding="utf-8"?>
+<file path=ppt/slides/slide15.xml><?xml version="1.0" encoding="utf-8"?>
 <p:sld xmlns:a="http://schemas.openxmlformats.org/drawingml/2006/main" xmlns:r="http://schemas.openxmlformats.org/officeDocument/2006/relationships" xmlns:p="http://schemas.openxmlformats.org/presentationml/2006/main">
   <p:cSld>
     <p:spTree>
@@ -5846,7 +6297,7 @@
           <p:cNvPr id="2" name="Title 1">
             <a:extLst>
               <a:ext uri="{FF2B5EF4-FFF2-40B4-BE49-F238E27FC236}">
-                <a16:creationId xmlns:a16="http://schemas.microsoft.com/office/drawing/2014/main" id="{F5EA10E8-179C-48CA-A962-83AC7A417653}"/>
+                <a16:creationId xmlns:a16="http://schemas.microsoft.com/office/drawing/2014/main" xmlns="" id="{F5EA10E8-179C-48CA-A962-83AC7A417653}"/>
               </a:ext>
             </a:extLst>
           </p:cNvPr>
@@ -5874,7 +6325,7 @@
           <p:cNvPr id="4" name="Picture 3">
             <a:extLst>
               <a:ext uri="{FF2B5EF4-FFF2-40B4-BE49-F238E27FC236}">
-                <a16:creationId xmlns:a16="http://schemas.microsoft.com/office/drawing/2014/main" id="{3B9B8793-346A-43E4-A56F-D565544760F6}"/>
+                <a16:creationId xmlns:a16="http://schemas.microsoft.com/office/drawing/2014/main" xmlns="" id="{3B9B8793-346A-43E4-A56F-D565544760F6}"/>
               </a:ext>
             </a:extLst>
           </p:cNvPr>
@@ -5904,7 +6355,7 @@
           <p:cNvPr id="5" name="TextBox 4">
             <a:extLst>
               <a:ext uri="{FF2B5EF4-FFF2-40B4-BE49-F238E27FC236}">
-                <a16:creationId xmlns:a16="http://schemas.microsoft.com/office/drawing/2014/main" id="{D0A91EA1-7BAA-4735-8ED1-BC46AD3776C9}"/>
+                <a16:creationId xmlns:a16="http://schemas.microsoft.com/office/drawing/2014/main" xmlns="" id="{D0A91EA1-7BAA-4735-8ED1-BC46AD3776C9}"/>
               </a:ext>
             </a:extLst>
           </p:cNvPr>
@@ -5953,7 +6404,7 @@
           <p:cNvPr id="6" name="TextBox 5">
             <a:extLst>
               <a:ext uri="{FF2B5EF4-FFF2-40B4-BE49-F238E27FC236}">
-                <a16:creationId xmlns:a16="http://schemas.microsoft.com/office/drawing/2014/main" id="{CA201DBD-31A6-4FD9-BDA0-F2352DC96A44}"/>
+                <a16:creationId xmlns:a16="http://schemas.microsoft.com/office/drawing/2014/main" xmlns="" id="{CA201DBD-31A6-4FD9-BDA0-F2352DC96A44}"/>
               </a:ext>
             </a:extLst>
           </p:cNvPr>
@@ -6001,7 +6452,7 @@
 </p:sld>
 </file>
 
-<file path=ppt/slides/slide13.xml><?xml version="1.0" encoding="utf-8"?>
+<file path=ppt/slides/slide16.xml><?xml version="1.0" encoding="utf-8"?>
 <p:sld xmlns:a="http://schemas.openxmlformats.org/drawingml/2006/main" xmlns:r="http://schemas.openxmlformats.org/officeDocument/2006/relationships" xmlns:p="http://schemas.openxmlformats.org/presentationml/2006/main">
   <p:cSld>
     <p:spTree>
@@ -6023,7 +6474,7 @@
           <p:cNvPr id="2" name="Title 1">
             <a:extLst>
               <a:ext uri="{FF2B5EF4-FFF2-40B4-BE49-F238E27FC236}">
-                <a16:creationId xmlns:a16="http://schemas.microsoft.com/office/drawing/2014/main" id="{D2E30C03-57D3-4E50-9234-BB15CDB00D06}"/>
+                <a16:creationId xmlns:a16="http://schemas.microsoft.com/office/drawing/2014/main" xmlns="" id="{D2E30C03-57D3-4E50-9234-BB15CDB00D06}"/>
               </a:ext>
             </a:extLst>
           </p:cNvPr>
@@ -6051,7 +6502,7 @@
           <p:cNvPr id="3" name="Content Placeholder 2">
             <a:extLst>
               <a:ext uri="{FF2B5EF4-FFF2-40B4-BE49-F238E27FC236}">
-                <a16:creationId xmlns:a16="http://schemas.microsoft.com/office/drawing/2014/main" id="{CE3A5C99-9574-4694-879F-E8E267AB6706}"/>
+                <a16:creationId xmlns:a16="http://schemas.microsoft.com/office/drawing/2014/main" xmlns="" id="{CE3A5C99-9574-4694-879F-E8E267AB6706}"/>
               </a:ext>
             </a:extLst>
           </p:cNvPr>
@@ -6098,7 +6549,7 @@
           <p:cNvPr id="4" name="TextBox 3">
             <a:extLst>
               <a:ext uri="{FF2B5EF4-FFF2-40B4-BE49-F238E27FC236}">
-                <a16:creationId xmlns:a16="http://schemas.microsoft.com/office/drawing/2014/main" id="{3AB6A18D-279B-478B-9723-802AFAA889CC}"/>
+                <a16:creationId xmlns:a16="http://schemas.microsoft.com/office/drawing/2014/main" xmlns="" id="{3AB6A18D-279B-478B-9723-802AFAA889CC}"/>
               </a:ext>
             </a:extLst>
           </p:cNvPr>
@@ -6146,7 +6597,7 @@
 </p:sld>
 </file>
 
-<file path=ppt/slides/slide14.xml><?xml version="1.0" encoding="utf-8"?>
+<file path=ppt/slides/slide17.xml><?xml version="1.0" encoding="utf-8"?>
 <p:sld xmlns:a="http://schemas.openxmlformats.org/drawingml/2006/main" xmlns:r="http://schemas.openxmlformats.org/officeDocument/2006/relationships" xmlns:p="http://schemas.openxmlformats.org/presentationml/2006/main">
   <p:cSld>
     <p:spTree>
@@ -6168,7 +6619,7 @@
           <p:cNvPr id="2" name="Title 1">
             <a:extLst>
               <a:ext uri="{FF2B5EF4-FFF2-40B4-BE49-F238E27FC236}">
-                <a16:creationId xmlns:a16="http://schemas.microsoft.com/office/drawing/2014/main" id="{D2E30C03-57D3-4E50-9234-BB15CDB00D06}"/>
+                <a16:creationId xmlns:a16="http://schemas.microsoft.com/office/drawing/2014/main" xmlns="" id="{D2E30C03-57D3-4E50-9234-BB15CDB00D06}"/>
               </a:ext>
             </a:extLst>
           </p:cNvPr>
@@ -6196,7 +6647,7 @@
           <p:cNvPr id="3" name="Content Placeholder 2">
             <a:extLst>
               <a:ext uri="{FF2B5EF4-FFF2-40B4-BE49-F238E27FC236}">
-                <a16:creationId xmlns:a16="http://schemas.microsoft.com/office/drawing/2014/main" id="{CE3A5C99-9574-4694-879F-E8E267AB6706}"/>
+                <a16:creationId xmlns:a16="http://schemas.microsoft.com/office/drawing/2014/main" xmlns="" id="{CE3A5C99-9574-4694-879F-E8E267AB6706}"/>
               </a:ext>
             </a:extLst>
           </p:cNvPr>
@@ -6229,7 +6680,7 @@
           <p:cNvPr id="4" name="TextBox 3">
             <a:extLst>
               <a:ext uri="{FF2B5EF4-FFF2-40B4-BE49-F238E27FC236}">
-                <a16:creationId xmlns:a16="http://schemas.microsoft.com/office/drawing/2014/main" id="{3AB6A18D-279B-478B-9723-802AFAA889CC}"/>
+                <a16:creationId xmlns:a16="http://schemas.microsoft.com/office/drawing/2014/main" xmlns="" id="{3AB6A18D-279B-478B-9723-802AFAA889CC}"/>
               </a:ext>
             </a:extLst>
           </p:cNvPr>
@@ -6269,7 +6720,7 @@
           <p:cNvPr id="5" name="Picture 4">
             <a:extLst>
               <a:ext uri="{FF2B5EF4-FFF2-40B4-BE49-F238E27FC236}">
-                <a16:creationId xmlns:a16="http://schemas.microsoft.com/office/drawing/2014/main" id="{BCC4866D-D367-47A7-A520-E685A7856334}"/>
+                <a16:creationId xmlns:a16="http://schemas.microsoft.com/office/drawing/2014/main" xmlns="" id="{BCC4866D-D367-47A7-A520-E685A7856334}"/>
               </a:ext>
             </a:extLst>
           </p:cNvPr>
@@ -6307,7 +6758,7 @@
 </p:sld>
 </file>
 
-<file path=ppt/slides/slide15.xml><?xml version="1.0" encoding="utf-8"?>
+<file path=ppt/slides/slide18.xml><?xml version="1.0" encoding="utf-8"?>
 <p:sld xmlns:a="http://schemas.openxmlformats.org/drawingml/2006/main" xmlns:r="http://schemas.openxmlformats.org/officeDocument/2006/relationships" xmlns:p="http://schemas.openxmlformats.org/presentationml/2006/main">
   <p:cSld>
     <p:spTree>
@@ -6329,7 +6780,7 @@
           <p:cNvPr id="2" name="Title 1">
             <a:extLst>
               <a:ext uri="{FF2B5EF4-FFF2-40B4-BE49-F238E27FC236}">
-                <a16:creationId xmlns:a16="http://schemas.microsoft.com/office/drawing/2014/main" id="{8AC3B40E-C981-49E2-87BA-1C9578187B92}"/>
+                <a16:creationId xmlns:a16="http://schemas.microsoft.com/office/drawing/2014/main" xmlns="" id="{8AC3B40E-C981-49E2-87BA-1C9578187B92}"/>
               </a:ext>
             </a:extLst>
           </p:cNvPr>
@@ -6357,7 +6808,7 @@
           <p:cNvPr id="3" name="Content Placeholder 2">
             <a:extLst>
               <a:ext uri="{FF2B5EF4-FFF2-40B4-BE49-F238E27FC236}">
-                <a16:creationId xmlns:a16="http://schemas.microsoft.com/office/drawing/2014/main" id="{B455FEAC-3E84-47C6-B4DC-C9E110802F31}"/>
+                <a16:creationId xmlns:a16="http://schemas.microsoft.com/office/drawing/2014/main" xmlns="" id="{B455FEAC-3E84-47C6-B4DC-C9E110802F31}"/>
               </a:ext>
             </a:extLst>
           </p:cNvPr>
@@ -6390,7 +6841,7 @@
           <p:cNvPr id="4" name="TextBox 3">
             <a:extLst>
               <a:ext uri="{FF2B5EF4-FFF2-40B4-BE49-F238E27FC236}">
-                <a16:creationId xmlns:a16="http://schemas.microsoft.com/office/drawing/2014/main" id="{DCE412F9-1200-481A-81D5-AB0FFEFC6BFA}"/>
+                <a16:creationId xmlns:a16="http://schemas.microsoft.com/office/drawing/2014/main" xmlns="" id="{DCE412F9-1200-481A-81D5-AB0FFEFC6BFA}"/>
               </a:ext>
             </a:extLst>
           </p:cNvPr>
@@ -6430,7 +6881,7 @@
           <p:cNvPr id="5" name="Picture 4">
             <a:extLst>
               <a:ext uri="{FF2B5EF4-FFF2-40B4-BE49-F238E27FC236}">
-                <a16:creationId xmlns:a16="http://schemas.microsoft.com/office/drawing/2014/main" id="{959FB340-7B65-4A14-8AE3-DDCA2B871AF8}"/>
+                <a16:creationId xmlns:a16="http://schemas.microsoft.com/office/drawing/2014/main" xmlns="" id="{959FB340-7B65-4A14-8AE3-DDCA2B871AF8}"/>
               </a:ext>
             </a:extLst>
           </p:cNvPr>
@@ -6468,7 +6919,7 @@
 </p:sld>
 </file>
 
-<file path=ppt/slides/slide16.xml><?xml version="1.0" encoding="utf-8"?>
+<file path=ppt/slides/slide19.xml><?xml version="1.0" encoding="utf-8"?>
 <p:sld xmlns:a="http://schemas.openxmlformats.org/drawingml/2006/main" xmlns:r="http://schemas.openxmlformats.org/officeDocument/2006/relationships" xmlns:p="http://schemas.openxmlformats.org/presentationml/2006/main">
   <p:cSld>
     <p:spTree>
@@ -6490,7 +6941,7 @@
           <p:cNvPr id="2" name="Title 1">
             <a:extLst>
               <a:ext uri="{FF2B5EF4-FFF2-40B4-BE49-F238E27FC236}">
-                <a16:creationId xmlns:a16="http://schemas.microsoft.com/office/drawing/2014/main" id="{8537C631-3420-40A0-B136-850967FD898E}"/>
+                <a16:creationId xmlns:a16="http://schemas.microsoft.com/office/drawing/2014/main" xmlns="" id="{8537C631-3420-40A0-B136-850967FD898E}"/>
               </a:ext>
             </a:extLst>
           </p:cNvPr>
@@ -6518,7 +6969,7 @@
           <p:cNvPr id="3" name="Content Placeholder 2">
             <a:extLst>
               <a:ext uri="{FF2B5EF4-FFF2-40B4-BE49-F238E27FC236}">
-                <a16:creationId xmlns:a16="http://schemas.microsoft.com/office/drawing/2014/main" id="{F1CD4C0B-C44A-44A7-B3C4-2460C4A5D01B}"/>
+                <a16:creationId xmlns:a16="http://schemas.microsoft.com/office/drawing/2014/main" xmlns="" id="{F1CD4C0B-C44A-44A7-B3C4-2460C4A5D01B}"/>
               </a:ext>
             </a:extLst>
           </p:cNvPr>
@@ -6582,106 +7033,6 @@
     <p:extLst>
       <p:ext uri="{BB962C8B-B14F-4D97-AF65-F5344CB8AC3E}">
         <p14:creationId xmlns:p14="http://schemas.microsoft.com/office/powerpoint/2010/main" val="874142107"/>
-      </p:ext>
-    </p:extLst>
-  </p:cSld>
-  <p:clrMapOvr>
-    <a:masterClrMapping/>
-  </p:clrMapOvr>
-</p:sld>
-</file>
-
-<file path=ppt/slides/slide17.xml><?xml version="1.0" encoding="utf-8"?>
-<p:sld xmlns:a="http://schemas.openxmlformats.org/drawingml/2006/main" xmlns:r="http://schemas.openxmlformats.org/officeDocument/2006/relationships" xmlns:p="http://schemas.openxmlformats.org/presentationml/2006/main">
-  <p:cSld>
-    <p:spTree>
-      <p:nvGrpSpPr>
-        <p:cNvPr id="1" name=""/>
-        <p:cNvGrpSpPr/>
-        <p:nvPr/>
-      </p:nvGrpSpPr>
-      <p:grpSpPr>
-        <a:xfrm>
-          <a:off x="0" y="0"/>
-          <a:ext cx="0" cy="0"/>
-          <a:chOff x="0" y="0"/>
-          <a:chExt cx="0" cy="0"/>
-        </a:xfrm>
-      </p:grpSpPr>
-      <p:sp>
-        <p:nvSpPr>
-          <p:cNvPr id="2" name="Title 1"/>
-          <p:cNvSpPr>
-            <a:spLocks noGrp="1"/>
-          </p:cNvSpPr>
-          <p:nvPr>
-            <p:ph type="title"/>
-          </p:nvPr>
-        </p:nvSpPr>
-        <p:spPr/>
-        <p:txBody>
-          <a:bodyPr/>
-          <a:lstStyle/>
-          <a:p>
-            <a:r>
-              <a:rPr lang="en-US"/>
-              <a:t>Summary</a:t>
-            </a:r>
-          </a:p>
-        </p:txBody>
-      </p:sp>
-      <p:sp>
-        <p:nvSpPr>
-          <p:cNvPr id="3" name="Content Placeholder 2"/>
-          <p:cNvSpPr>
-            <a:spLocks noGrp="1"/>
-          </p:cNvSpPr>
-          <p:nvPr>
-            <p:ph idx="1"/>
-          </p:nvPr>
-        </p:nvSpPr>
-        <p:spPr/>
-        <p:txBody>
-          <a:bodyPr>
-            <a:normAutofit fontScale="92500" lnSpcReduction="20000"/>
-          </a:bodyPr>
-          <a:lstStyle/>
-          <a:p>
-            <a:r>
-              <a:rPr lang="en-US"/>
-              <a:t>Event extraction is a difficult problem for which performance continues to be relatively poor (compared to NER)</a:t>
-            </a:r>
-          </a:p>
-          <a:p>
-            <a:r>
-              <a:rPr lang="en-US"/>
-              <a:t>Some sub-tasks (e.g., event trigger identification) tend to be easier than others (e.g., argument role classification)</a:t>
-            </a:r>
-          </a:p>
-          <a:p>
-            <a:r>
-              <a:rPr lang="en-US"/>
-              <a:t>Joint models have emerged as a solid choice for relatively clean text</a:t>
-            </a:r>
-          </a:p>
-          <a:p>
-            <a:r>
-              <a:rPr lang="en-US"/>
-              <a:t>Twitter presents new challenges that continue to be the subject of ongoing research</a:t>
-            </a:r>
-          </a:p>
-          <a:p>
-            <a:r>
-              <a:rPr lang="en-US"/>
-              <a:t>Techniques can be classified along many dimensions, depending on application, algorithm, inputs and outputs </a:t>
-            </a:r>
-          </a:p>
-        </p:txBody>
-      </p:sp>
-    </p:spTree>
-    <p:extLst>
-      <p:ext uri="{BB962C8B-B14F-4D97-AF65-F5344CB8AC3E}">
-        <p14:creationId xmlns:p14="http://schemas.microsoft.com/office/powerpoint/2010/main" val="396642358"/>
       </p:ext>
     </p:extLst>
   </p:cSld>
@@ -6713,7 +7064,7 @@
           <p:cNvPr id="2" name="Title 1">
             <a:extLst>
               <a:ext uri="{FF2B5EF4-FFF2-40B4-BE49-F238E27FC236}">
-                <a16:creationId xmlns:a16="http://schemas.microsoft.com/office/drawing/2014/main" id="{47E09107-4194-4BB3-9118-E9B9EDF2C558}"/>
+                <a16:creationId xmlns:a16="http://schemas.microsoft.com/office/drawing/2014/main" xmlns="" id="{47E09107-4194-4BB3-9118-E9B9EDF2C558}"/>
               </a:ext>
             </a:extLst>
           </p:cNvPr>
@@ -6741,7 +7092,7 @@
           <p:cNvPr id="4" name="Picture 3">
             <a:extLst>
               <a:ext uri="{FF2B5EF4-FFF2-40B4-BE49-F238E27FC236}">
-                <a16:creationId xmlns:a16="http://schemas.microsoft.com/office/drawing/2014/main" id="{A2CCD1F4-74E1-4EA7-93C2-50DD90CBF94E}"/>
+                <a16:creationId xmlns:a16="http://schemas.microsoft.com/office/drawing/2014/main" xmlns="" id="{A2CCD1F4-74E1-4EA7-93C2-50DD90CBF94E}"/>
               </a:ext>
             </a:extLst>
           </p:cNvPr>
@@ -6779,6 +7130,106 @@
 </p:sld>
 </file>
 
+<file path=ppt/slides/slide20.xml><?xml version="1.0" encoding="utf-8"?>
+<p:sld xmlns:a="http://schemas.openxmlformats.org/drawingml/2006/main" xmlns:r="http://schemas.openxmlformats.org/officeDocument/2006/relationships" xmlns:p="http://schemas.openxmlformats.org/presentationml/2006/main">
+  <p:cSld>
+    <p:spTree>
+      <p:nvGrpSpPr>
+        <p:cNvPr id="1" name=""/>
+        <p:cNvGrpSpPr/>
+        <p:nvPr/>
+      </p:nvGrpSpPr>
+      <p:grpSpPr>
+        <a:xfrm>
+          <a:off x="0" y="0"/>
+          <a:ext cx="0" cy="0"/>
+          <a:chOff x="0" y="0"/>
+          <a:chExt cx="0" cy="0"/>
+        </a:xfrm>
+      </p:grpSpPr>
+      <p:sp>
+        <p:nvSpPr>
+          <p:cNvPr id="2" name="Title 1"/>
+          <p:cNvSpPr>
+            <a:spLocks noGrp="1"/>
+          </p:cNvSpPr>
+          <p:nvPr>
+            <p:ph type="title"/>
+          </p:nvPr>
+        </p:nvSpPr>
+        <p:spPr/>
+        <p:txBody>
+          <a:bodyPr/>
+          <a:lstStyle/>
+          <a:p>
+            <a:r>
+              <a:rPr lang="en-US"/>
+              <a:t>Summary</a:t>
+            </a:r>
+          </a:p>
+        </p:txBody>
+      </p:sp>
+      <p:sp>
+        <p:nvSpPr>
+          <p:cNvPr id="3" name="Content Placeholder 2"/>
+          <p:cNvSpPr>
+            <a:spLocks noGrp="1"/>
+          </p:cNvSpPr>
+          <p:nvPr>
+            <p:ph idx="1"/>
+          </p:nvPr>
+        </p:nvSpPr>
+        <p:spPr/>
+        <p:txBody>
+          <a:bodyPr>
+            <a:normAutofit fontScale="92500" lnSpcReduction="20000"/>
+          </a:bodyPr>
+          <a:lstStyle/>
+          <a:p>
+            <a:r>
+              <a:rPr lang="en-US"/>
+              <a:t>Event extraction is a difficult problem for which performance continues to be relatively poor (compared to NER)</a:t>
+            </a:r>
+          </a:p>
+          <a:p>
+            <a:r>
+              <a:rPr lang="en-US"/>
+              <a:t>Some sub-tasks (e.g., event trigger identification) tend to be easier than others (e.g., argument role classification)</a:t>
+            </a:r>
+          </a:p>
+          <a:p>
+            <a:r>
+              <a:rPr lang="en-US"/>
+              <a:t>Joint models have emerged as a solid choice for relatively clean text</a:t>
+            </a:r>
+          </a:p>
+          <a:p>
+            <a:r>
+              <a:rPr lang="en-US"/>
+              <a:t>Twitter presents new challenges that continue to be the subject of ongoing research</a:t>
+            </a:r>
+          </a:p>
+          <a:p>
+            <a:r>
+              <a:rPr lang="en-US"/>
+              <a:t>Techniques can be classified along many dimensions, depending on application, algorithm, inputs and outputs </a:t>
+            </a:r>
+          </a:p>
+        </p:txBody>
+      </p:sp>
+    </p:spTree>
+    <p:extLst>
+      <p:ext uri="{BB962C8B-B14F-4D97-AF65-F5344CB8AC3E}">
+        <p14:creationId xmlns:p14="http://schemas.microsoft.com/office/powerpoint/2010/main" val="396642358"/>
+      </p:ext>
+    </p:extLst>
+  </p:cSld>
+  <p:clrMapOvr>
+    <a:masterClrMapping/>
+  </p:clrMapOvr>
+</p:sld>
+</file>
+
 <file path=ppt/slides/slide3.xml><?xml version="1.0" encoding="utf-8"?>
 <p:sld xmlns:a="http://schemas.openxmlformats.org/drawingml/2006/main" xmlns:r="http://schemas.openxmlformats.org/officeDocument/2006/relationships" xmlns:p="http://schemas.openxmlformats.org/presentationml/2006/main">
   <p:cSld>
@@ -6858,7 +7309,7 @@
           <p:cNvPr id="5" name="Straight Arrow Connector 4">
             <a:extLst>
               <a:ext uri="{FF2B5EF4-FFF2-40B4-BE49-F238E27FC236}">
-                <a16:creationId xmlns:a16="http://schemas.microsoft.com/office/drawing/2014/main" id="{F462F756-659C-4710-82DE-942B1B17E5B8}"/>
+                <a16:creationId xmlns:a16="http://schemas.microsoft.com/office/drawing/2014/main" xmlns="" id="{F462F756-659C-4710-82DE-942B1B17E5B8}"/>
               </a:ext>
             </a:extLst>
           </p:cNvPr>
@@ -6900,7 +7351,7 @@
           <p:cNvPr id="6" name="Straight Arrow Connector 5">
             <a:extLst>
               <a:ext uri="{FF2B5EF4-FFF2-40B4-BE49-F238E27FC236}">
-                <a16:creationId xmlns:a16="http://schemas.microsoft.com/office/drawing/2014/main" id="{2EB44B3D-A1BD-41F6-A459-EE6FE6AAF2B4}"/>
+                <a16:creationId xmlns:a16="http://schemas.microsoft.com/office/drawing/2014/main" xmlns="" id="{2EB44B3D-A1BD-41F6-A459-EE6FE6AAF2B4}"/>
               </a:ext>
             </a:extLst>
           </p:cNvPr>
@@ -6942,7 +7393,7 @@
           <p:cNvPr id="9" name="TextBox 8">
             <a:extLst>
               <a:ext uri="{FF2B5EF4-FFF2-40B4-BE49-F238E27FC236}">
-                <a16:creationId xmlns:a16="http://schemas.microsoft.com/office/drawing/2014/main" id="{4BC24041-891F-4770-8AA2-5EE9E1E12059}"/>
+                <a16:creationId xmlns:a16="http://schemas.microsoft.com/office/drawing/2014/main" xmlns="" id="{4BC24041-891F-4770-8AA2-5EE9E1E12059}"/>
               </a:ext>
             </a:extLst>
           </p:cNvPr>
@@ -6977,7 +7428,7 @@
           <p:cNvPr id="10" name="TextBox 9">
             <a:extLst>
               <a:ext uri="{FF2B5EF4-FFF2-40B4-BE49-F238E27FC236}">
-                <a16:creationId xmlns:a16="http://schemas.microsoft.com/office/drawing/2014/main" id="{A4884E0B-0E26-42F8-A8BC-8ABAE815804F}"/>
+                <a16:creationId xmlns:a16="http://schemas.microsoft.com/office/drawing/2014/main" xmlns="" id="{A4884E0B-0E26-42F8-A8BC-8ABAE815804F}"/>
               </a:ext>
             </a:extLst>
           </p:cNvPr>
@@ -7012,7 +7463,7 @@
           <p:cNvPr id="11" name="TextBox 10">
             <a:extLst>
               <a:ext uri="{FF2B5EF4-FFF2-40B4-BE49-F238E27FC236}">
-                <a16:creationId xmlns:a16="http://schemas.microsoft.com/office/drawing/2014/main" id="{DECCFEC6-9813-4E58-B12C-F055AF0312C0}"/>
+                <a16:creationId xmlns:a16="http://schemas.microsoft.com/office/drawing/2014/main" xmlns="" id="{DECCFEC6-9813-4E58-B12C-F055AF0312C0}"/>
               </a:ext>
             </a:extLst>
           </p:cNvPr>
@@ -7055,7 +7506,7 @@
           <p:cNvPr id="15" name="TextBox 14">
             <a:extLst>
               <a:ext uri="{FF2B5EF4-FFF2-40B4-BE49-F238E27FC236}">
-                <a16:creationId xmlns:a16="http://schemas.microsoft.com/office/drawing/2014/main" id="{63849605-0246-411E-A2F1-308CC50FEB7C}"/>
+                <a16:creationId xmlns:a16="http://schemas.microsoft.com/office/drawing/2014/main" xmlns="" id="{63849605-0246-411E-A2F1-308CC50FEB7C}"/>
               </a:ext>
             </a:extLst>
           </p:cNvPr>
@@ -7144,7 +7595,7 @@
           <p:cNvPr id="12" name="TextBox 11">
             <a:extLst>
               <a:ext uri="{FF2B5EF4-FFF2-40B4-BE49-F238E27FC236}">
-                <a16:creationId xmlns:a16="http://schemas.microsoft.com/office/drawing/2014/main" id="{236A2522-B431-4550-9B96-92248ED5D301}"/>
+                <a16:creationId xmlns:a16="http://schemas.microsoft.com/office/drawing/2014/main" xmlns="" id="{236A2522-B431-4550-9B96-92248ED5D301}"/>
               </a:ext>
             </a:extLst>
           </p:cNvPr>
@@ -7243,7 +7694,9 @@
         </p:nvSpPr>
         <p:spPr/>
         <p:txBody>
-          <a:bodyPr/>
+          <a:bodyPr>
+            <a:normAutofit lnSpcReduction="10000"/>
+          </a:bodyPr>
           <a:lstStyle/>
           <a:p>
             <a:r>
@@ -7293,6 +7746,14 @@
               <a:rPr lang="en-US"/>
               <a:t>Because of the ontology, events are structured representations amenable to querying/analytics</a:t>
             </a:r>
+          </a:p>
+          <a:p>
+            <a:pPr lvl="1"/>
+            <a:r>
+              <a:rPr lang="en-US"/>
+              <a:t>What is an ‘event ontology’?</a:t>
+            </a:r>
+            <a:endParaRPr lang="en-US"/>
           </a:p>
           <a:p>
             <a:pPr lvl="1"/>
@@ -7363,7 +7824,159 @@
           <a:p>
             <a:r>
               <a:rPr lang="en-US"/>
-              <a:t>Examples of event classes in CAMEO ontology</a:t>
+              <a:t>Ontology Example 1: ACE </a:t>
+            </a:r>
+          </a:p>
+        </p:txBody>
+      </p:sp>
+      <p:sp>
+        <p:nvSpPr>
+          <p:cNvPr id="3" name="Content Placeholder 2"/>
+          <p:cNvSpPr>
+            <a:spLocks noGrp="1"/>
+          </p:cNvSpPr>
+          <p:nvPr>
+            <p:ph idx="1"/>
+          </p:nvPr>
+        </p:nvSpPr>
+        <p:spPr/>
+        <p:txBody>
+          <a:bodyPr>
+            <a:normAutofit fontScale="85000" lnSpcReduction="20000"/>
+          </a:bodyPr>
+          <a:lstStyle/>
+          <a:p>
+            <a:r>
+              <a:rPr lang="en-US"/>
+              <a:t>Much flatter than Semantic Web ontologies, which contain rich sets of classes, properties and axioms</a:t>
+            </a:r>
+          </a:p>
+          <a:p>
+            <a:r>
+              <a:rPr lang="en-US"/>
+              <a:t>Contains eight event classes, each of which has sub-classes (indicated in parantheses)</a:t>
+            </a:r>
+          </a:p>
+          <a:p>
+            <a:pPr lvl="1"/>
+            <a:r>
+              <a:rPr lang="en-US"/>
+              <a:t>Life (Be-Born, Marry, Divorce, Injure, Die)</a:t>
+            </a:r>
+          </a:p>
+          <a:p>
+            <a:pPr lvl="1"/>
+            <a:r>
+              <a:rPr lang="en-US"/>
+              <a:t>Movement (Transport)</a:t>
+            </a:r>
+          </a:p>
+          <a:p>
+            <a:pPr lvl="1"/>
+            <a:r>
+              <a:rPr lang="en-US"/>
+              <a:t>Transaction (Transfer-Ownership, Transfer-Money)</a:t>
+            </a:r>
+          </a:p>
+          <a:p>
+            <a:pPr lvl="1"/>
+            <a:r>
+              <a:rPr lang="en-US"/>
+              <a:t>Business( Start-Org, Merge-org, Declare-Bankruptcy, End-Ord)</a:t>
+            </a:r>
+          </a:p>
+          <a:p>
+            <a:pPr lvl="1"/>
+            <a:r>
+              <a:rPr lang="en-US"/>
+              <a:t>Conflict (Attack, Demonstrate)</a:t>
+            </a:r>
+          </a:p>
+          <a:p>
+            <a:pPr lvl="1"/>
+            <a:r>
+              <a:rPr lang="en-US"/>
+              <a:t>Contact (Meet, Phone-Write)</a:t>
+            </a:r>
+          </a:p>
+          <a:p>
+            <a:pPr lvl="1"/>
+            <a:r>
+              <a:rPr lang="en-US"/>
+              <a:t>Personnel (Start-Position, End-Position, Nominate, Elect)</a:t>
+            </a:r>
+          </a:p>
+          <a:p>
+            <a:pPr lvl="1"/>
+            <a:r>
+              <a:rPr lang="en-US"/>
+              <a:t>Justice (Arrest Release, Fine, Execute, Extradite</a:t>
+            </a:r>
+            <a:r>
+              <a:rPr lang="mr-IN"/>
+              <a:t>…</a:t>
+            </a:r>
+            <a:r>
+              <a:rPr lang="en-US"/>
+              <a:t>)</a:t>
+            </a:r>
+          </a:p>
+          <a:p>
+            <a:r>
+              <a:rPr lang="en-US"/>
+              <a:t>Events have four other attributes: modality, polarity, genericity and tense</a:t>
+            </a:r>
+          </a:p>
+        </p:txBody>
+      </p:sp>
+    </p:spTree>
+    <p:extLst>
+      <p:ext uri="{BB962C8B-B14F-4D97-AF65-F5344CB8AC3E}">
+        <p14:creationId xmlns:p14="http://schemas.microsoft.com/office/powerpoint/2010/main" val="1140918496"/>
+      </p:ext>
+    </p:extLst>
+  </p:cSld>
+  <p:clrMapOvr>
+    <a:masterClrMapping/>
+  </p:clrMapOvr>
+</p:sld>
+</file>
+
+<file path=ppt/slides/slide6.xml><?xml version="1.0" encoding="utf-8"?>
+<p:sld xmlns:a="http://schemas.openxmlformats.org/drawingml/2006/main" xmlns:r="http://schemas.openxmlformats.org/officeDocument/2006/relationships" xmlns:p="http://schemas.openxmlformats.org/presentationml/2006/main">
+  <p:cSld>
+    <p:spTree>
+      <p:nvGrpSpPr>
+        <p:cNvPr id="1" name=""/>
+        <p:cNvGrpSpPr/>
+        <p:nvPr/>
+      </p:nvGrpSpPr>
+      <p:grpSpPr>
+        <a:xfrm>
+          <a:off x="0" y="0"/>
+          <a:ext cx="0" cy="0"/>
+          <a:chOff x="0" y="0"/>
+          <a:chExt cx="0" cy="0"/>
+        </a:xfrm>
+      </p:grpSpPr>
+      <p:sp>
+        <p:nvSpPr>
+          <p:cNvPr id="2" name="Title 1"/>
+          <p:cNvSpPr>
+            <a:spLocks noGrp="1"/>
+          </p:cNvSpPr>
+          <p:nvPr>
+            <p:ph type="title"/>
+          </p:nvPr>
+        </p:nvSpPr>
+        <p:spPr/>
+        <p:txBody>
+          <a:bodyPr/>
+          <a:lstStyle/>
+          <a:p>
+            <a:r>
+              <a:rPr lang="en-US"/>
+              <a:t>Ontology Example 2: CAMEO</a:t>
             </a:r>
           </a:p>
         </p:txBody>
@@ -7470,7 +8083,7 @@
 </p:sld>
 </file>
 
-<file path=ppt/slides/slide6.xml><?xml version="1.0" encoding="utf-8"?>
+<file path=ppt/slides/slide7.xml><?xml version="1.0" encoding="utf-8"?>
 <p:sld xmlns:a="http://schemas.openxmlformats.org/drawingml/2006/main" xmlns:r="http://schemas.openxmlformats.org/officeDocument/2006/relationships" xmlns:p="http://schemas.openxmlformats.org/presentationml/2006/main">
   <p:cSld>
     <p:spTree>
@@ -7499,18 +8112,23 @@
         </p:nvSpPr>
         <p:spPr/>
         <p:txBody>
-          <a:bodyPr/>
-          <a:lstStyle/>
-          <a:p>
-            <a:r>
-              <a:rPr lang="en-US"/>
-              <a:t>Events involve entities, relations, triggers, verbs, modifiers</a:t>
+          <a:bodyPr>
+            <a:normAutofit/>
+          </a:bodyPr>
+          <a:lstStyle/>
+          <a:p>
+            <a:r>
+              <a:rPr lang="en-US"/>
+              <a:t>Events involve many components (entities, relations</a:t>
             </a:r>
             <a:r>
               <a:rPr lang="mr-IN"/>
               <a:t>…</a:t>
             </a:r>
-            <a:endParaRPr lang="en-US"/>
+            <a:r>
+              <a:rPr lang="en-US"/>
+              <a:t>)</a:t>
+            </a:r>
           </a:p>
         </p:txBody>
       </p:sp>
@@ -7578,7 +8196,7 @@
           <p:cNvPr id="7" name="Rectangle 6">
             <a:extLst>
               <a:ext uri="{FF2B5EF4-FFF2-40B4-BE49-F238E27FC236}">
-                <a16:creationId xmlns:a16="http://schemas.microsoft.com/office/drawing/2014/main" id="{30DBC704-3387-4A5D-A8E1-6CA6EEB5ADF6}"/>
+                <a16:creationId xmlns:a16="http://schemas.microsoft.com/office/drawing/2014/main" xmlns="" id="{30DBC704-3387-4A5D-A8E1-6CA6EEB5ADF6}"/>
               </a:ext>
             </a:extLst>
           </p:cNvPr>
@@ -7710,123 +8328,6 @@
 </p:sld>
 </file>
 
-<file path=ppt/slides/slide7.xml><?xml version="1.0" encoding="utf-8"?>
-<p:sld xmlns:a="http://schemas.openxmlformats.org/drawingml/2006/main" xmlns:r="http://schemas.openxmlformats.org/officeDocument/2006/relationships" xmlns:p="http://schemas.openxmlformats.org/presentationml/2006/main">
-  <p:cSld>
-    <p:spTree>
-      <p:nvGrpSpPr>
-        <p:cNvPr id="1" name=""/>
-        <p:cNvGrpSpPr/>
-        <p:nvPr/>
-      </p:nvGrpSpPr>
-      <p:grpSpPr>
-        <a:xfrm>
-          <a:off x="0" y="0"/>
-          <a:ext cx="0" cy="0"/>
-          <a:chOff x="0" y="0"/>
-          <a:chExt cx="0" cy="0"/>
-        </a:xfrm>
-      </p:grpSpPr>
-      <p:sp>
-        <p:nvSpPr>
-          <p:cNvPr id="2" name="Title 1"/>
-          <p:cNvSpPr>
-            <a:spLocks noGrp="1"/>
-          </p:cNvSpPr>
-          <p:nvPr>
-            <p:ph type="title"/>
-          </p:nvPr>
-        </p:nvSpPr>
-        <p:spPr/>
-        <p:txBody>
-          <a:bodyPr/>
-          <a:lstStyle/>
-          <a:p>
-            <a:r>
-              <a:rPr lang="en-US"/>
-              <a:t>In Social Media</a:t>
-            </a:r>
-            <a:r>
-              <a:rPr lang="mr-IN"/>
-              <a:t>…</a:t>
-            </a:r>
-            <a:endParaRPr lang="en-US"/>
-          </a:p>
-        </p:txBody>
-      </p:sp>
-      <p:sp>
-        <p:nvSpPr>
-          <p:cNvPr id="3" name="Content Placeholder 2"/>
-          <p:cNvSpPr>
-            <a:spLocks noGrp="1"/>
-          </p:cNvSpPr>
-          <p:nvPr>
-            <p:ph idx="1"/>
-          </p:nvPr>
-        </p:nvSpPr>
-        <p:spPr/>
-        <p:txBody>
-          <a:bodyPr/>
-          <a:lstStyle/>
-          <a:p>
-            <a:r>
-              <a:rPr lang="en-US"/>
-              <a:t>Additional problem of first </a:t>
-            </a:r>
-            <a:r>
-              <a:rPr lang="en-US" b="1"/>
-              <a:t>detecting</a:t>
-            </a:r>
-            <a:r>
-              <a:rPr lang="en-US"/>
-              <a:t> whether the tweet is describing an event</a:t>
-            </a:r>
-          </a:p>
-          <a:p>
-            <a:pPr lvl="1"/>
-            <a:r>
-              <a:rPr lang="en-US"/>
-              <a:t>Can be defined as a binary classification problem: </a:t>
-            </a:r>
-            <a:r>
-              <a:rPr lang="en-US" i="1"/>
-              <a:t>does the tweet describe an event or not?</a:t>
-            </a:r>
-          </a:p>
-          <a:p>
-            <a:r>
-              <a:rPr lang="en-US"/>
-              <a:t>Short text of tweet makes this essential for performance</a:t>
-            </a:r>
-          </a:p>
-          <a:p>
-            <a:r>
-              <a:rPr lang="en-US"/>
-              <a:t>Detection and extraction complement each other</a:t>
-            </a:r>
-          </a:p>
-          <a:p>
-            <a:pPr lvl="1"/>
-            <a:r>
-              <a:rPr lang="en-US"/>
-              <a:t>Forces us to decide what an event really is, for the purposes of extraction/detection/inference</a:t>
-            </a:r>
-          </a:p>
-        </p:txBody>
-      </p:sp>
-    </p:spTree>
-    <p:extLst>
-      <p:ext uri="{BB962C8B-B14F-4D97-AF65-F5344CB8AC3E}">
-        <p14:creationId xmlns:p14="http://schemas.microsoft.com/office/powerpoint/2010/main" val="260022398"/>
-      </p:ext>
-    </p:extLst>
-  </p:cSld>
-  <p:clrMapOvr>
-    <a:masterClrMapping/>
-  </p:clrMapOvr>
-</p:sld>
-</file>
-
 <file path=ppt/slides/slide8.xml><?xml version="1.0" encoding="utf-8"?>
 <p:sld xmlns:a="http://schemas.openxmlformats.org/drawingml/2006/main" xmlns:r="http://schemas.openxmlformats.org/officeDocument/2006/relationships" xmlns:p="http://schemas.openxmlformats.org/presentationml/2006/main">
   <p:cSld>
@@ -7846,13 +8347,7 @@
       </p:grpSpPr>
       <p:sp>
         <p:nvSpPr>
-          <p:cNvPr id="2" name="Title 1">
-            <a:extLst>
-              <a:ext uri="{FF2B5EF4-FFF2-40B4-BE49-F238E27FC236}">
-                <a16:creationId xmlns:a16="http://schemas.microsoft.com/office/drawing/2014/main" id="{789F0914-9F89-48D5-A04A-EB8506D20677}"/>
-              </a:ext>
-            </a:extLst>
-          </p:cNvPr>
+          <p:cNvPr id="2" name="Title 1"/>
           <p:cNvSpPr>
             <a:spLocks noGrp="1"/>
           </p:cNvSpPr>
@@ -7860,213 +8355,79 @@
             <p:ph type="title"/>
           </p:nvPr>
         </p:nvSpPr>
-        <p:spPr>
-          <a:xfrm>
-            <a:off x="289560" y="365126"/>
-            <a:ext cx="8686800" cy="1325563"/>
-          </a:xfrm>
-        </p:spPr>
+        <p:spPr/>
         <p:txBody>
           <a:bodyPr/>
           <a:lstStyle/>
           <a:p>
             <a:r>
               <a:rPr lang="en-US"/>
-              <a:t>Event Detection in Twitter: Examples</a:t>
-            </a:r>
-          </a:p>
-        </p:txBody>
-      </p:sp>
-      <p:sp>
-        <p:nvSpPr>
-          <p:cNvPr id="5" name="Rectangle 4">
-            <a:extLst>
-              <a:ext uri="{FF2B5EF4-FFF2-40B4-BE49-F238E27FC236}">
-                <a16:creationId xmlns:a16="http://schemas.microsoft.com/office/drawing/2014/main" id="{D5F8127B-3EAF-4D79-B961-9CDCF5DA2CA6}"/>
-              </a:ext>
-            </a:extLst>
-          </p:cNvPr>
-          <p:cNvSpPr/>
-          <p:nvPr/>
-        </p:nvSpPr>
-        <p:spPr>
-          <a:xfrm>
-            <a:off x="735330" y="3295596"/>
-            <a:ext cx="8012430" cy="1200329"/>
-          </a:xfrm>
-          <a:prstGeom prst="rect">
-            <a:avLst/>
-          </a:prstGeom>
-        </p:spPr>
-        <p:txBody>
-          <a:bodyPr wrap="square">
-            <a:spAutoFit/>
-          </a:bodyPr>
-          <a:lstStyle/>
-          <a:p>
-            <a:r>
-              <a:rPr lang="en-US" sz="2400" dirty="0"/>
-              <a:t>RT </a:t>
-            </a:r>
-            <a:r>
-              <a:rPr lang="en-US" sz="2400" dirty="0">
-                <a:solidFill>
-                  <a:srgbClr val="0070C0"/>
-                </a:solidFill>
-              </a:rPr>
-              <a:t>@Stump4TrumpPAC</a:t>
-            </a:r>
-            <a:r>
-              <a:rPr lang="en-US" sz="2400" dirty="0"/>
-              <a:t>: These are the 58 people killed in the Las Vegas massacre, the deadliest mass shooting in modern U.S. history.. 💐🙏🏻 http…</a:t>
-            </a:r>
-          </a:p>
-        </p:txBody>
-      </p:sp>
-      <p:sp>
-        <p:nvSpPr>
-          <p:cNvPr id="6" name="Rectangle 5">
-            <a:extLst>
-              <a:ext uri="{FF2B5EF4-FFF2-40B4-BE49-F238E27FC236}">
-                <a16:creationId xmlns:a16="http://schemas.microsoft.com/office/drawing/2014/main" id="{1B041536-BBFD-40FB-8C12-11420F37DDEA}"/>
-              </a:ext>
-            </a:extLst>
-          </p:cNvPr>
-          <p:cNvSpPr/>
-          <p:nvPr/>
-        </p:nvSpPr>
-        <p:spPr>
-          <a:xfrm>
-            <a:off x="735330" y="4819140"/>
-            <a:ext cx="8016239" cy="1200329"/>
-          </a:xfrm>
-          <a:prstGeom prst="rect">
-            <a:avLst/>
-          </a:prstGeom>
-        </p:spPr>
-        <p:txBody>
-          <a:bodyPr wrap="square">
-            <a:spAutoFit/>
-          </a:bodyPr>
-          <a:lstStyle/>
-          <a:p>
-            <a:r>
-              <a:rPr lang="en-US" sz="2400" dirty="0"/>
-              <a:t>RT </a:t>
-            </a:r>
-            <a:r>
-              <a:rPr lang="en-US" sz="2400" dirty="0">
-                <a:solidFill>
-                  <a:srgbClr val="0070C0"/>
-                </a:solidFill>
-              </a:rPr>
-              <a:t>@</a:t>
-            </a:r>
-            <a:r>
-              <a:rPr lang="en-US" sz="2400" dirty="0" err="1">
-                <a:solidFill>
-                  <a:srgbClr val="0070C0"/>
-                </a:solidFill>
-              </a:rPr>
-              <a:t>dragoner_JP</a:t>
-            </a:r>
-            <a:r>
-              <a:rPr lang="en-US" sz="2400" dirty="0"/>
-              <a:t>: うげえ……「ラスベガス銃撃の(カナダ人)犠牲者が巨額の医療費に直面」→ Las Vegas shooting victims facing large medical bills </a:t>
-            </a:r>
-            <a:r>
-              <a:rPr lang="en-US" sz="2400" dirty="0">
-                <a:solidFill>
-                  <a:srgbClr val="0070C0"/>
-                </a:solidFill>
-              </a:rPr>
-              <a:t>https://</a:t>
-            </a:r>
-            <a:r>
-              <a:rPr lang="en-US" sz="2400" dirty="0" err="1">
-                <a:solidFill>
-                  <a:srgbClr val="0070C0"/>
-                </a:solidFill>
-              </a:rPr>
-              <a:t>t.co</a:t>
-            </a:r>
-            <a:r>
-              <a:rPr lang="en-US" sz="2400" dirty="0">
-                <a:solidFill>
-                  <a:srgbClr val="0070C0"/>
-                </a:solidFill>
-              </a:rPr>
-              <a:t>/1F3bgH17Jv</a:t>
-            </a:r>
-          </a:p>
-        </p:txBody>
-      </p:sp>
-      <p:sp>
-        <p:nvSpPr>
-          <p:cNvPr id="7" name="Rectangle 6">
-            <a:extLst>
-              <a:ext uri="{FF2B5EF4-FFF2-40B4-BE49-F238E27FC236}">
-                <a16:creationId xmlns:a16="http://schemas.microsoft.com/office/drawing/2014/main" id="{D5F8127B-3EAF-4D79-B961-9CDCF5DA2CA6}"/>
-              </a:ext>
-            </a:extLst>
-          </p:cNvPr>
-          <p:cNvSpPr/>
-          <p:nvPr/>
-        </p:nvSpPr>
-        <p:spPr>
-          <a:xfrm>
-            <a:off x="735330" y="1772052"/>
-            <a:ext cx="8012430" cy="1200329"/>
-          </a:xfrm>
-          <a:prstGeom prst="rect">
-            <a:avLst/>
-          </a:prstGeom>
-        </p:spPr>
-        <p:txBody>
-          <a:bodyPr wrap="square">
-            <a:spAutoFit/>
-          </a:bodyPr>
-          <a:lstStyle/>
-          <a:p>
-            <a:r>
-              <a:rPr lang="en-US" sz="2400" dirty="0"/>
-              <a:t>RT </a:t>
-            </a:r>
-            <a:r>
-              <a:rPr lang="en-US" sz="2400" dirty="0">
-                <a:solidFill>
-                  <a:srgbClr val="0070C0"/>
-                </a:solidFill>
-              </a:rPr>
-              <a:t>@jc_stubbs</a:t>
-            </a:r>
-            <a:r>
-              <a:rPr lang="en-US" sz="2400" dirty="0"/>
-              <a:t>: Another tragic day in </a:t>
-            </a:r>
-            <a:r>
-              <a:rPr lang="en-US" sz="2400" dirty="0">
-                <a:solidFill>
-                  <a:srgbClr val="0070C0"/>
-                </a:solidFill>
-              </a:rPr>
-              <a:t>#Ukraine </a:t>
-            </a:r>
-            <a:r>
-              <a:rPr lang="mr-IN" sz="2400" dirty="0"/>
-              <a:t>–</a:t>
-            </a:r>
-            <a:r>
-              <a:rPr lang="en-US" sz="2400" dirty="0"/>
-              <a:t> More than 50 rebels killed as new leader unleashes assault: </a:t>
-            </a:r>
-            <a:r>
-              <a:rPr lang="en-US" sz="2400" dirty="0">
-                <a:solidFill>
-                  <a:srgbClr val="0070C0"/>
-                </a:solidFill>
-              </a:rPr>
-              <a:t>http://t.co/wcfU3kyAFX</a:t>
+              <a:t>In Social Media</a:t>
+            </a:r>
+            <a:r>
+              <a:rPr lang="mr-IN"/>
+              <a:t>…</a:t>
+            </a:r>
+            <a:endParaRPr lang="en-US"/>
+          </a:p>
+        </p:txBody>
+      </p:sp>
+      <p:sp>
+        <p:nvSpPr>
+          <p:cNvPr id="3" name="Content Placeholder 2"/>
+          <p:cNvSpPr>
+            <a:spLocks noGrp="1"/>
+          </p:cNvSpPr>
+          <p:nvPr>
+            <p:ph idx="1"/>
+          </p:nvPr>
+        </p:nvSpPr>
+        <p:spPr/>
+        <p:txBody>
+          <a:bodyPr/>
+          <a:lstStyle/>
+          <a:p>
+            <a:r>
+              <a:rPr lang="en-US"/>
+              <a:t>Additional problem of first </a:t>
+            </a:r>
+            <a:r>
+              <a:rPr lang="en-US" b="1"/>
+              <a:t>detecting</a:t>
+            </a:r>
+            <a:r>
+              <a:rPr lang="en-US"/>
+              <a:t> whether the tweet is describing an event</a:t>
+            </a:r>
+          </a:p>
+          <a:p>
+            <a:pPr lvl="1"/>
+            <a:r>
+              <a:rPr lang="en-US"/>
+              <a:t>Can be defined as a binary classification problem: </a:t>
+            </a:r>
+            <a:r>
+              <a:rPr lang="en-US" i="1"/>
+              <a:t>does the tweet describe an event or not?</a:t>
+            </a:r>
+          </a:p>
+          <a:p>
+            <a:r>
+              <a:rPr lang="en-US"/>
+              <a:t>Short text of tweet makes this essential for performance</a:t>
+            </a:r>
+          </a:p>
+          <a:p>
+            <a:r>
+              <a:rPr lang="en-US"/>
+              <a:t>Detection and extraction complement each other</a:t>
+            </a:r>
+          </a:p>
+          <a:p>
+            <a:pPr lvl="1"/>
+            <a:r>
+              <a:rPr lang="en-US"/>
+              <a:t>Forces us to decide what an event really is, for the purposes of extraction/detection/inference</a:t>
             </a:r>
           </a:p>
         </p:txBody>
@@ -8074,7 +8435,7 @@
     </p:spTree>
     <p:extLst>
       <p:ext uri="{BB962C8B-B14F-4D97-AF65-F5344CB8AC3E}">
-        <p14:creationId xmlns:p14="http://schemas.microsoft.com/office/powerpoint/2010/main" val="1556995143"/>
+        <p14:creationId xmlns:p14="http://schemas.microsoft.com/office/powerpoint/2010/main" val="260022398"/>
       </p:ext>
     </p:extLst>
   </p:cSld>
@@ -8103,61 +8464,235 @@
       </p:grpSpPr>
       <p:sp>
         <p:nvSpPr>
-          <p:cNvPr id="2" name="Title 1"/>
-          <p:cNvSpPr>
-            <a:spLocks noGrp="1"/>
-          </p:cNvSpPr>
-          <p:nvPr>
-            <p:ph type="title"/>
-          </p:nvPr>
-        </p:nvSpPr>
-        <p:spPr/>
-        <p:txBody>
-          <a:bodyPr/>
-          <a:lstStyle/>
-          <a:p>
-            <a:r>
-              <a:rPr lang="en-US"/>
-              <a:t>An Example Workflow</a:t>
-            </a:r>
-            <a:endParaRPr lang="en-US" dirty="0"/>
-          </a:p>
-        </p:txBody>
-      </p:sp>
-      <p:pic>
-        <p:nvPicPr>
-          <p:cNvPr id="4" name="Picture 3">
+          <p:cNvPr id="2" name="Title 1">
             <a:extLst>
               <a:ext uri="{FF2B5EF4-FFF2-40B4-BE49-F238E27FC236}">
-                <a16:creationId xmlns:a16="http://schemas.microsoft.com/office/drawing/2014/main" id="{A5FA5E3F-93A3-49D6-87CB-54DA033C241C}"/>
+                <a16:creationId xmlns:a16="http://schemas.microsoft.com/office/drawing/2014/main" xmlns="" id="{789F0914-9F89-48D5-A04A-EB8506D20677}"/>
               </a:ext>
             </a:extLst>
           </p:cNvPr>
-          <p:cNvPicPr>
-            <a:picLocks noChangeAspect="1"/>
-          </p:cNvPicPr>
-          <p:nvPr/>
-        </p:nvPicPr>
-        <p:blipFill>
-          <a:blip r:embed="rId3"/>
-          <a:stretch>
-            <a:fillRect/>
-          </a:stretch>
-        </p:blipFill>
+          <p:cNvSpPr>
+            <a:spLocks noGrp="1"/>
+          </p:cNvSpPr>
+          <p:nvPr>
+            <p:ph type="title"/>
+          </p:nvPr>
+        </p:nvSpPr>
         <p:spPr>
           <a:xfrm>
-            <a:off x="1468967" y="1825625"/>
-            <a:ext cx="6206066" cy="3955624"/>
+            <a:off x="289560" y="365126"/>
+            <a:ext cx="8686800" cy="1325563"/>
+          </a:xfrm>
+        </p:spPr>
+        <p:txBody>
+          <a:bodyPr/>
+          <a:lstStyle/>
+          <a:p>
+            <a:r>
+              <a:rPr lang="en-US"/>
+              <a:t>Event Detection in Twitter: Examples</a:t>
+            </a:r>
+          </a:p>
+        </p:txBody>
+      </p:sp>
+      <p:sp>
+        <p:nvSpPr>
+          <p:cNvPr id="5" name="Rectangle 4">
+            <a:extLst>
+              <a:ext uri="{FF2B5EF4-FFF2-40B4-BE49-F238E27FC236}">
+                <a16:creationId xmlns:a16="http://schemas.microsoft.com/office/drawing/2014/main" xmlns="" id="{D5F8127B-3EAF-4D79-B961-9CDCF5DA2CA6}"/>
+              </a:ext>
+            </a:extLst>
+          </p:cNvPr>
+          <p:cNvSpPr/>
+          <p:nvPr/>
+        </p:nvSpPr>
+        <p:spPr>
+          <a:xfrm>
+            <a:off x="735330" y="3295596"/>
+            <a:ext cx="8012430" cy="1200329"/>
           </a:xfrm>
           <a:prstGeom prst="rect">
             <a:avLst/>
           </a:prstGeom>
         </p:spPr>
-      </p:pic>
+        <p:txBody>
+          <a:bodyPr wrap="square">
+            <a:spAutoFit/>
+          </a:bodyPr>
+          <a:lstStyle/>
+          <a:p>
+            <a:r>
+              <a:rPr lang="en-US" sz="2400" dirty="0"/>
+              <a:t>RT </a:t>
+            </a:r>
+            <a:r>
+              <a:rPr lang="en-US" sz="2400" dirty="0">
+                <a:solidFill>
+                  <a:srgbClr val="0070C0"/>
+                </a:solidFill>
+              </a:rPr>
+              <a:t>@Stump4TrumpPAC</a:t>
+            </a:r>
+            <a:r>
+              <a:rPr lang="en-US" sz="2400" dirty="0"/>
+              <a:t>: These are the 58 people killed in the Las Vegas massacre, the deadliest mass shooting in modern U.S. history.. 💐🙏🏻 http…</a:t>
+            </a:r>
+          </a:p>
+        </p:txBody>
+      </p:sp>
+      <p:sp>
+        <p:nvSpPr>
+          <p:cNvPr id="6" name="Rectangle 5">
+            <a:extLst>
+              <a:ext uri="{FF2B5EF4-FFF2-40B4-BE49-F238E27FC236}">
+                <a16:creationId xmlns:a16="http://schemas.microsoft.com/office/drawing/2014/main" xmlns="" id="{1B041536-BBFD-40FB-8C12-11420F37DDEA}"/>
+              </a:ext>
+            </a:extLst>
+          </p:cNvPr>
+          <p:cNvSpPr/>
+          <p:nvPr/>
+        </p:nvSpPr>
+        <p:spPr>
+          <a:xfrm>
+            <a:off x="735330" y="4819140"/>
+            <a:ext cx="8016239" cy="1200329"/>
+          </a:xfrm>
+          <a:prstGeom prst="rect">
+            <a:avLst/>
+          </a:prstGeom>
+        </p:spPr>
+        <p:txBody>
+          <a:bodyPr wrap="square">
+            <a:spAutoFit/>
+          </a:bodyPr>
+          <a:lstStyle/>
+          <a:p>
+            <a:r>
+              <a:rPr lang="en-US" sz="2400" dirty="0"/>
+              <a:t>RT </a:t>
+            </a:r>
+            <a:r>
+              <a:rPr lang="en-US" sz="2400" dirty="0">
+                <a:solidFill>
+                  <a:srgbClr val="0070C0"/>
+                </a:solidFill>
+              </a:rPr>
+              <a:t>@</a:t>
+            </a:r>
+            <a:r>
+              <a:rPr lang="en-US" sz="2400" dirty="0" err="1">
+                <a:solidFill>
+                  <a:srgbClr val="0070C0"/>
+                </a:solidFill>
+              </a:rPr>
+              <a:t>dragoner_JP</a:t>
+            </a:r>
+            <a:r>
+              <a:rPr lang="en-US" sz="2400" dirty="0"/>
+              <a:t>: うげえ……「ラスベガス銃撃の(カナダ人)犠牲者が巨額の医療費に直面」→ Las Vegas shooting victims facing large medical bills </a:t>
+            </a:r>
+            <a:r>
+              <a:rPr lang="en-US" sz="2400" dirty="0">
+                <a:solidFill>
+                  <a:srgbClr val="0070C0"/>
+                </a:solidFill>
+              </a:rPr>
+              <a:t>https://</a:t>
+            </a:r>
+            <a:r>
+              <a:rPr lang="en-US" sz="2400" dirty="0" err="1">
+                <a:solidFill>
+                  <a:srgbClr val="0070C0"/>
+                </a:solidFill>
+              </a:rPr>
+              <a:t>t.co</a:t>
+            </a:r>
+            <a:r>
+              <a:rPr lang="en-US" sz="2400" dirty="0">
+                <a:solidFill>
+                  <a:srgbClr val="0070C0"/>
+                </a:solidFill>
+              </a:rPr>
+              <a:t>/1F3bgH17Jv</a:t>
+            </a:r>
+          </a:p>
+        </p:txBody>
+      </p:sp>
+      <p:sp>
+        <p:nvSpPr>
+          <p:cNvPr id="7" name="Rectangle 6">
+            <a:extLst>
+              <a:ext uri="{FF2B5EF4-FFF2-40B4-BE49-F238E27FC236}">
+                <a16:creationId xmlns:a16="http://schemas.microsoft.com/office/drawing/2014/main" xmlns="" id="{D5F8127B-3EAF-4D79-B961-9CDCF5DA2CA6}"/>
+              </a:ext>
+            </a:extLst>
+          </p:cNvPr>
+          <p:cNvSpPr/>
+          <p:nvPr/>
+        </p:nvSpPr>
+        <p:spPr>
+          <a:xfrm>
+            <a:off x="735330" y="1772052"/>
+            <a:ext cx="8012430" cy="1200329"/>
+          </a:xfrm>
+          <a:prstGeom prst="rect">
+            <a:avLst/>
+          </a:prstGeom>
+        </p:spPr>
+        <p:txBody>
+          <a:bodyPr wrap="square">
+            <a:spAutoFit/>
+          </a:bodyPr>
+          <a:lstStyle/>
+          <a:p>
+            <a:r>
+              <a:rPr lang="en-US" sz="2400" dirty="0"/>
+              <a:t>RT </a:t>
+            </a:r>
+            <a:r>
+              <a:rPr lang="en-US" sz="2400" dirty="0">
+                <a:solidFill>
+                  <a:srgbClr val="0070C0"/>
+                </a:solidFill>
+              </a:rPr>
+              <a:t>@jc_stubbs</a:t>
+            </a:r>
+            <a:r>
+              <a:rPr lang="en-US" sz="2400" dirty="0"/>
+              <a:t>: Another tragic day in </a:t>
+            </a:r>
+            <a:r>
+              <a:rPr lang="en-US" sz="2400" dirty="0">
+                <a:solidFill>
+                  <a:srgbClr val="0070C0"/>
+                </a:solidFill>
+              </a:rPr>
+              <a:t>#Ukraine </a:t>
+            </a:r>
+            <a:r>
+              <a:rPr lang="mr-IN" sz="2400" dirty="0"/>
+              <a:t>–</a:t>
+            </a:r>
+            <a:r>
+              <a:rPr lang="en-US" sz="2400" dirty="0"/>
+              <a:t> More than 50 rebels killed as new leader unleashes assault: </a:t>
+            </a:r>
+            <a:r>
+              <a:rPr lang="en-US" sz="2400" dirty="0">
+                <a:solidFill>
+                  <a:srgbClr val="0070C0"/>
+                </a:solidFill>
+              </a:rPr>
+              <a:t>http://t.co/wcfU3kyAFX</a:t>
+            </a:r>
+          </a:p>
+        </p:txBody>
+      </p:sp>
     </p:spTree>
     <p:extLst>
       <p:ext uri="{BB962C8B-B14F-4D97-AF65-F5344CB8AC3E}">
-        <p14:creationId xmlns:p14="http://schemas.microsoft.com/office/powerpoint/2010/main" val="569283612"/>
+        <p14:creationId xmlns:p14="http://schemas.microsoft.com/office/powerpoint/2010/main" val="1556995143"/>
       </p:ext>
     </p:extLst>
   </p:cSld>

</xml_diff>

<commit_message>
more changes to event extraction slides
</commit_message>
<xml_diff>
--- a/slides/pptx/5-event-extraction.pptx
+++ b/slides/pptx/5-event-extraction.pptx
@@ -5,29 +5,30 @@
     <p:sldMasterId id="2147483660" r:id="rId1"/>
   </p:sldMasterIdLst>
   <p:notesMasterIdLst>
-    <p:notesMasterId r:id="rId22"/>
+    <p:notesMasterId r:id="rId23"/>
   </p:notesMasterIdLst>
   <p:sldIdLst>
     <p:sldId id="332" r:id="rId2"/>
     <p:sldId id="333" r:id="rId3"/>
     <p:sldId id="334" r:id="rId4"/>
-    <p:sldId id="347" r:id="rId5"/>
-    <p:sldId id="354" r:id="rId6"/>
-    <p:sldId id="348" r:id="rId7"/>
-    <p:sldId id="349" r:id="rId8"/>
-    <p:sldId id="346" r:id="rId9"/>
-    <p:sldId id="340" r:id="rId10"/>
-    <p:sldId id="335" r:id="rId11"/>
-    <p:sldId id="355" r:id="rId12"/>
-    <p:sldId id="356" r:id="rId13"/>
-    <p:sldId id="337" r:id="rId14"/>
-    <p:sldId id="341" r:id="rId15"/>
-    <p:sldId id="342" r:id="rId16"/>
-    <p:sldId id="352" r:id="rId17"/>
-    <p:sldId id="351" r:id="rId18"/>
-    <p:sldId id="353" r:id="rId19"/>
-    <p:sldId id="339" r:id="rId20"/>
-    <p:sldId id="350" r:id="rId21"/>
+    <p:sldId id="340" r:id="rId5"/>
+    <p:sldId id="357" r:id="rId6"/>
+    <p:sldId id="347" r:id="rId7"/>
+    <p:sldId id="354" r:id="rId8"/>
+    <p:sldId id="348" r:id="rId9"/>
+    <p:sldId id="349" r:id="rId10"/>
+    <p:sldId id="346" r:id="rId11"/>
+    <p:sldId id="335" r:id="rId12"/>
+    <p:sldId id="355" r:id="rId13"/>
+    <p:sldId id="356" r:id="rId14"/>
+    <p:sldId id="337" r:id="rId15"/>
+    <p:sldId id="341" r:id="rId16"/>
+    <p:sldId id="342" r:id="rId17"/>
+    <p:sldId id="352" r:id="rId18"/>
+    <p:sldId id="351" r:id="rId19"/>
+    <p:sldId id="353" r:id="rId20"/>
+    <p:sldId id="339" r:id="rId21"/>
+    <p:sldId id="350" r:id="rId22"/>
   </p:sldIdLst>
   <p:sldSz cx="9144000" cy="6858000" type="screen4x3"/>
   <p:notesSz cx="6858000" cy="9144000"/>
@@ -701,10 +702,7 @@
           <a:bodyPr/>
           <a:lstStyle/>
           <a:p>
-            <a:r>
-              <a:rPr lang="en-US"/>
-              <a:t>Colors indicate different kinds of annotations in CAMEO</a:t>
-            </a:r>
+            <a:endParaRPr lang="en-US"/>
           </a:p>
         </p:txBody>
       </p:sp>
@@ -725,7 +723,7 @@
           <a:p>
             <a:fld id="{9D3E0FAC-92B7-4344-B8CE-D78B9752AB0B}" type="slidenum">
               <a:rPr lang="en-US" smtClean="0"/>
-              <a:t>7</a:t>
+              <a:t>4</a:t>
             </a:fld>
             <a:endParaRPr lang="en-US"/>
           </a:p>
@@ -734,7 +732,7 @@
     </p:spTree>
     <p:extLst>
       <p:ext uri="{BB962C8B-B14F-4D97-AF65-F5344CB8AC3E}">
-        <p14:creationId xmlns:p14="http://schemas.microsoft.com/office/powerpoint/2010/main" val="3267090571"/>
+        <p14:creationId xmlns:p14="http://schemas.microsoft.com/office/powerpoint/2010/main" val="2953885999"/>
       </p:ext>
     </p:extLst>
   </p:cSld>
@@ -788,7 +786,10 @@
           <a:bodyPr/>
           <a:lstStyle/>
           <a:p>
-            <a:endParaRPr lang="en-US"/>
+            <a:r>
+              <a:rPr lang="en-US"/>
+              <a:t>Colors indicate different kinds of annotations in CAMEO</a:t>
+            </a:r>
           </a:p>
         </p:txBody>
       </p:sp>
@@ -818,7 +819,7 @@
     </p:spTree>
     <p:extLst>
       <p:ext uri="{BB962C8B-B14F-4D97-AF65-F5344CB8AC3E}">
-        <p14:creationId xmlns:p14="http://schemas.microsoft.com/office/powerpoint/2010/main" val="2953885999"/>
+        <p14:creationId xmlns:p14="http://schemas.microsoft.com/office/powerpoint/2010/main" val="3267090571"/>
       </p:ext>
     </p:extLst>
   </p:cSld>
@@ -896,7 +897,7 @@
           <a:p>
             <a:fld id="{9D3E0FAC-92B7-4344-B8CE-D78B9752AB0B}" type="slidenum">
               <a:rPr lang="en-US" smtClean="0"/>
-              <a:t>10</a:t>
+              <a:t>11</a:t>
             </a:fld>
             <a:endParaRPr lang="en-US"/>
           </a:p>
@@ -983,7 +984,7 @@
           <a:p>
             <a:fld id="{9D3E0FAC-92B7-4344-B8CE-D78B9752AB0B}" type="slidenum">
               <a:rPr lang="en-US" smtClean="0"/>
-              <a:t>14</a:t>
+              <a:t>15</a:t>
             </a:fld>
             <a:endParaRPr lang="en-US"/>
           </a:p>
@@ -1067,7 +1068,7 @@
           <a:p>
             <a:fld id="{9D3E0FAC-92B7-4344-B8CE-D78B9752AB0B}" type="slidenum">
               <a:rPr lang="en-US" smtClean="0"/>
-              <a:t>19</a:t>
+              <a:t>20</a:t>
             </a:fld>
             <a:endParaRPr lang="en-US"/>
           </a:p>
@@ -4915,6 +4916,123 @@
           <a:p>
             <a:r>
               <a:rPr lang="en-US"/>
+              <a:t>In Social Media</a:t>
+            </a:r>
+            <a:r>
+              <a:rPr lang="mr-IN"/>
+              <a:t>…</a:t>
+            </a:r>
+            <a:endParaRPr lang="en-US"/>
+          </a:p>
+        </p:txBody>
+      </p:sp>
+      <p:sp>
+        <p:nvSpPr>
+          <p:cNvPr id="3" name="Content Placeholder 2"/>
+          <p:cNvSpPr>
+            <a:spLocks noGrp="1"/>
+          </p:cNvSpPr>
+          <p:nvPr>
+            <p:ph idx="1"/>
+          </p:nvPr>
+        </p:nvSpPr>
+        <p:spPr/>
+        <p:txBody>
+          <a:bodyPr/>
+          <a:lstStyle/>
+          <a:p>
+            <a:r>
+              <a:rPr lang="en-US"/>
+              <a:t>Additional problem of first </a:t>
+            </a:r>
+            <a:r>
+              <a:rPr lang="en-US" b="1"/>
+              <a:t>detecting</a:t>
+            </a:r>
+            <a:r>
+              <a:rPr lang="en-US"/>
+              <a:t> whether the tweet is describing an event</a:t>
+            </a:r>
+          </a:p>
+          <a:p>
+            <a:pPr lvl="1"/>
+            <a:r>
+              <a:rPr lang="en-US"/>
+              <a:t>Can be defined as a binary classification problem: </a:t>
+            </a:r>
+            <a:r>
+              <a:rPr lang="en-US" i="1"/>
+              <a:t>does the tweet describe an event or not?</a:t>
+            </a:r>
+          </a:p>
+          <a:p>
+            <a:r>
+              <a:rPr lang="en-US"/>
+              <a:t>Short text of tweet makes this essential for performance</a:t>
+            </a:r>
+          </a:p>
+          <a:p>
+            <a:r>
+              <a:rPr lang="en-US"/>
+              <a:t>Detection and extraction complement each other</a:t>
+            </a:r>
+          </a:p>
+          <a:p>
+            <a:pPr lvl="1"/>
+            <a:r>
+              <a:rPr lang="en-US"/>
+              <a:t>Forces us to decide what an event really is, for the purposes of extraction/detection/inference</a:t>
+            </a:r>
+          </a:p>
+        </p:txBody>
+      </p:sp>
+    </p:spTree>
+    <p:extLst>
+      <p:ext uri="{BB962C8B-B14F-4D97-AF65-F5344CB8AC3E}">
+        <p14:creationId xmlns:p14="http://schemas.microsoft.com/office/powerpoint/2010/main" val="260022398"/>
+      </p:ext>
+    </p:extLst>
+  </p:cSld>
+  <p:clrMapOvr>
+    <a:masterClrMapping/>
+  </p:clrMapOvr>
+</p:sld>
+</file>
+
+<file path=ppt/slides/slide11.xml><?xml version="1.0" encoding="utf-8"?>
+<p:sld xmlns:a="http://schemas.openxmlformats.org/drawingml/2006/main" xmlns:r="http://schemas.openxmlformats.org/officeDocument/2006/relationships" xmlns:p="http://schemas.openxmlformats.org/presentationml/2006/main">
+  <p:cSld>
+    <p:spTree>
+      <p:nvGrpSpPr>
+        <p:cNvPr id="1" name=""/>
+        <p:cNvGrpSpPr/>
+        <p:nvPr/>
+      </p:nvGrpSpPr>
+      <p:grpSpPr>
+        <a:xfrm>
+          <a:off x="0" y="0"/>
+          <a:ext cx="0" cy="0"/>
+          <a:chOff x="0" y="0"/>
+          <a:chExt cx="0" cy="0"/>
+        </a:xfrm>
+      </p:grpSpPr>
+      <p:sp>
+        <p:nvSpPr>
+          <p:cNvPr id="2" name="Title 1"/>
+          <p:cNvSpPr>
+            <a:spLocks noGrp="1"/>
+          </p:cNvSpPr>
+          <p:nvPr>
+            <p:ph type="title"/>
+          </p:nvPr>
+        </p:nvSpPr>
+        <p:spPr/>
+        <p:txBody>
+          <a:bodyPr/>
+          <a:lstStyle/>
+          <a:p>
+            <a:r>
+              <a:rPr lang="en-US"/>
               <a:t>An Example Workflow</a:t>
             </a:r>
             <a:endParaRPr lang="en-US" dirty="0"/>
@@ -4926,7 +5044,7 @@
           <p:cNvPr id="4" name="Picture 3">
             <a:extLst>
               <a:ext uri="{FF2B5EF4-FFF2-40B4-BE49-F238E27FC236}">
-                <a16:creationId xmlns:a16="http://schemas.microsoft.com/office/drawing/2014/main" xmlns="" id="{A5FA5E3F-93A3-49D6-87CB-54DA033C241C}"/>
+                <a16:creationId xmlns="" xmlns:a16="http://schemas.microsoft.com/office/drawing/2014/main" id="{A5FA5E3F-93A3-49D6-87CB-54DA033C241C}"/>
               </a:ext>
             </a:extLst>
           </p:cNvPr>
@@ -4964,7 +5082,7 @@
 </p:sld>
 </file>
 
-<file path=ppt/slides/slide11.xml><?xml version="1.0" encoding="utf-8"?>
+<file path=ppt/slides/slide12.xml><?xml version="1.0" encoding="utf-8"?>
 <p:sld xmlns:a="http://schemas.openxmlformats.org/drawingml/2006/main" xmlns:r="http://schemas.openxmlformats.org/officeDocument/2006/relationships" xmlns:p="http://schemas.openxmlformats.org/presentationml/2006/main">
   <p:cSld>
     <p:spTree>
@@ -5149,7 +5267,7 @@
 </p:sld>
 </file>
 
-<file path=ppt/slides/slide12.xml><?xml version="1.0" encoding="utf-8"?>
+<file path=ppt/slides/slide13.xml><?xml version="1.0" encoding="utf-8"?>
 <p:sld xmlns:a="http://schemas.openxmlformats.org/drawingml/2006/main" xmlns:r="http://schemas.openxmlformats.org/officeDocument/2006/relationships" xmlns:p="http://schemas.openxmlformats.org/presentationml/2006/main">
   <p:cSld>
     <p:spTree>
@@ -5329,7 +5447,7 @@
 </p:sld>
 </file>
 
-<file path=ppt/slides/slide13.xml><?xml version="1.0" encoding="utf-8"?>
+<file path=ppt/slides/slide14.xml><?xml version="1.0" encoding="utf-8"?>
 <p:sld xmlns:a="http://schemas.openxmlformats.org/drawingml/2006/main" xmlns:r="http://schemas.openxmlformats.org/officeDocument/2006/relationships" xmlns:p="http://schemas.openxmlformats.org/presentationml/2006/main">
   <p:cSld>
     <p:spTree>
@@ -5351,7 +5469,7 @@
           <p:cNvPr id="2" name="Title 1">
             <a:extLst>
               <a:ext uri="{FF2B5EF4-FFF2-40B4-BE49-F238E27FC236}">
-                <a16:creationId xmlns:a16="http://schemas.microsoft.com/office/drawing/2014/main" xmlns="" id="{D6B083CC-4209-47D3-8AFB-A755190E41BB}"/>
+                <a16:creationId xmlns="" xmlns:a16="http://schemas.microsoft.com/office/drawing/2014/main" id="{D6B083CC-4209-47D3-8AFB-A755190E41BB}"/>
               </a:ext>
             </a:extLst>
           </p:cNvPr>
@@ -5379,7 +5497,7 @@
           <p:cNvPr id="3" name="Content Placeholder 2">
             <a:extLst>
               <a:ext uri="{FF2B5EF4-FFF2-40B4-BE49-F238E27FC236}">
-                <a16:creationId xmlns:a16="http://schemas.microsoft.com/office/drawing/2014/main" xmlns="" id="{21A045AF-1B0C-473F-B2BD-16CC029381CC}"/>
+                <a16:creationId xmlns="" xmlns:a16="http://schemas.microsoft.com/office/drawing/2014/main" id="{21A045AF-1B0C-473F-B2BD-16CC029381CC}"/>
               </a:ext>
             </a:extLst>
           </p:cNvPr>
@@ -5442,7 +5560,7 @@
           <p:cNvPr id="4" name="Content Placeholder 2">
             <a:extLst>
               <a:ext uri="{FF2B5EF4-FFF2-40B4-BE49-F238E27FC236}">
-                <a16:creationId xmlns:a16="http://schemas.microsoft.com/office/drawing/2014/main" xmlns="" id="{560166D7-7B6D-4B68-B8AE-1C1CC6E70202}"/>
+                <a16:creationId xmlns="" xmlns:a16="http://schemas.microsoft.com/office/drawing/2014/main" id="{560166D7-7B6D-4B68-B8AE-1C1CC6E70202}"/>
               </a:ext>
             </a:extLst>
           </p:cNvPr>
@@ -5669,7 +5787,7 @@
           <p:cNvPr id="5" name="Arrow: Right 4">
             <a:extLst>
               <a:ext uri="{FF2B5EF4-FFF2-40B4-BE49-F238E27FC236}">
-                <a16:creationId xmlns:a16="http://schemas.microsoft.com/office/drawing/2014/main" xmlns="" id="{D1E8C985-9E37-43C2-AD20-259A38EF2B2D}"/>
+                <a16:creationId xmlns="" xmlns:a16="http://schemas.microsoft.com/office/drawing/2014/main" id="{D1E8C985-9E37-43C2-AD20-259A38EF2B2D}"/>
               </a:ext>
             </a:extLst>
           </p:cNvPr>
@@ -5720,7 +5838,7 @@
           <p:cNvPr id="7" name="Content Placeholder 2">
             <a:extLst>
               <a:ext uri="{FF2B5EF4-FFF2-40B4-BE49-F238E27FC236}">
-                <a16:creationId xmlns:a16="http://schemas.microsoft.com/office/drawing/2014/main" xmlns="" id="{5DE865FC-39D0-4B3E-808A-72F7CCD94CD8}"/>
+                <a16:creationId xmlns="" xmlns:a16="http://schemas.microsoft.com/office/drawing/2014/main" id="{5DE865FC-39D0-4B3E-808A-72F7CCD94CD8}"/>
               </a:ext>
             </a:extLst>
           </p:cNvPr>
@@ -5927,7 +6045,7 @@
           <p:cNvPr id="8" name="Arrow: Right 7">
             <a:extLst>
               <a:ext uri="{FF2B5EF4-FFF2-40B4-BE49-F238E27FC236}">
-                <a16:creationId xmlns:a16="http://schemas.microsoft.com/office/drawing/2014/main" xmlns="" id="{3AB65389-B784-4AB6-BC15-A38C68139767}"/>
+                <a16:creationId xmlns="" xmlns:a16="http://schemas.microsoft.com/office/drawing/2014/main" id="{3AB65389-B784-4AB6-BC15-A38C68139767}"/>
               </a:ext>
             </a:extLst>
           </p:cNvPr>
@@ -5978,7 +6096,7 @@
           <p:cNvPr id="9" name="TextBox 8">
             <a:extLst>
               <a:ext uri="{FF2B5EF4-FFF2-40B4-BE49-F238E27FC236}">
-                <a16:creationId xmlns:a16="http://schemas.microsoft.com/office/drawing/2014/main" xmlns="" id="{204BC1CD-1EE2-4208-818E-52B98A3ECF1E}"/>
+                <a16:creationId xmlns="" xmlns:a16="http://schemas.microsoft.com/office/drawing/2014/main" id="{204BC1CD-1EE2-4208-818E-52B98A3ECF1E}"/>
               </a:ext>
             </a:extLst>
           </p:cNvPr>
@@ -6026,7 +6144,7 @@
 </p:sld>
 </file>
 
-<file path=ppt/slides/slide14.xml><?xml version="1.0" encoding="utf-8"?>
+<file path=ppt/slides/slide15.xml><?xml version="1.0" encoding="utf-8"?>
 <p:sld xmlns:a="http://schemas.openxmlformats.org/drawingml/2006/main" xmlns:r="http://schemas.openxmlformats.org/officeDocument/2006/relationships" xmlns:p="http://schemas.openxmlformats.org/presentationml/2006/main">
   <p:cSld>
     <p:spTree>
@@ -6078,7 +6196,7 @@
           <p:cNvPr id="4" name="Picture 3">
             <a:extLst>
               <a:ext uri="{FF2B5EF4-FFF2-40B4-BE49-F238E27FC236}">
-                <a16:creationId xmlns:a16="http://schemas.microsoft.com/office/drawing/2014/main" xmlns="" id="{0B14148A-CDBC-4010-8E64-009C4BA6BA7A}"/>
+                <a16:creationId xmlns="" xmlns:a16="http://schemas.microsoft.com/office/drawing/2014/main" id="{0B14148A-CDBC-4010-8E64-009C4BA6BA7A}"/>
               </a:ext>
             </a:extLst>
           </p:cNvPr>
@@ -6158,7 +6276,7 @@
           <p:cNvPr id="5" name="TextBox 4">
             <a:extLst>
               <a:ext uri="{FF2B5EF4-FFF2-40B4-BE49-F238E27FC236}">
-                <a16:creationId xmlns:a16="http://schemas.microsoft.com/office/drawing/2014/main" xmlns="" id="{4507C763-8035-4578-80B5-FB9A63F2A85A}"/>
+                <a16:creationId xmlns="" xmlns:a16="http://schemas.microsoft.com/office/drawing/2014/main" id="{4507C763-8035-4578-80B5-FB9A63F2A85A}"/>
               </a:ext>
             </a:extLst>
           </p:cNvPr>
@@ -6227,7 +6345,7 @@
           <p:cNvPr id="6" name="TextBox 5">
             <a:extLst>
               <a:ext uri="{FF2B5EF4-FFF2-40B4-BE49-F238E27FC236}">
-                <a16:creationId xmlns:a16="http://schemas.microsoft.com/office/drawing/2014/main" xmlns="" id="{F03856F9-56A1-47D0-8C19-210D0A5CE5E0}"/>
+                <a16:creationId xmlns="" xmlns:a16="http://schemas.microsoft.com/office/drawing/2014/main" id="{F03856F9-56A1-47D0-8C19-210D0A5CE5E0}"/>
               </a:ext>
             </a:extLst>
           </p:cNvPr>
@@ -6266,183 +6384,6 @@
     <p:extLst>
       <p:ext uri="{BB962C8B-B14F-4D97-AF65-F5344CB8AC3E}">
         <p14:creationId xmlns:p14="http://schemas.microsoft.com/office/powerpoint/2010/main" val="351011376"/>
-      </p:ext>
-    </p:extLst>
-  </p:cSld>
-  <p:clrMapOvr>
-    <a:masterClrMapping/>
-  </p:clrMapOvr>
-</p:sld>
-</file>
-
-<file path=ppt/slides/slide15.xml><?xml version="1.0" encoding="utf-8"?>
-<p:sld xmlns:a="http://schemas.openxmlformats.org/drawingml/2006/main" xmlns:r="http://schemas.openxmlformats.org/officeDocument/2006/relationships" xmlns:p="http://schemas.openxmlformats.org/presentationml/2006/main">
-  <p:cSld>
-    <p:spTree>
-      <p:nvGrpSpPr>
-        <p:cNvPr id="1" name=""/>
-        <p:cNvGrpSpPr/>
-        <p:nvPr/>
-      </p:nvGrpSpPr>
-      <p:grpSpPr>
-        <a:xfrm>
-          <a:off x="0" y="0"/>
-          <a:ext cx="0" cy="0"/>
-          <a:chOff x="0" y="0"/>
-          <a:chExt cx="0" cy="0"/>
-        </a:xfrm>
-      </p:grpSpPr>
-      <p:sp>
-        <p:nvSpPr>
-          <p:cNvPr id="2" name="Title 1">
-            <a:extLst>
-              <a:ext uri="{FF2B5EF4-FFF2-40B4-BE49-F238E27FC236}">
-                <a16:creationId xmlns:a16="http://schemas.microsoft.com/office/drawing/2014/main" xmlns="" id="{F5EA10E8-179C-48CA-A962-83AC7A417653}"/>
-              </a:ext>
-            </a:extLst>
-          </p:cNvPr>
-          <p:cNvSpPr>
-            <a:spLocks noGrp="1"/>
-          </p:cNvSpPr>
-          <p:nvPr>
-            <p:ph type="title"/>
-          </p:nvPr>
-        </p:nvSpPr>
-        <p:spPr/>
-        <p:txBody>
-          <a:bodyPr/>
-          <a:lstStyle/>
-          <a:p>
-            <a:r>
-              <a:rPr lang="en-US"/>
-              <a:t>Feature Representation</a:t>
-            </a:r>
-          </a:p>
-        </p:txBody>
-      </p:sp>
-      <p:pic>
-        <p:nvPicPr>
-          <p:cNvPr id="4" name="Picture 3">
-            <a:extLst>
-              <a:ext uri="{FF2B5EF4-FFF2-40B4-BE49-F238E27FC236}">
-                <a16:creationId xmlns:a16="http://schemas.microsoft.com/office/drawing/2014/main" xmlns="" id="{3B9B8793-346A-43E4-A56F-D565544760F6}"/>
-              </a:ext>
-            </a:extLst>
-          </p:cNvPr>
-          <p:cNvPicPr>
-            <a:picLocks noChangeAspect="1"/>
-          </p:cNvPicPr>
-          <p:nvPr/>
-        </p:nvPicPr>
-        <p:blipFill>
-          <a:blip r:embed="rId2"/>
-          <a:stretch>
-            <a:fillRect/>
-          </a:stretch>
-        </p:blipFill>
-        <p:spPr>
-          <a:xfrm>
-            <a:off x="558800" y="2414952"/>
-            <a:ext cx="7331489" cy="3693747"/>
-          </a:xfrm>
-          <a:prstGeom prst="rect">
-            <a:avLst/>
-          </a:prstGeom>
-        </p:spPr>
-      </p:pic>
-      <p:sp>
-        <p:nvSpPr>
-          <p:cNvPr id="5" name="TextBox 4">
-            <a:extLst>
-              <a:ext uri="{FF2B5EF4-FFF2-40B4-BE49-F238E27FC236}">
-                <a16:creationId xmlns:a16="http://schemas.microsoft.com/office/drawing/2014/main" xmlns="" id="{D0A91EA1-7BAA-4735-8ED1-BC46AD3776C9}"/>
-              </a:ext>
-            </a:extLst>
-          </p:cNvPr>
-          <p:cNvSpPr txBox="1"/>
-          <p:nvPr/>
-        </p:nvSpPr>
-        <p:spPr>
-          <a:xfrm>
-            <a:off x="455024" y="1632858"/>
-            <a:ext cx="7000058" cy="646331"/>
-          </a:xfrm>
-          <a:prstGeom prst="rect">
-            <a:avLst/>
-          </a:prstGeom>
-          <a:noFill/>
-        </p:spPr>
-        <p:txBody>
-          <a:bodyPr wrap="none" rtlCol="0">
-            <a:spAutoFit/>
-          </a:bodyPr>
-          <a:lstStyle/>
-          <a:p>
-            <a:pPr marL="285750" indent="-285750">
-              <a:buFont typeface="Arial" panose="020B0604020202020204" pitchFamily="34" charset="0"/>
-              <a:buChar char="•"/>
-            </a:pPr>
-            <a:r>
-              <a:rPr lang="en-US"/>
-              <a:t>In general, many features are necessary to achieve good performance</a:t>
-            </a:r>
-          </a:p>
-          <a:p>
-            <a:pPr marL="285750" indent="-285750">
-              <a:buFont typeface="Arial" panose="020B0604020202020204" pitchFamily="34" charset="0"/>
-              <a:buChar char="•"/>
-            </a:pPr>
-            <a:r>
-              <a:rPr lang="en-US"/>
-              <a:t>See survey by Atefeh and Khreich (2013) for full list</a:t>
-            </a:r>
-          </a:p>
-        </p:txBody>
-      </p:sp>
-      <p:sp>
-        <p:nvSpPr>
-          <p:cNvPr id="6" name="TextBox 5">
-            <a:extLst>
-              <a:ext uri="{FF2B5EF4-FFF2-40B4-BE49-F238E27FC236}">
-                <a16:creationId xmlns:a16="http://schemas.microsoft.com/office/drawing/2014/main" xmlns="" id="{CA201DBD-31A6-4FD9-BDA0-F2352DC96A44}"/>
-              </a:ext>
-            </a:extLst>
-          </p:cNvPr>
-          <p:cNvSpPr txBox="1"/>
-          <p:nvPr/>
-        </p:nvSpPr>
-        <p:spPr>
-          <a:xfrm>
-            <a:off x="6570132" y="6484358"/>
-            <a:ext cx="2573867" cy="307777"/>
-          </a:xfrm>
-          <a:prstGeom prst="rect">
-            <a:avLst/>
-          </a:prstGeom>
-          <a:noFill/>
-        </p:spPr>
-        <p:txBody>
-          <a:bodyPr wrap="square" rtlCol="0">
-            <a:spAutoFit/>
-          </a:bodyPr>
-          <a:lstStyle/>
-          <a:p>
-            <a:pPr algn="r"/>
-            <a:r>
-              <a:rPr lang="en-US" sz="1400">
-                <a:solidFill>
-                  <a:srgbClr val="002060"/>
-                </a:solidFill>
-              </a:rPr>
-              <a:t>(Atefeh and Khreich, 2013)</a:t>
-            </a:r>
-          </a:p>
-        </p:txBody>
-      </p:sp>
-    </p:spTree>
-    <p:extLst>
-      <p:ext uri="{BB962C8B-B14F-4D97-AF65-F5344CB8AC3E}">
-        <p14:creationId xmlns:p14="http://schemas.microsoft.com/office/powerpoint/2010/main" val="3240889219"/>
       </p:ext>
     </p:extLst>
   </p:cSld>
@@ -6474,7 +6415,7 @@
           <p:cNvPr id="2" name="Title 1">
             <a:extLst>
               <a:ext uri="{FF2B5EF4-FFF2-40B4-BE49-F238E27FC236}">
-                <a16:creationId xmlns:a16="http://schemas.microsoft.com/office/drawing/2014/main" xmlns="" id="{D2E30C03-57D3-4E50-9234-BB15CDB00D06}"/>
+                <a16:creationId xmlns="" xmlns:a16="http://schemas.microsoft.com/office/drawing/2014/main" id="{F5EA10E8-179C-48CA-A962-83AC7A417653}"/>
               </a:ext>
             </a:extLst>
           </p:cNvPr>
@@ -6492,64 +6433,96 @@
           <a:p>
             <a:r>
               <a:rPr lang="en-US"/>
-              <a:t>Case Study: Joint Event Extraction</a:t>
-            </a:r>
-          </a:p>
-        </p:txBody>
-      </p:sp>
-      <p:sp>
-        <p:nvSpPr>
-          <p:cNvPr id="3" name="Content Placeholder 2">
+              <a:t>Feature Representation</a:t>
+            </a:r>
+          </a:p>
+        </p:txBody>
+      </p:sp>
+      <p:pic>
+        <p:nvPicPr>
+          <p:cNvPr id="4" name="Picture 3">
             <a:extLst>
               <a:ext uri="{FF2B5EF4-FFF2-40B4-BE49-F238E27FC236}">
-                <a16:creationId xmlns:a16="http://schemas.microsoft.com/office/drawing/2014/main" xmlns="" id="{CE3A5C99-9574-4694-879F-E8E267AB6706}"/>
+                <a16:creationId xmlns="" xmlns:a16="http://schemas.microsoft.com/office/drawing/2014/main" id="{3B9B8793-346A-43E4-A56F-D565544760F6}"/>
               </a:ext>
             </a:extLst>
           </p:cNvPr>
-          <p:cNvSpPr>
-            <a:spLocks noGrp="1"/>
-          </p:cNvSpPr>
-          <p:nvPr>
-            <p:ph idx="1"/>
-          </p:nvPr>
-        </p:nvSpPr>
-        <p:spPr/>
-        <p:txBody>
-          <a:bodyPr/>
-          <a:lstStyle/>
-          <a:p>
-            <a:r>
-              <a:rPr lang="en-US"/>
-              <a:t>Key idea was to model event and entity extraction as a joint problem</a:t>
-            </a:r>
-          </a:p>
-          <a:p>
-            <a:pPr lvl="1"/>
-            <a:r>
-              <a:rPr lang="en-US"/>
-              <a:t>Model the jointness using a graphical model such as factor graph</a:t>
-            </a:r>
-          </a:p>
-          <a:p>
-            <a:r>
-              <a:rPr lang="en-US"/>
-              <a:t>Outperformed state-of-the-art systems at the time</a:t>
-            </a:r>
-          </a:p>
-          <a:p>
-            <a:r>
-              <a:rPr lang="en-US"/>
-              <a:t>Joint models continue to be state-of-the-art</a:t>
-            </a:r>
-          </a:p>
-        </p:txBody>
-      </p:sp>
-      <p:sp>
-        <p:nvSpPr>
-          <p:cNvPr id="4" name="TextBox 3">
+          <p:cNvPicPr>
+            <a:picLocks noChangeAspect="1"/>
+          </p:cNvPicPr>
+          <p:nvPr/>
+        </p:nvPicPr>
+        <p:blipFill>
+          <a:blip r:embed="rId2"/>
+          <a:stretch>
+            <a:fillRect/>
+          </a:stretch>
+        </p:blipFill>
+        <p:spPr>
+          <a:xfrm>
+            <a:off x="558800" y="2414952"/>
+            <a:ext cx="7331489" cy="3693747"/>
+          </a:xfrm>
+          <a:prstGeom prst="rect">
+            <a:avLst/>
+          </a:prstGeom>
+        </p:spPr>
+      </p:pic>
+      <p:sp>
+        <p:nvSpPr>
+          <p:cNvPr id="5" name="TextBox 4">
             <a:extLst>
               <a:ext uri="{FF2B5EF4-FFF2-40B4-BE49-F238E27FC236}">
-                <a16:creationId xmlns:a16="http://schemas.microsoft.com/office/drawing/2014/main" xmlns="" id="{3AB6A18D-279B-478B-9723-802AFAA889CC}"/>
+                <a16:creationId xmlns="" xmlns:a16="http://schemas.microsoft.com/office/drawing/2014/main" id="{D0A91EA1-7BAA-4735-8ED1-BC46AD3776C9}"/>
+              </a:ext>
+            </a:extLst>
+          </p:cNvPr>
+          <p:cNvSpPr txBox="1"/>
+          <p:nvPr/>
+        </p:nvSpPr>
+        <p:spPr>
+          <a:xfrm>
+            <a:off x="455024" y="1632858"/>
+            <a:ext cx="7000058" cy="646331"/>
+          </a:xfrm>
+          <a:prstGeom prst="rect">
+            <a:avLst/>
+          </a:prstGeom>
+          <a:noFill/>
+        </p:spPr>
+        <p:txBody>
+          <a:bodyPr wrap="none" rtlCol="0">
+            <a:spAutoFit/>
+          </a:bodyPr>
+          <a:lstStyle/>
+          <a:p>
+            <a:pPr marL="285750" indent="-285750">
+              <a:buFont typeface="Arial" panose="020B0604020202020204" pitchFamily="34" charset="0"/>
+              <a:buChar char="•"/>
+            </a:pPr>
+            <a:r>
+              <a:rPr lang="en-US"/>
+              <a:t>In general, many features are necessary to achieve good performance</a:t>
+            </a:r>
+          </a:p>
+          <a:p>
+            <a:pPr marL="285750" indent="-285750">
+              <a:buFont typeface="Arial" panose="020B0604020202020204" pitchFamily="34" charset="0"/>
+              <a:buChar char="•"/>
+            </a:pPr>
+            <a:r>
+              <a:rPr lang="en-US"/>
+              <a:t>See survey by Atefeh and Khreich (2013) for full list</a:t>
+            </a:r>
+          </a:p>
+        </p:txBody>
+      </p:sp>
+      <p:sp>
+        <p:nvSpPr>
+          <p:cNvPr id="6" name="TextBox 5">
+            <a:extLst>
+              <a:ext uri="{FF2B5EF4-FFF2-40B4-BE49-F238E27FC236}">
+                <a16:creationId xmlns="" xmlns:a16="http://schemas.microsoft.com/office/drawing/2014/main" id="{CA201DBD-31A6-4FD9-BDA0-F2352DC96A44}"/>
               </a:ext>
             </a:extLst>
           </p:cNvPr>
@@ -6579,7 +6552,7 @@
                   <a:srgbClr val="002060"/>
                 </a:solidFill>
               </a:rPr>
-              <a:t>(Yang and Mitchell, 2016)</a:t>
+              <a:t>(Atefeh and Khreich, 2013)</a:t>
             </a:r>
           </a:p>
         </p:txBody>
@@ -6587,7 +6560,7 @@
     </p:spTree>
     <p:extLst>
       <p:ext uri="{BB962C8B-B14F-4D97-AF65-F5344CB8AC3E}">
-        <p14:creationId xmlns:p14="http://schemas.microsoft.com/office/powerpoint/2010/main" val="2924187494"/>
+        <p14:creationId xmlns:p14="http://schemas.microsoft.com/office/powerpoint/2010/main" val="3240889219"/>
       </p:ext>
     </p:extLst>
   </p:cSld>
@@ -6619,7 +6592,7 @@
           <p:cNvPr id="2" name="Title 1">
             <a:extLst>
               <a:ext uri="{FF2B5EF4-FFF2-40B4-BE49-F238E27FC236}">
-                <a16:creationId xmlns:a16="http://schemas.microsoft.com/office/drawing/2014/main" xmlns="" id="{D2E30C03-57D3-4E50-9234-BB15CDB00D06}"/>
+                <a16:creationId xmlns="" xmlns:a16="http://schemas.microsoft.com/office/drawing/2014/main" id="{D2E30C03-57D3-4E50-9234-BB15CDB00D06}"/>
               </a:ext>
             </a:extLst>
           </p:cNvPr>
@@ -6647,7 +6620,7 @@
           <p:cNvPr id="3" name="Content Placeholder 2">
             <a:extLst>
               <a:ext uri="{FF2B5EF4-FFF2-40B4-BE49-F238E27FC236}">
-                <a16:creationId xmlns:a16="http://schemas.microsoft.com/office/drawing/2014/main" xmlns="" id="{CE3A5C99-9574-4694-879F-E8E267AB6706}"/>
+                <a16:creationId xmlns="" xmlns:a16="http://schemas.microsoft.com/office/drawing/2014/main" id="{CE3A5C99-9574-4694-879F-E8E267AB6706}"/>
               </a:ext>
             </a:extLst>
           </p:cNvPr>
@@ -6658,19 +6631,33 @@
             <p:ph idx="1"/>
           </p:nvPr>
         </p:nvSpPr>
-        <p:spPr>
-          <a:xfrm>
-            <a:off x="590550" y="1546225"/>
-            <a:ext cx="7886700" cy="4351338"/>
-          </a:xfrm>
-        </p:spPr>
+        <p:spPr/>
         <p:txBody>
           <a:bodyPr/>
           <a:lstStyle/>
           <a:p>
             <a:r>
               <a:rPr lang="en-US"/>
-              <a:t>Features used in Yang and Mitchell’s joint IE system</a:t>
+              <a:t>Key idea was to model event and entity extraction as a joint problem</a:t>
+            </a:r>
+          </a:p>
+          <a:p>
+            <a:pPr lvl="1"/>
+            <a:r>
+              <a:rPr lang="en-US"/>
+              <a:t>Model the jointness using a graphical model such as factor graph</a:t>
+            </a:r>
+          </a:p>
+          <a:p>
+            <a:r>
+              <a:rPr lang="en-US"/>
+              <a:t>Outperformed state-of-the-art systems at the time</a:t>
+            </a:r>
+          </a:p>
+          <a:p>
+            <a:r>
+              <a:rPr lang="en-US"/>
+              <a:t>Joint models continue to be state-of-the-art</a:t>
             </a:r>
           </a:p>
         </p:txBody>
@@ -6680,7 +6667,7 @@
           <p:cNvPr id="4" name="TextBox 3">
             <a:extLst>
               <a:ext uri="{FF2B5EF4-FFF2-40B4-BE49-F238E27FC236}">
-                <a16:creationId xmlns:a16="http://schemas.microsoft.com/office/drawing/2014/main" xmlns="" id="{3AB6A18D-279B-478B-9723-802AFAA889CC}"/>
+                <a16:creationId xmlns="" xmlns:a16="http://schemas.microsoft.com/office/drawing/2014/main" id="{3AB6A18D-279B-478B-9723-802AFAA889CC}"/>
               </a:ext>
             </a:extLst>
           </p:cNvPr>
@@ -6715,12 +6702,143 @@
           </a:p>
         </p:txBody>
       </p:sp>
+    </p:spTree>
+    <p:extLst>
+      <p:ext uri="{BB962C8B-B14F-4D97-AF65-F5344CB8AC3E}">
+        <p14:creationId xmlns:p14="http://schemas.microsoft.com/office/powerpoint/2010/main" val="2924187494"/>
+      </p:ext>
+    </p:extLst>
+  </p:cSld>
+  <p:clrMapOvr>
+    <a:masterClrMapping/>
+  </p:clrMapOvr>
+</p:sld>
+</file>
+
+<file path=ppt/slides/slide18.xml><?xml version="1.0" encoding="utf-8"?>
+<p:sld xmlns:a="http://schemas.openxmlformats.org/drawingml/2006/main" xmlns:r="http://schemas.openxmlformats.org/officeDocument/2006/relationships" xmlns:p="http://schemas.openxmlformats.org/presentationml/2006/main">
+  <p:cSld>
+    <p:spTree>
+      <p:nvGrpSpPr>
+        <p:cNvPr id="1" name=""/>
+        <p:cNvGrpSpPr/>
+        <p:nvPr/>
+      </p:nvGrpSpPr>
+      <p:grpSpPr>
+        <a:xfrm>
+          <a:off x="0" y="0"/>
+          <a:ext cx="0" cy="0"/>
+          <a:chOff x="0" y="0"/>
+          <a:chExt cx="0" cy="0"/>
+        </a:xfrm>
+      </p:grpSpPr>
+      <p:sp>
+        <p:nvSpPr>
+          <p:cNvPr id="2" name="Title 1">
+            <a:extLst>
+              <a:ext uri="{FF2B5EF4-FFF2-40B4-BE49-F238E27FC236}">
+                <a16:creationId xmlns="" xmlns:a16="http://schemas.microsoft.com/office/drawing/2014/main" id="{D2E30C03-57D3-4E50-9234-BB15CDB00D06}"/>
+              </a:ext>
+            </a:extLst>
+          </p:cNvPr>
+          <p:cNvSpPr>
+            <a:spLocks noGrp="1"/>
+          </p:cNvSpPr>
+          <p:nvPr>
+            <p:ph type="title"/>
+          </p:nvPr>
+        </p:nvSpPr>
+        <p:spPr/>
+        <p:txBody>
+          <a:bodyPr/>
+          <a:lstStyle/>
+          <a:p>
+            <a:r>
+              <a:rPr lang="en-US"/>
+              <a:t>Case Study: Joint Event Extraction</a:t>
+            </a:r>
+          </a:p>
+        </p:txBody>
+      </p:sp>
+      <p:sp>
+        <p:nvSpPr>
+          <p:cNvPr id="3" name="Content Placeholder 2">
+            <a:extLst>
+              <a:ext uri="{FF2B5EF4-FFF2-40B4-BE49-F238E27FC236}">
+                <a16:creationId xmlns="" xmlns:a16="http://schemas.microsoft.com/office/drawing/2014/main" id="{CE3A5C99-9574-4694-879F-E8E267AB6706}"/>
+              </a:ext>
+            </a:extLst>
+          </p:cNvPr>
+          <p:cNvSpPr>
+            <a:spLocks noGrp="1"/>
+          </p:cNvSpPr>
+          <p:nvPr>
+            <p:ph idx="1"/>
+          </p:nvPr>
+        </p:nvSpPr>
+        <p:spPr>
+          <a:xfrm>
+            <a:off x="590550" y="1546225"/>
+            <a:ext cx="7886700" cy="4351338"/>
+          </a:xfrm>
+        </p:spPr>
+        <p:txBody>
+          <a:bodyPr/>
+          <a:lstStyle/>
+          <a:p>
+            <a:r>
+              <a:rPr lang="en-US"/>
+              <a:t>Features used in Yang and Mitchell’s joint IE system</a:t>
+            </a:r>
+          </a:p>
+        </p:txBody>
+      </p:sp>
+      <p:sp>
+        <p:nvSpPr>
+          <p:cNvPr id="4" name="TextBox 3">
+            <a:extLst>
+              <a:ext uri="{FF2B5EF4-FFF2-40B4-BE49-F238E27FC236}">
+                <a16:creationId xmlns="" xmlns:a16="http://schemas.microsoft.com/office/drawing/2014/main" id="{3AB6A18D-279B-478B-9723-802AFAA889CC}"/>
+              </a:ext>
+            </a:extLst>
+          </p:cNvPr>
+          <p:cNvSpPr txBox="1"/>
+          <p:nvPr/>
+        </p:nvSpPr>
+        <p:spPr>
+          <a:xfrm>
+            <a:off x="6570132" y="6484358"/>
+            <a:ext cx="2573867" cy="307777"/>
+          </a:xfrm>
+          <a:prstGeom prst="rect">
+            <a:avLst/>
+          </a:prstGeom>
+          <a:noFill/>
+        </p:spPr>
+        <p:txBody>
+          <a:bodyPr wrap="square" rtlCol="0">
+            <a:spAutoFit/>
+          </a:bodyPr>
+          <a:lstStyle/>
+          <a:p>
+            <a:pPr algn="r"/>
+            <a:r>
+              <a:rPr lang="en-US" sz="1400">
+                <a:solidFill>
+                  <a:srgbClr val="002060"/>
+                </a:solidFill>
+              </a:rPr>
+              <a:t>(Yang and Mitchell, 2016)</a:t>
+            </a:r>
+          </a:p>
+        </p:txBody>
+      </p:sp>
       <p:pic>
         <p:nvPicPr>
           <p:cNvPr id="5" name="Picture 4">
             <a:extLst>
               <a:ext uri="{FF2B5EF4-FFF2-40B4-BE49-F238E27FC236}">
-                <a16:creationId xmlns:a16="http://schemas.microsoft.com/office/drawing/2014/main" xmlns="" id="{BCC4866D-D367-47A7-A520-E685A7856334}"/>
+                <a16:creationId xmlns="" xmlns:a16="http://schemas.microsoft.com/office/drawing/2014/main" id="{BCC4866D-D367-47A7-A520-E685A7856334}"/>
               </a:ext>
             </a:extLst>
           </p:cNvPr>
@@ -6758,7 +6876,7 @@
 </p:sld>
 </file>
 
-<file path=ppt/slides/slide18.xml><?xml version="1.0" encoding="utf-8"?>
+<file path=ppt/slides/slide19.xml><?xml version="1.0" encoding="utf-8"?>
 <p:sld xmlns:a="http://schemas.openxmlformats.org/drawingml/2006/main" xmlns:r="http://schemas.openxmlformats.org/officeDocument/2006/relationships" xmlns:p="http://schemas.openxmlformats.org/presentationml/2006/main">
   <p:cSld>
     <p:spTree>
@@ -6780,7 +6898,7 @@
           <p:cNvPr id="2" name="Title 1">
             <a:extLst>
               <a:ext uri="{FF2B5EF4-FFF2-40B4-BE49-F238E27FC236}">
-                <a16:creationId xmlns:a16="http://schemas.microsoft.com/office/drawing/2014/main" xmlns="" id="{8AC3B40E-C981-49E2-87BA-1C9578187B92}"/>
+                <a16:creationId xmlns="" xmlns:a16="http://schemas.microsoft.com/office/drawing/2014/main" id="{8AC3B40E-C981-49E2-87BA-1C9578187B92}"/>
               </a:ext>
             </a:extLst>
           </p:cNvPr>
@@ -6808,7 +6926,7 @@
           <p:cNvPr id="3" name="Content Placeholder 2">
             <a:extLst>
               <a:ext uri="{FF2B5EF4-FFF2-40B4-BE49-F238E27FC236}">
-                <a16:creationId xmlns:a16="http://schemas.microsoft.com/office/drawing/2014/main" xmlns="" id="{B455FEAC-3E84-47C6-B4DC-C9E110802F31}"/>
+                <a16:creationId xmlns="" xmlns:a16="http://schemas.microsoft.com/office/drawing/2014/main" id="{B455FEAC-3E84-47C6-B4DC-C9E110802F31}"/>
               </a:ext>
             </a:extLst>
           </p:cNvPr>
@@ -6841,7 +6959,7 @@
           <p:cNvPr id="4" name="TextBox 3">
             <a:extLst>
               <a:ext uri="{FF2B5EF4-FFF2-40B4-BE49-F238E27FC236}">
-                <a16:creationId xmlns:a16="http://schemas.microsoft.com/office/drawing/2014/main" xmlns="" id="{DCE412F9-1200-481A-81D5-AB0FFEFC6BFA}"/>
+                <a16:creationId xmlns="" xmlns:a16="http://schemas.microsoft.com/office/drawing/2014/main" id="{DCE412F9-1200-481A-81D5-AB0FFEFC6BFA}"/>
               </a:ext>
             </a:extLst>
           </p:cNvPr>
@@ -6881,7 +6999,7 @@
           <p:cNvPr id="5" name="Picture 4">
             <a:extLst>
               <a:ext uri="{FF2B5EF4-FFF2-40B4-BE49-F238E27FC236}">
-                <a16:creationId xmlns:a16="http://schemas.microsoft.com/office/drawing/2014/main" xmlns="" id="{959FB340-7B65-4A14-8AE3-DDCA2B871AF8}"/>
+                <a16:creationId xmlns="" xmlns:a16="http://schemas.microsoft.com/office/drawing/2014/main" id="{959FB340-7B65-4A14-8AE3-DDCA2B871AF8}"/>
               </a:ext>
             </a:extLst>
           </p:cNvPr>
@@ -6919,129 +7037,6 @@
 </p:sld>
 </file>
 
-<file path=ppt/slides/slide19.xml><?xml version="1.0" encoding="utf-8"?>
-<p:sld xmlns:a="http://schemas.openxmlformats.org/drawingml/2006/main" xmlns:r="http://schemas.openxmlformats.org/officeDocument/2006/relationships" xmlns:p="http://schemas.openxmlformats.org/presentationml/2006/main">
-  <p:cSld>
-    <p:spTree>
-      <p:nvGrpSpPr>
-        <p:cNvPr id="1" name=""/>
-        <p:cNvGrpSpPr/>
-        <p:nvPr/>
-      </p:nvGrpSpPr>
-      <p:grpSpPr>
-        <a:xfrm>
-          <a:off x="0" y="0"/>
-          <a:ext cx="0" cy="0"/>
-          <a:chOff x="0" y="0"/>
-          <a:chExt cx="0" cy="0"/>
-        </a:xfrm>
-      </p:grpSpPr>
-      <p:sp>
-        <p:nvSpPr>
-          <p:cNvPr id="2" name="Title 1">
-            <a:extLst>
-              <a:ext uri="{FF2B5EF4-FFF2-40B4-BE49-F238E27FC236}">
-                <a16:creationId xmlns:a16="http://schemas.microsoft.com/office/drawing/2014/main" xmlns="" id="{8537C631-3420-40A0-B136-850967FD898E}"/>
-              </a:ext>
-            </a:extLst>
-          </p:cNvPr>
-          <p:cNvSpPr>
-            <a:spLocks noGrp="1"/>
-          </p:cNvSpPr>
-          <p:nvPr>
-            <p:ph type="title"/>
-          </p:nvPr>
-        </p:nvSpPr>
-        <p:spPr/>
-        <p:txBody>
-          <a:bodyPr/>
-          <a:lstStyle/>
-          <a:p>
-            <a:r>
-              <a:rPr lang="en-US"/>
-              <a:t>Open Research Issues</a:t>
-            </a:r>
-          </a:p>
-        </p:txBody>
-      </p:sp>
-      <p:sp>
-        <p:nvSpPr>
-          <p:cNvPr id="3" name="Content Placeholder 2">
-            <a:extLst>
-              <a:ext uri="{FF2B5EF4-FFF2-40B4-BE49-F238E27FC236}">
-                <a16:creationId xmlns:a16="http://schemas.microsoft.com/office/drawing/2014/main" xmlns="" id="{F1CD4C0B-C44A-44A7-B3C4-2460C4A5D01B}"/>
-              </a:ext>
-            </a:extLst>
-          </p:cNvPr>
-          <p:cNvSpPr>
-            <a:spLocks noGrp="1"/>
-          </p:cNvSpPr>
-          <p:nvPr>
-            <p:ph idx="1"/>
-          </p:nvPr>
-        </p:nvSpPr>
-        <p:spPr>
-          <a:xfrm>
-            <a:off x="628649" y="1825625"/>
-            <a:ext cx="8388351" cy="4736042"/>
-          </a:xfrm>
-        </p:spPr>
-        <p:txBody>
-          <a:bodyPr>
-            <a:normAutofit fontScale="92500"/>
-          </a:bodyPr>
-          <a:lstStyle/>
-          <a:p>
-            <a:r>
-              <a:rPr lang="en-US"/>
-              <a:t>Context-based advantages of data-driven, knowledge-driven or hybrid approaches</a:t>
-            </a:r>
-          </a:p>
-          <a:p>
-            <a:r>
-              <a:rPr lang="en-US"/>
-              <a:t>Understanding the limitations of specific event extraction techniques</a:t>
-            </a:r>
-          </a:p>
-          <a:p>
-            <a:r>
-              <a:rPr lang="en-US"/>
-              <a:t>The domain-dependency of event extraction procedures, affecting both their flexibility and effectiveness</a:t>
-            </a:r>
-          </a:p>
-          <a:p>
-            <a:r>
-              <a:rPr lang="en-US"/>
-              <a:t>The scalability of event extraction approaches when dealing with Big Data</a:t>
-            </a:r>
-          </a:p>
-          <a:p>
-            <a:r>
-              <a:rPr lang="en-US"/>
-              <a:t>The complexity of extracted events</a:t>
-            </a:r>
-          </a:p>
-          <a:p>
-            <a:r>
-              <a:rPr lang="en-US"/>
-              <a:t>Better extraction from noisy sources, including social media</a:t>
-            </a:r>
-          </a:p>
-        </p:txBody>
-      </p:sp>
-    </p:spTree>
-    <p:extLst>
-      <p:ext uri="{BB962C8B-B14F-4D97-AF65-F5344CB8AC3E}">
-        <p14:creationId xmlns:p14="http://schemas.microsoft.com/office/powerpoint/2010/main" val="874142107"/>
-      </p:ext>
-    </p:extLst>
-  </p:cSld>
-  <p:clrMapOvr>
-    <a:masterClrMapping/>
-  </p:clrMapOvr>
-</p:sld>
-</file>
-
 <file path=ppt/slides/slide2.xml><?xml version="1.0" encoding="utf-8"?>
 <p:sld xmlns:a="http://schemas.openxmlformats.org/drawingml/2006/main" xmlns:r="http://schemas.openxmlformats.org/officeDocument/2006/relationships" xmlns:p="http://schemas.openxmlformats.org/presentationml/2006/main">
   <p:cSld>
@@ -7064,7 +7059,7 @@
           <p:cNvPr id="2" name="Title 1">
             <a:extLst>
               <a:ext uri="{FF2B5EF4-FFF2-40B4-BE49-F238E27FC236}">
-                <a16:creationId xmlns:a16="http://schemas.microsoft.com/office/drawing/2014/main" xmlns="" id="{47E09107-4194-4BB3-9118-E9B9EDF2C558}"/>
+                <a16:creationId xmlns="" xmlns:a16="http://schemas.microsoft.com/office/drawing/2014/main" id="{47E09107-4194-4BB3-9118-E9B9EDF2C558}"/>
               </a:ext>
             </a:extLst>
           </p:cNvPr>
@@ -7092,7 +7087,7 @@
           <p:cNvPr id="4" name="Picture 3">
             <a:extLst>
               <a:ext uri="{FF2B5EF4-FFF2-40B4-BE49-F238E27FC236}">
-                <a16:creationId xmlns:a16="http://schemas.microsoft.com/office/drawing/2014/main" xmlns="" id="{A2CCD1F4-74E1-4EA7-93C2-50DD90CBF94E}"/>
+                <a16:creationId xmlns="" xmlns:a16="http://schemas.microsoft.com/office/drawing/2014/main" id="{A2CCD1F4-74E1-4EA7-93C2-50DD90CBF94E}"/>
               </a:ext>
             </a:extLst>
           </p:cNvPr>
@@ -7149,6 +7144,129 @@
       </p:grpSpPr>
       <p:sp>
         <p:nvSpPr>
+          <p:cNvPr id="2" name="Title 1">
+            <a:extLst>
+              <a:ext uri="{FF2B5EF4-FFF2-40B4-BE49-F238E27FC236}">
+                <a16:creationId xmlns="" xmlns:a16="http://schemas.microsoft.com/office/drawing/2014/main" id="{8537C631-3420-40A0-B136-850967FD898E}"/>
+              </a:ext>
+            </a:extLst>
+          </p:cNvPr>
+          <p:cNvSpPr>
+            <a:spLocks noGrp="1"/>
+          </p:cNvSpPr>
+          <p:nvPr>
+            <p:ph type="title"/>
+          </p:nvPr>
+        </p:nvSpPr>
+        <p:spPr/>
+        <p:txBody>
+          <a:bodyPr/>
+          <a:lstStyle/>
+          <a:p>
+            <a:r>
+              <a:rPr lang="en-US"/>
+              <a:t>Open Research Issues</a:t>
+            </a:r>
+          </a:p>
+        </p:txBody>
+      </p:sp>
+      <p:sp>
+        <p:nvSpPr>
+          <p:cNvPr id="3" name="Content Placeholder 2">
+            <a:extLst>
+              <a:ext uri="{FF2B5EF4-FFF2-40B4-BE49-F238E27FC236}">
+                <a16:creationId xmlns="" xmlns:a16="http://schemas.microsoft.com/office/drawing/2014/main" id="{F1CD4C0B-C44A-44A7-B3C4-2460C4A5D01B}"/>
+              </a:ext>
+            </a:extLst>
+          </p:cNvPr>
+          <p:cNvSpPr>
+            <a:spLocks noGrp="1"/>
+          </p:cNvSpPr>
+          <p:nvPr>
+            <p:ph idx="1"/>
+          </p:nvPr>
+        </p:nvSpPr>
+        <p:spPr>
+          <a:xfrm>
+            <a:off x="628649" y="1825625"/>
+            <a:ext cx="8388351" cy="4736042"/>
+          </a:xfrm>
+        </p:spPr>
+        <p:txBody>
+          <a:bodyPr>
+            <a:normAutofit fontScale="92500"/>
+          </a:bodyPr>
+          <a:lstStyle/>
+          <a:p>
+            <a:r>
+              <a:rPr lang="en-US"/>
+              <a:t>Context-based advantages of data-driven, knowledge-driven or hybrid approaches</a:t>
+            </a:r>
+          </a:p>
+          <a:p>
+            <a:r>
+              <a:rPr lang="en-US"/>
+              <a:t>Understanding the limitations of specific event extraction techniques</a:t>
+            </a:r>
+          </a:p>
+          <a:p>
+            <a:r>
+              <a:rPr lang="en-US"/>
+              <a:t>The domain-dependency of event extraction procedures, affecting both their flexibility and effectiveness</a:t>
+            </a:r>
+          </a:p>
+          <a:p>
+            <a:r>
+              <a:rPr lang="en-US"/>
+              <a:t>The scalability of event extraction approaches when dealing with Big Data</a:t>
+            </a:r>
+          </a:p>
+          <a:p>
+            <a:r>
+              <a:rPr lang="en-US"/>
+              <a:t>The complexity of extracted events</a:t>
+            </a:r>
+          </a:p>
+          <a:p>
+            <a:r>
+              <a:rPr lang="en-US"/>
+              <a:t>Better extraction from noisy sources, including social media</a:t>
+            </a:r>
+          </a:p>
+        </p:txBody>
+      </p:sp>
+    </p:spTree>
+    <p:extLst>
+      <p:ext uri="{BB962C8B-B14F-4D97-AF65-F5344CB8AC3E}">
+        <p14:creationId xmlns:p14="http://schemas.microsoft.com/office/powerpoint/2010/main" val="874142107"/>
+      </p:ext>
+    </p:extLst>
+  </p:cSld>
+  <p:clrMapOvr>
+    <a:masterClrMapping/>
+  </p:clrMapOvr>
+</p:sld>
+</file>
+
+<file path=ppt/slides/slide21.xml><?xml version="1.0" encoding="utf-8"?>
+<p:sld xmlns:a="http://schemas.openxmlformats.org/drawingml/2006/main" xmlns:r="http://schemas.openxmlformats.org/officeDocument/2006/relationships" xmlns:p="http://schemas.openxmlformats.org/presentationml/2006/main">
+  <p:cSld>
+    <p:spTree>
+      <p:nvGrpSpPr>
+        <p:cNvPr id="1" name=""/>
+        <p:cNvGrpSpPr/>
+        <p:nvPr/>
+      </p:nvGrpSpPr>
+      <p:grpSpPr>
+        <a:xfrm>
+          <a:off x="0" y="0"/>
+          <a:ext cx="0" cy="0"/>
+          <a:chOff x="0" y="0"/>
+          <a:chExt cx="0" cy="0"/>
+        </a:xfrm>
+      </p:grpSpPr>
+      <p:sp>
+        <p:nvSpPr>
           <p:cNvPr id="2" name="Title 1"/>
           <p:cNvSpPr>
             <a:spLocks noGrp="1"/>
@@ -7309,7 +7427,7 @@
           <p:cNvPr id="5" name="Straight Arrow Connector 4">
             <a:extLst>
               <a:ext uri="{FF2B5EF4-FFF2-40B4-BE49-F238E27FC236}">
-                <a16:creationId xmlns:a16="http://schemas.microsoft.com/office/drawing/2014/main" xmlns="" id="{F462F756-659C-4710-82DE-942B1B17E5B8}"/>
+                <a16:creationId xmlns="" xmlns:a16="http://schemas.microsoft.com/office/drawing/2014/main" id="{F462F756-659C-4710-82DE-942B1B17E5B8}"/>
               </a:ext>
             </a:extLst>
           </p:cNvPr>
@@ -7351,7 +7469,7 @@
           <p:cNvPr id="6" name="Straight Arrow Connector 5">
             <a:extLst>
               <a:ext uri="{FF2B5EF4-FFF2-40B4-BE49-F238E27FC236}">
-                <a16:creationId xmlns:a16="http://schemas.microsoft.com/office/drawing/2014/main" xmlns="" id="{2EB44B3D-A1BD-41F6-A459-EE6FE6AAF2B4}"/>
+                <a16:creationId xmlns="" xmlns:a16="http://schemas.microsoft.com/office/drawing/2014/main" id="{2EB44B3D-A1BD-41F6-A459-EE6FE6AAF2B4}"/>
               </a:ext>
             </a:extLst>
           </p:cNvPr>
@@ -7393,7 +7511,7 @@
           <p:cNvPr id="9" name="TextBox 8">
             <a:extLst>
               <a:ext uri="{FF2B5EF4-FFF2-40B4-BE49-F238E27FC236}">
-                <a16:creationId xmlns:a16="http://schemas.microsoft.com/office/drawing/2014/main" xmlns="" id="{4BC24041-891F-4770-8AA2-5EE9E1E12059}"/>
+                <a16:creationId xmlns="" xmlns:a16="http://schemas.microsoft.com/office/drawing/2014/main" id="{4BC24041-891F-4770-8AA2-5EE9E1E12059}"/>
               </a:ext>
             </a:extLst>
           </p:cNvPr>
@@ -7428,7 +7546,7 @@
           <p:cNvPr id="10" name="TextBox 9">
             <a:extLst>
               <a:ext uri="{FF2B5EF4-FFF2-40B4-BE49-F238E27FC236}">
-                <a16:creationId xmlns:a16="http://schemas.microsoft.com/office/drawing/2014/main" xmlns="" id="{A4884E0B-0E26-42F8-A8BC-8ABAE815804F}"/>
+                <a16:creationId xmlns="" xmlns:a16="http://schemas.microsoft.com/office/drawing/2014/main" id="{A4884E0B-0E26-42F8-A8BC-8ABAE815804F}"/>
               </a:ext>
             </a:extLst>
           </p:cNvPr>
@@ -7463,7 +7581,7 @@
           <p:cNvPr id="11" name="TextBox 10">
             <a:extLst>
               <a:ext uri="{FF2B5EF4-FFF2-40B4-BE49-F238E27FC236}">
-                <a16:creationId xmlns:a16="http://schemas.microsoft.com/office/drawing/2014/main" xmlns="" id="{DECCFEC6-9813-4E58-B12C-F055AF0312C0}"/>
+                <a16:creationId xmlns="" xmlns:a16="http://schemas.microsoft.com/office/drawing/2014/main" id="{DECCFEC6-9813-4E58-B12C-F055AF0312C0}"/>
               </a:ext>
             </a:extLst>
           </p:cNvPr>
@@ -7506,7 +7624,7 @@
           <p:cNvPr id="15" name="TextBox 14">
             <a:extLst>
               <a:ext uri="{FF2B5EF4-FFF2-40B4-BE49-F238E27FC236}">
-                <a16:creationId xmlns:a16="http://schemas.microsoft.com/office/drawing/2014/main" xmlns="" id="{63849605-0246-411E-A2F1-308CC50FEB7C}"/>
+                <a16:creationId xmlns="" xmlns:a16="http://schemas.microsoft.com/office/drawing/2014/main" id="{63849605-0246-411E-A2F1-308CC50FEB7C}"/>
               </a:ext>
             </a:extLst>
           </p:cNvPr>
@@ -7595,7 +7713,7 @@
           <p:cNvPr id="12" name="TextBox 11">
             <a:extLst>
               <a:ext uri="{FF2B5EF4-FFF2-40B4-BE49-F238E27FC236}">
-                <a16:creationId xmlns:a16="http://schemas.microsoft.com/office/drawing/2014/main" xmlns="" id="{236A2522-B431-4550-9B96-92248ED5D301}"/>
+                <a16:creationId xmlns="" xmlns:a16="http://schemas.microsoft.com/office/drawing/2014/main" id="{236A2522-B431-4550-9B96-92248ED5D301}"/>
               </a:ext>
             </a:extLst>
           </p:cNvPr>
@@ -7662,7 +7780,13 @@
       </p:grpSpPr>
       <p:sp>
         <p:nvSpPr>
-          <p:cNvPr id="2" name="Title 1"/>
+          <p:cNvPr id="2" name="Title 1">
+            <a:extLst>
+              <a:ext uri="{FF2B5EF4-FFF2-40B4-BE49-F238E27FC236}">
+                <a16:creationId xmlns="" xmlns:a16="http://schemas.microsoft.com/office/drawing/2014/main" id="{789F0914-9F89-48D5-A04A-EB8506D20677}"/>
+              </a:ext>
+            </a:extLst>
+          </p:cNvPr>
           <p:cNvSpPr>
             <a:spLocks noGrp="1"/>
           </p:cNvSpPr>
@@ -7670,109 +7794,214 @@
             <p:ph type="title"/>
           </p:nvPr>
         </p:nvSpPr>
-        <p:spPr/>
+        <p:spPr>
+          <a:xfrm>
+            <a:off x="289560" y="365126"/>
+            <a:ext cx="8686800" cy="1325563"/>
+          </a:xfrm>
+        </p:spPr>
         <p:txBody>
           <a:bodyPr/>
           <a:lstStyle/>
           <a:p>
             <a:r>
               <a:rPr lang="en-US"/>
-              <a:t>Definition: Event Extraction</a:t>
-            </a:r>
-          </a:p>
-        </p:txBody>
-      </p:sp>
-      <p:sp>
-        <p:nvSpPr>
-          <p:cNvPr id="3" name="Content Placeholder 2"/>
-          <p:cNvSpPr>
-            <a:spLocks noGrp="1"/>
-          </p:cNvSpPr>
-          <p:nvPr>
-            <p:ph idx="1"/>
-          </p:nvPr>
-        </p:nvSpPr>
-        <p:spPr/>
-        <p:txBody>
-          <a:bodyPr>
-            <a:normAutofit lnSpcReduction="10000"/>
+              <a:t>Crisis Examples from Twitter</a:t>
+            </a:r>
+            <a:endParaRPr lang="en-US"/>
+          </a:p>
+        </p:txBody>
+      </p:sp>
+      <p:sp>
+        <p:nvSpPr>
+          <p:cNvPr id="5" name="Rectangle 4">
+            <a:extLst>
+              <a:ext uri="{FF2B5EF4-FFF2-40B4-BE49-F238E27FC236}">
+                <a16:creationId xmlns="" xmlns:a16="http://schemas.microsoft.com/office/drawing/2014/main" id="{D5F8127B-3EAF-4D79-B961-9CDCF5DA2CA6}"/>
+              </a:ext>
+            </a:extLst>
+          </p:cNvPr>
+          <p:cNvSpPr/>
+          <p:nvPr/>
+        </p:nvSpPr>
+        <p:spPr>
+          <a:xfrm>
+            <a:off x="735330" y="3295596"/>
+            <a:ext cx="8012430" cy="1200329"/>
+          </a:xfrm>
+          <a:prstGeom prst="rect">
+            <a:avLst/>
+          </a:prstGeom>
+        </p:spPr>
+        <p:txBody>
+          <a:bodyPr wrap="square">
+            <a:spAutoFit/>
           </a:bodyPr>
           <a:lstStyle/>
           <a:p>
             <a:r>
-              <a:rPr lang="en-US"/>
-              <a:t>Given an </a:t>
-            </a:r>
-            <a:r>
-              <a:rPr lang="en-US" i="1"/>
-              <a:t>event ontology O</a:t>
-            </a:r>
-            <a:r>
-              <a:rPr lang="en-US"/>
-              <a:t>, and a text corpus of documents, </a:t>
-            </a:r>
-            <a:r>
-              <a:rPr lang="en-US" b="1"/>
-              <a:t>event extraction </a:t>
-            </a:r>
-            <a:r>
-              <a:rPr lang="en-US"/>
-              <a:t>is the problem of automatically extracting </a:t>
-            </a:r>
-            <a:r>
-              <a:rPr lang="en-US" i="1"/>
-              <a:t>instances</a:t>
-            </a:r>
-            <a:r>
-              <a:rPr lang="en-US"/>
-              <a:t> (‘events’) in terms of the </a:t>
-            </a:r>
-            <a:r>
-              <a:rPr lang="en-US" i="1"/>
-              <a:t>event classes </a:t>
-            </a:r>
-            <a:r>
-              <a:rPr lang="en-US"/>
-              <a:t>in </a:t>
-            </a:r>
-            <a:r>
-              <a:rPr lang="en-US" i="1"/>
-              <a:t>O</a:t>
-            </a:r>
-          </a:p>
-          <a:p>
-            <a:pPr lvl="1"/>
-            <a:r>
-              <a:rPr lang="en-US"/>
-              <a:t>Because of the ontology, events are structured representations amenable to querying/analytics</a:t>
-            </a:r>
-          </a:p>
-          <a:p>
-            <a:pPr lvl="1"/>
-            <a:r>
-              <a:rPr lang="en-US"/>
-              <a:t>What is an ‘event ontology’?</a:t>
-            </a:r>
-            <a:endParaRPr lang="en-US"/>
-          </a:p>
-          <a:p>
-            <a:pPr lvl="1"/>
-            <a:r>
-              <a:rPr lang="en-US"/>
-              <a:t>What do real-world event ontologies ‘look’ like?</a:t>
-            </a:r>
-          </a:p>
-          <a:p>
-            <a:r>
-              <a:rPr lang="en-US"/>
-              <a:t>In many versions of the problem, the ontology is implicit, not known or not required by the extractor</a:t>
-            </a:r>
-          </a:p>
-          <a:p>
-            <a:pPr lvl="1"/>
-            <a:r>
-              <a:rPr lang="en-US"/>
-              <a:t>But still in the background, conceptually</a:t>
+              <a:rPr lang="en-US" sz="2400" dirty="0"/>
+              <a:t>RT </a:t>
+            </a:r>
+            <a:r>
+              <a:rPr lang="en-US" sz="2400" dirty="0">
+                <a:solidFill>
+                  <a:srgbClr val="0070C0"/>
+                </a:solidFill>
+              </a:rPr>
+              <a:t>@Stump4TrumpPAC</a:t>
+            </a:r>
+            <a:r>
+              <a:rPr lang="en-US" sz="2400" dirty="0"/>
+              <a:t>: These are the 58 people killed in the Las Vegas massacre, the deadliest mass shooting in modern U.S. history.. 💐🙏🏻 http…</a:t>
+            </a:r>
+          </a:p>
+        </p:txBody>
+      </p:sp>
+      <p:sp>
+        <p:nvSpPr>
+          <p:cNvPr id="6" name="Rectangle 5">
+            <a:extLst>
+              <a:ext uri="{FF2B5EF4-FFF2-40B4-BE49-F238E27FC236}">
+                <a16:creationId xmlns="" xmlns:a16="http://schemas.microsoft.com/office/drawing/2014/main" id="{1B041536-BBFD-40FB-8C12-11420F37DDEA}"/>
+              </a:ext>
+            </a:extLst>
+          </p:cNvPr>
+          <p:cNvSpPr/>
+          <p:nvPr/>
+        </p:nvSpPr>
+        <p:spPr>
+          <a:xfrm>
+            <a:off x="735330" y="4819140"/>
+            <a:ext cx="8016239" cy="1200329"/>
+          </a:xfrm>
+          <a:prstGeom prst="rect">
+            <a:avLst/>
+          </a:prstGeom>
+        </p:spPr>
+        <p:txBody>
+          <a:bodyPr wrap="square">
+            <a:spAutoFit/>
+          </a:bodyPr>
+          <a:lstStyle/>
+          <a:p>
+            <a:r>
+              <a:rPr lang="en-US" sz="2400" dirty="0"/>
+              <a:t>RT </a:t>
+            </a:r>
+            <a:r>
+              <a:rPr lang="en-US" sz="2400" dirty="0">
+                <a:solidFill>
+                  <a:srgbClr val="0070C0"/>
+                </a:solidFill>
+              </a:rPr>
+              <a:t>@</a:t>
+            </a:r>
+            <a:r>
+              <a:rPr lang="en-US" sz="2400" dirty="0" err="1">
+                <a:solidFill>
+                  <a:srgbClr val="0070C0"/>
+                </a:solidFill>
+              </a:rPr>
+              <a:t>dragoner_JP</a:t>
+            </a:r>
+            <a:r>
+              <a:rPr lang="en-US" sz="2400" dirty="0"/>
+              <a:t>: うげえ……「ラスベガス銃撃の(カナダ人)犠牲者が巨額の医療費に直面」→ Las Vegas shooting victims facing large medical bills </a:t>
+            </a:r>
+            <a:r>
+              <a:rPr lang="en-US" sz="2400" dirty="0">
+                <a:solidFill>
+                  <a:srgbClr val="0070C0"/>
+                </a:solidFill>
+              </a:rPr>
+              <a:t>https://</a:t>
+            </a:r>
+            <a:r>
+              <a:rPr lang="en-US" sz="2400" dirty="0" err="1">
+                <a:solidFill>
+                  <a:srgbClr val="0070C0"/>
+                </a:solidFill>
+              </a:rPr>
+              <a:t>t.co</a:t>
+            </a:r>
+            <a:r>
+              <a:rPr lang="en-US" sz="2400" dirty="0">
+                <a:solidFill>
+                  <a:srgbClr val="0070C0"/>
+                </a:solidFill>
+              </a:rPr>
+              <a:t>/1F3bgH17Jv</a:t>
+            </a:r>
+          </a:p>
+        </p:txBody>
+      </p:sp>
+      <p:sp>
+        <p:nvSpPr>
+          <p:cNvPr id="7" name="Rectangle 6">
+            <a:extLst>
+              <a:ext uri="{FF2B5EF4-FFF2-40B4-BE49-F238E27FC236}">
+                <a16:creationId xmlns="" xmlns:a16="http://schemas.microsoft.com/office/drawing/2014/main" id="{D5F8127B-3EAF-4D79-B961-9CDCF5DA2CA6}"/>
+              </a:ext>
+            </a:extLst>
+          </p:cNvPr>
+          <p:cNvSpPr/>
+          <p:nvPr/>
+        </p:nvSpPr>
+        <p:spPr>
+          <a:xfrm>
+            <a:off x="735330" y="1772052"/>
+            <a:ext cx="8012430" cy="1200329"/>
+          </a:xfrm>
+          <a:prstGeom prst="rect">
+            <a:avLst/>
+          </a:prstGeom>
+        </p:spPr>
+        <p:txBody>
+          <a:bodyPr wrap="square">
+            <a:spAutoFit/>
+          </a:bodyPr>
+          <a:lstStyle/>
+          <a:p>
+            <a:r>
+              <a:rPr lang="en-US" sz="2400" dirty="0"/>
+              <a:t>RT </a:t>
+            </a:r>
+            <a:r>
+              <a:rPr lang="en-US" sz="2400" dirty="0">
+                <a:solidFill>
+                  <a:srgbClr val="0070C0"/>
+                </a:solidFill>
+              </a:rPr>
+              <a:t>@jc_stubbs</a:t>
+            </a:r>
+            <a:r>
+              <a:rPr lang="en-US" sz="2400" dirty="0"/>
+              <a:t>: Another tragic day in </a:t>
+            </a:r>
+            <a:r>
+              <a:rPr lang="en-US" sz="2400" dirty="0">
+                <a:solidFill>
+                  <a:srgbClr val="0070C0"/>
+                </a:solidFill>
+              </a:rPr>
+              <a:t>#Ukraine </a:t>
+            </a:r>
+            <a:r>
+              <a:rPr lang="mr-IN" sz="2400" dirty="0"/>
+              <a:t>–</a:t>
+            </a:r>
+            <a:r>
+              <a:rPr lang="en-US" sz="2400" dirty="0"/>
+              <a:t> More than 50 rebels killed as new leader unleashes assault: </a:t>
+            </a:r>
+            <a:r>
+              <a:rPr lang="en-US" sz="2400" dirty="0">
+                <a:solidFill>
+                  <a:srgbClr val="0070C0"/>
+                </a:solidFill>
+              </a:rPr>
+              <a:t>http://t.co/wcfU3kyAFX</a:t>
             </a:r>
           </a:p>
         </p:txBody>
@@ -7780,7 +8009,7 @@
     </p:spTree>
     <p:extLst>
       <p:ext uri="{BB962C8B-B14F-4D97-AF65-F5344CB8AC3E}">
-        <p14:creationId xmlns:p14="http://schemas.microsoft.com/office/powerpoint/2010/main" val="1680590766"/>
+        <p14:creationId xmlns:p14="http://schemas.microsoft.com/office/powerpoint/2010/main" val="1556995143"/>
       </p:ext>
     </p:extLst>
   </p:cSld>
@@ -7824,6 +8053,293 @@
           <a:p>
             <a:r>
               <a:rPr lang="en-US"/>
+              <a:t>Natural Disaster Examples from Social Media ‘Reporting’</a:t>
+            </a:r>
+          </a:p>
+        </p:txBody>
+      </p:sp>
+      <p:pic>
+        <p:nvPicPr>
+          <p:cNvPr id="4" name="Content Placeholder 3"/>
+          <p:cNvPicPr>
+            <a:picLocks noGrp="1" noChangeAspect="1"/>
+          </p:cNvPicPr>
+          <p:nvPr>
+            <p:ph idx="1"/>
+          </p:nvPr>
+        </p:nvPicPr>
+        <p:blipFill>
+          <a:blip r:embed="rId2">
+            <a:extLst>
+              <a:ext uri="{28A0092B-C50C-407E-A947-70E740481C1C}">
+                <a14:useLocalDpi xmlns:a14="http://schemas.microsoft.com/office/drawing/2010/main" val="0"/>
+              </a:ext>
+            </a:extLst>
+          </a:blip>
+          <a:stretch>
+            <a:fillRect/>
+          </a:stretch>
+        </p:blipFill>
+        <p:spPr>
+          <a:xfrm>
+            <a:off x="585652" y="1924844"/>
+            <a:ext cx="6780348" cy="1236001"/>
+          </a:xfrm>
+        </p:spPr>
+      </p:pic>
+      <p:pic>
+        <p:nvPicPr>
+          <p:cNvPr id="6" name="Picture 5"/>
+          <p:cNvPicPr>
+            <a:picLocks noChangeAspect="1"/>
+          </p:cNvPicPr>
+          <p:nvPr/>
+        </p:nvPicPr>
+        <p:blipFill>
+          <a:blip r:embed="rId3">
+            <a:extLst>
+              <a:ext uri="{28A0092B-C50C-407E-A947-70E740481C1C}">
+                <a14:useLocalDpi xmlns:a14="http://schemas.microsoft.com/office/drawing/2010/main" val="0"/>
+              </a:ext>
+            </a:extLst>
+          </a:blip>
+          <a:stretch>
+            <a:fillRect/>
+          </a:stretch>
+        </p:blipFill>
+        <p:spPr>
+          <a:xfrm>
+            <a:off x="496752" y="3160845"/>
+            <a:ext cx="6615248" cy="1685340"/>
+          </a:xfrm>
+          <a:prstGeom prst="rect">
+            <a:avLst/>
+          </a:prstGeom>
+        </p:spPr>
+      </p:pic>
+      <p:pic>
+        <p:nvPicPr>
+          <p:cNvPr id="7" name="Picture 6"/>
+          <p:cNvPicPr>
+            <a:picLocks noChangeAspect="1"/>
+          </p:cNvPicPr>
+          <p:nvPr/>
+        </p:nvPicPr>
+        <p:blipFill>
+          <a:blip r:embed="rId4">
+            <a:extLst>
+              <a:ext uri="{28A0092B-C50C-407E-A947-70E740481C1C}">
+                <a14:useLocalDpi xmlns:a14="http://schemas.microsoft.com/office/drawing/2010/main" val="0"/>
+              </a:ext>
+            </a:extLst>
+          </a:blip>
+          <a:stretch>
+            <a:fillRect/>
+          </a:stretch>
+        </p:blipFill>
+        <p:spPr>
+          <a:xfrm>
+            <a:off x="554793" y="4846185"/>
+            <a:ext cx="6811207" cy="1605415"/>
+          </a:xfrm>
+          <a:prstGeom prst="rect">
+            <a:avLst/>
+          </a:prstGeom>
+        </p:spPr>
+      </p:pic>
+    </p:spTree>
+    <p:extLst>
+      <p:ext uri="{BB962C8B-B14F-4D97-AF65-F5344CB8AC3E}">
+        <p14:creationId xmlns:p14="http://schemas.microsoft.com/office/powerpoint/2010/main" val="999747502"/>
+      </p:ext>
+    </p:extLst>
+  </p:cSld>
+  <p:clrMapOvr>
+    <a:masterClrMapping/>
+  </p:clrMapOvr>
+</p:sld>
+</file>
+
+<file path=ppt/slides/slide6.xml><?xml version="1.0" encoding="utf-8"?>
+<p:sld xmlns:a="http://schemas.openxmlformats.org/drawingml/2006/main" xmlns:r="http://schemas.openxmlformats.org/officeDocument/2006/relationships" xmlns:p="http://schemas.openxmlformats.org/presentationml/2006/main">
+  <p:cSld>
+    <p:spTree>
+      <p:nvGrpSpPr>
+        <p:cNvPr id="1" name=""/>
+        <p:cNvGrpSpPr/>
+        <p:nvPr/>
+      </p:nvGrpSpPr>
+      <p:grpSpPr>
+        <a:xfrm>
+          <a:off x="0" y="0"/>
+          <a:ext cx="0" cy="0"/>
+          <a:chOff x="0" y="0"/>
+          <a:chExt cx="0" cy="0"/>
+        </a:xfrm>
+      </p:grpSpPr>
+      <p:sp>
+        <p:nvSpPr>
+          <p:cNvPr id="2" name="Title 1"/>
+          <p:cNvSpPr>
+            <a:spLocks noGrp="1"/>
+          </p:cNvSpPr>
+          <p:nvPr>
+            <p:ph type="title"/>
+          </p:nvPr>
+        </p:nvSpPr>
+        <p:spPr/>
+        <p:txBody>
+          <a:bodyPr/>
+          <a:lstStyle/>
+          <a:p>
+            <a:r>
+              <a:rPr lang="en-US"/>
+              <a:t>Definition: Event Extraction</a:t>
+            </a:r>
+          </a:p>
+        </p:txBody>
+      </p:sp>
+      <p:sp>
+        <p:nvSpPr>
+          <p:cNvPr id="3" name="Content Placeholder 2"/>
+          <p:cNvSpPr>
+            <a:spLocks noGrp="1"/>
+          </p:cNvSpPr>
+          <p:nvPr>
+            <p:ph idx="1"/>
+          </p:nvPr>
+        </p:nvSpPr>
+        <p:spPr/>
+        <p:txBody>
+          <a:bodyPr>
+            <a:normAutofit lnSpcReduction="10000"/>
+          </a:bodyPr>
+          <a:lstStyle/>
+          <a:p>
+            <a:r>
+              <a:rPr lang="en-US"/>
+              <a:t>Given an </a:t>
+            </a:r>
+            <a:r>
+              <a:rPr lang="en-US" i="1"/>
+              <a:t>event ontology O</a:t>
+            </a:r>
+            <a:r>
+              <a:rPr lang="en-US"/>
+              <a:t>, and a text corpus of documents, </a:t>
+            </a:r>
+            <a:r>
+              <a:rPr lang="en-US" b="1"/>
+              <a:t>event extraction </a:t>
+            </a:r>
+            <a:r>
+              <a:rPr lang="en-US"/>
+              <a:t>is the problem of automatically extracting </a:t>
+            </a:r>
+            <a:r>
+              <a:rPr lang="en-US" i="1"/>
+              <a:t>instances</a:t>
+            </a:r>
+            <a:r>
+              <a:rPr lang="en-US"/>
+              <a:t> (‘events’) in terms of the </a:t>
+            </a:r>
+            <a:r>
+              <a:rPr lang="en-US" i="1"/>
+              <a:t>event classes </a:t>
+            </a:r>
+            <a:r>
+              <a:rPr lang="en-US"/>
+              <a:t>in </a:t>
+            </a:r>
+            <a:r>
+              <a:rPr lang="en-US" i="1"/>
+              <a:t>O</a:t>
+            </a:r>
+          </a:p>
+          <a:p>
+            <a:pPr lvl="1"/>
+            <a:r>
+              <a:rPr lang="en-US"/>
+              <a:t>Because of the ontology, events are structured representations amenable to querying/analytics</a:t>
+            </a:r>
+          </a:p>
+          <a:p>
+            <a:pPr lvl="1"/>
+            <a:r>
+              <a:rPr lang="en-US"/>
+              <a:t>What is an ‘event ontology’?</a:t>
+            </a:r>
+          </a:p>
+          <a:p>
+            <a:pPr lvl="1"/>
+            <a:r>
+              <a:rPr lang="en-US"/>
+              <a:t>What do real-world event ontologies ‘look’ like?</a:t>
+            </a:r>
+          </a:p>
+          <a:p>
+            <a:r>
+              <a:rPr lang="en-US"/>
+              <a:t>In many versions of the problem, the ontology is implicit, not known or not required by the extractor</a:t>
+            </a:r>
+          </a:p>
+          <a:p>
+            <a:pPr lvl="1"/>
+            <a:r>
+              <a:rPr lang="en-US"/>
+              <a:t>But still in the background, conceptually</a:t>
+            </a:r>
+          </a:p>
+        </p:txBody>
+      </p:sp>
+    </p:spTree>
+    <p:extLst>
+      <p:ext uri="{BB962C8B-B14F-4D97-AF65-F5344CB8AC3E}">
+        <p14:creationId xmlns:p14="http://schemas.microsoft.com/office/powerpoint/2010/main" val="1680590766"/>
+      </p:ext>
+    </p:extLst>
+  </p:cSld>
+  <p:clrMapOvr>
+    <a:masterClrMapping/>
+  </p:clrMapOvr>
+</p:sld>
+</file>
+
+<file path=ppt/slides/slide7.xml><?xml version="1.0" encoding="utf-8"?>
+<p:sld xmlns:a="http://schemas.openxmlformats.org/drawingml/2006/main" xmlns:r="http://schemas.openxmlformats.org/officeDocument/2006/relationships" xmlns:p="http://schemas.openxmlformats.org/presentationml/2006/main">
+  <p:cSld>
+    <p:spTree>
+      <p:nvGrpSpPr>
+        <p:cNvPr id="1" name=""/>
+        <p:cNvGrpSpPr/>
+        <p:nvPr/>
+      </p:nvGrpSpPr>
+      <p:grpSpPr>
+        <a:xfrm>
+          <a:off x="0" y="0"/>
+          <a:ext cx="0" cy="0"/>
+          <a:chOff x="0" y="0"/>
+          <a:chExt cx="0" cy="0"/>
+        </a:xfrm>
+      </p:grpSpPr>
+      <p:sp>
+        <p:nvSpPr>
+          <p:cNvPr id="2" name="Title 1"/>
+          <p:cNvSpPr>
+            <a:spLocks noGrp="1"/>
+          </p:cNvSpPr>
+          <p:nvPr>
+            <p:ph type="title"/>
+          </p:nvPr>
+        </p:nvSpPr>
+        <p:spPr/>
+        <p:txBody>
+          <a:bodyPr/>
+          <a:lstStyle/>
+          <a:p>
+            <a:r>
+              <a:rPr lang="en-US"/>
               <a:t>Ontology Example 1: ACE </a:t>
             </a:r>
           </a:p>
@@ -7942,7 +8458,7 @@
 </p:sld>
 </file>
 
-<file path=ppt/slides/slide6.xml><?xml version="1.0" encoding="utf-8"?>
+<file path=ppt/slides/slide8.xml><?xml version="1.0" encoding="utf-8"?>
 <p:sld xmlns:a="http://schemas.openxmlformats.org/drawingml/2006/main" xmlns:r="http://schemas.openxmlformats.org/officeDocument/2006/relationships" xmlns:p="http://schemas.openxmlformats.org/presentationml/2006/main">
   <p:cSld>
     <p:spTree>
@@ -8083,7 +8599,7 @@
 </p:sld>
 </file>
 
-<file path=ppt/slides/slide7.xml><?xml version="1.0" encoding="utf-8"?>
+<file path=ppt/slides/slide9.xml><?xml version="1.0" encoding="utf-8"?>
 <p:sld xmlns:a="http://schemas.openxmlformats.org/drawingml/2006/main" xmlns:r="http://schemas.openxmlformats.org/officeDocument/2006/relationships" xmlns:p="http://schemas.openxmlformats.org/presentationml/2006/main">
   <p:cSld>
     <p:spTree>
@@ -8196,7 +8712,7 @@
           <p:cNvPr id="7" name="Rectangle 6">
             <a:extLst>
               <a:ext uri="{FF2B5EF4-FFF2-40B4-BE49-F238E27FC236}">
-                <a16:creationId xmlns:a16="http://schemas.microsoft.com/office/drawing/2014/main" xmlns="" id="{30DBC704-3387-4A5D-A8E1-6CA6EEB5ADF6}"/>
+                <a16:creationId xmlns="" xmlns:a16="http://schemas.microsoft.com/office/drawing/2014/main" id="{30DBC704-3387-4A5D-A8E1-6CA6EEB5ADF6}"/>
               </a:ext>
             </a:extLst>
           </p:cNvPr>
@@ -8319,380 +8835,6 @@
     <p:extLst>
       <p:ext uri="{BB962C8B-B14F-4D97-AF65-F5344CB8AC3E}">
         <p14:creationId xmlns:p14="http://schemas.microsoft.com/office/powerpoint/2010/main" val="146941717"/>
-      </p:ext>
-    </p:extLst>
-  </p:cSld>
-  <p:clrMapOvr>
-    <a:masterClrMapping/>
-  </p:clrMapOvr>
-</p:sld>
-</file>
-
-<file path=ppt/slides/slide8.xml><?xml version="1.0" encoding="utf-8"?>
-<p:sld xmlns:a="http://schemas.openxmlformats.org/drawingml/2006/main" xmlns:r="http://schemas.openxmlformats.org/officeDocument/2006/relationships" xmlns:p="http://schemas.openxmlformats.org/presentationml/2006/main">
-  <p:cSld>
-    <p:spTree>
-      <p:nvGrpSpPr>
-        <p:cNvPr id="1" name=""/>
-        <p:cNvGrpSpPr/>
-        <p:nvPr/>
-      </p:nvGrpSpPr>
-      <p:grpSpPr>
-        <a:xfrm>
-          <a:off x="0" y="0"/>
-          <a:ext cx="0" cy="0"/>
-          <a:chOff x="0" y="0"/>
-          <a:chExt cx="0" cy="0"/>
-        </a:xfrm>
-      </p:grpSpPr>
-      <p:sp>
-        <p:nvSpPr>
-          <p:cNvPr id="2" name="Title 1"/>
-          <p:cNvSpPr>
-            <a:spLocks noGrp="1"/>
-          </p:cNvSpPr>
-          <p:nvPr>
-            <p:ph type="title"/>
-          </p:nvPr>
-        </p:nvSpPr>
-        <p:spPr/>
-        <p:txBody>
-          <a:bodyPr/>
-          <a:lstStyle/>
-          <a:p>
-            <a:r>
-              <a:rPr lang="en-US"/>
-              <a:t>In Social Media</a:t>
-            </a:r>
-            <a:r>
-              <a:rPr lang="mr-IN"/>
-              <a:t>…</a:t>
-            </a:r>
-            <a:endParaRPr lang="en-US"/>
-          </a:p>
-        </p:txBody>
-      </p:sp>
-      <p:sp>
-        <p:nvSpPr>
-          <p:cNvPr id="3" name="Content Placeholder 2"/>
-          <p:cNvSpPr>
-            <a:spLocks noGrp="1"/>
-          </p:cNvSpPr>
-          <p:nvPr>
-            <p:ph idx="1"/>
-          </p:nvPr>
-        </p:nvSpPr>
-        <p:spPr/>
-        <p:txBody>
-          <a:bodyPr/>
-          <a:lstStyle/>
-          <a:p>
-            <a:r>
-              <a:rPr lang="en-US"/>
-              <a:t>Additional problem of first </a:t>
-            </a:r>
-            <a:r>
-              <a:rPr lang="en-US" b="1"/>
-              <a:t>detecting</a:t>
-            </a:r>
-            <a:r>
-              <a:rPr lang="en-US"/>
-              <a:t> whether the tweet is describing an event</a:t>
-            </a:r>
-          </a:p>
-          <a:p>
-            <a:pPr lvl="1"/>
-            <a:r>
-              <a:rPr lang="en-US"/>
-              <a:t>Can be defined as a binary classification problem: </a:t>
-            </a:r>
-            <a:r>
-              <a:rPr lang="en-US" i="1"/>
-              <a:t>does the tweet describe an event or not?</a:t>
-            </a:r>
-          </a:p>
-          <a:p>
-            <a:r>
-              <a:rPr lang="en-US"/>
-              <a:t>Short text of tweet makes this essential for performance</a:t>
-            </a:r>
-          </a:p>
-          <a:p>
-            <a:r>
-              <a:rPr lang="en-US"/>
-              <a:t>Detection and extraction complement each other</a:t>
-            </a:r>
-          </a:p>
-          <a:p>
-            <a:pPr lvl="1"/>
-            <a:r>
-              <a:rPr lang="en-US"/>
-              <a:t>Forces us to decide what an event really is, for the purposes of extraction/detection/inference</a:t>
-            </a:r>
-          </a:p>
-        </p:txBody>
-      </p:sp>
-    </p:spTree>
-    <p:extLst>
-      <p:ext uri="{BB962C8B-B14F-4D97-AF65-F5344CB8AC3E}">
-        <p14:creationId xmlns:p14="http://schemas.microsoft.com/office/powerpoint/2010/main" val="260022398"/>
-      </p:ext>
-    </p:extLst>
-  </p:cSld>
-  <p:clrMapOvr>
-    <a:masterClrMapping/>
-  </p:clrMapOvr>
-</p:sld>
-</file>
-
-<file path=ppt/slides/slide9.xml><?xml version="1.0" encoding="utf-8"?>
-<p:sld xmlns:a="http://schemas.openxmlformats.org/drawingml/2006/main" xmlns:r="http://schemas.openxmlformats.org/officeDocument/2006/relationships" xmlns:p="http://schemas.openxmlformats.org/presentationml/2006/main">
-  <p:cSld>
-    <p:spTree>
-      <p:nvGrpSpPr>
-        <p:cNvPr id="1" name=""/>
-        <p:cNvGrpSpPr/>
-        <p:nvPr/>
-      </p:nvGrpSpPr>
-      <p:grpSpPr>
-        <a:xfrm>
-          <a:off x="0" y="0"/>
-          <a:ext cx="0" cy="0"/>
-          <a:chOff x="0" y="0"/>
-          <a:chExt cx="0" cy="0"/>
-        </a:xfrm>
-      </p:grpSpPr>
-      <p:sp>
-        <p:nvSpPr>
-          <p:cNvPr id="2" name="Title 1">
-            <a:extLst>
-              <a:ext uri="{FF2B5EF4-FFF2-40B4-BE49-F238E27FC236}">
-                <a16:creationId xmlns:a16="http://schemas.microsoft.com/office/drawing/2014/main" xmlns="" id="{789F0914-9F89-48D5-A04A-EB8506D20677}"/>
-              </a:ext>
-            </a:extLst>
-          </p:cNvPr>
-          <p:cNvSpPr>
-            <a:spLocks noGrp="1"/>
-          </p:cNvSpPr>
-          <p:nvPr>
-            <p:ph type="title"/>
-          </p:nvPr>
-        </p:nvSpPr>
-        <p:spPr>
-          <a:xfrm>
-            <a:off x="289560" y="365126"/>
-            <a:ext cx="8686800" cy="1325563"/>
-          </a:xfrm>
-        </p:spPr>
-        <p:txBody>
-          <a:bodyPr/>
-          <a:lstStyle/>
-          <a:p>
-            <a:r>
-              <a:rPr lang="en-US"/>
-              <a:t>Event Detection in Twitter: Examples</a:t>
-            </a:r>
-          </a:p>
-        </p:txBody>
-      </p:sp>
-      <p:sp>
-        <p:nvSpPr>
-          <p:cNvPr id="5" name="Rectangle 4">
-            <a:extLst>
-              <a:ext uri="{FF2B5EF4-FFF2-40B4-BE49-F238E27FC236}">
-                <a16:creationId xmlns:a16="http://schemas.microsoft.com/office/drawing/2014/main" xmlns="" id="{D5F8127B-3EAF-4D79-B961-9CDCF5DA2CA6}"/>
-              </a:ext>
-            </a:extLst>
-          </p:cNvPr>
-          <p:cNvSpPr/>
-          <p:nvPr/>
-        </p:nvSpPr>
-        <p:spPr>
-          <a:xfrm>
-            <a:off x="735330" y="3295596"/>
-            <a:ext cx="8012430" cy="1200329"/>
-          </a:xfrm>
-          <a:prstGeom prst="rect">
-            <a:avLst/>
-          </a:prstGeom>
-        </p:spPr>
-        <p:txBody>
-          <a:bodyPr wrap="square">
-            <a:spAutoFit/>
-          </a:bodyPr>
-          <a:lstStyle/>
-          <a:p>
-            <a:r>
-              <a:rPr lang="en-US" sz="2400" dirty="0"/>
-              <a:t>RT </a:t>
-            </a:r>
-            <a:r>
-              <a:rPr lang="en-US" sz="2400" dirty="0">
-                <a:solidFill>
-                  <a:srgbClr val="0070C0"/>
-                </a:solidFill>
-              </a:rPr>
-              <a:t>@Stump4TrumpPAC</a:t>
-            </a:r>
-            <a:r>
-              <a:rPr lang="en-US" sz="2400" dirty="0"/>
-              <a:t>: These are the 58 people killed in the Las Vegas massacre, the deadliest mass shooting in modern U.S. history.. 💐🙏🏻 http…</a:t>
-            </a:r>
-          </a:p>
-        </p:txBody>
-      </p:sp>
-      <p:sp>
-        <p:nvSpPr>
-          <p:cNvPr id="6" name="Rectangle 5">
-            <a:extLst>
-              <a:ext uri="{FF2B5EF4-FFF2-40B4-BE49-F238E27FC236}">
-                <a16:creationId xmlns:a16="http://schemas.microsoft.com/office/drawing/2014/main" xmlns="" id="{1B041536-BBFD-40FB-8C12-11420F37DDEA}"/>
-              </a:ext>
-            </a:extLst>
-          </p:cNvPr>
-          <p:cNvSpPr/>
-          <p:nvPr/>
-        </p:nvSpPr>
-        <p:spPr>
-          <a:xfrm>
-            <a:off x="735330" y="4819140"/>
-            <a:ext cx="8016239" cy="1200329"/>
-          </a:xfrm>
-          <a:prstGeom prst="rect">
-            <a:avLst/>
-          </a:prstGeom>
-        </p:spPr>
-        <p:txBody>
-          <a:bodyPr wrap="square">
-            <a:spAutoFit/>
-          </a:bodyPr>
-          <a:lstStyle/>
-          <a:p>
-            <a:r>
-              <a:rPr lang="en-US" sz="2400" dirty="0"/>
-              <a:t>RT </a:t>
-            </a:r>
-            <a:r>
-              <a:rPr lang="en-US" sz="2400" dirty="0">
-                <a:solidFill>
-                  <a:srgbClr val="0070C0"/>
-                </a:solidFill>
-              </a:rPr>
-              <a:t>@</a:t>
-            </a:r>
-            <a:r>
-              <a:rPr lang="en-US" sz="2400" dirty="0" err="1">
-                <a:solidFill>
-                  <a:srgbClr val="0070C0"/>
-                </a:solidFill>
-              </a:rPr>
-              <a:t>dragoner_JP</a:t>
-            </a:r>
-            <a:r>
-              <a:rPr lang="en-US" sz="2400" dirty="0"/>
-              <a:t>: うげえ……「ラスベガス銃撃の(カナダ人)犠牲者が巨額の医療費に直面」→ Las Vegas shooting victims facing large medical bills </a:t>
-            </a:r>
-            <a:r>
-              <a:rPr lang="en-US" sz="2400" dirty="0">
-                <a:solidFill>
-                  <a:srgbClr val="0070C0"/>
-                </a:solidFill>
-              </a:rPr>
-              <a:t>https://</a:t>
-            </a:r>
-            <a:r>
-              <a:rPr lang="en-US" sz="2400" dirty="0" err="1">
-                <a:solidFill>
-                  <a:srgbClr val="0070C0"/>
-                </a:solidFill>
-              </a:rPr>
-              <a:t>t.co</a:t>
-            </a:r>
-            <a:r>
-              <a:rPr lang="en-US" sz="2400" dirty="0">
-                <a:solidFill>
-                  <a:srgbClr val="0070C0"/>
-                </a:solidFill>
-              </a:rPr>
-              <a:t>/1F3bgH17Jv</a:t>
-            </a:r>
-          </a:p>
-        </p:txBody>
-      </p:sp>
-      <p:sp>
-        <p:nvSpPr>
-          <p:cNvPr id="7" name="Rectangle 6">
-            <a:extLst>
-              <a:ext uri="{FF2B5EF4-FFF2-40B4-BE49-F238E27FC236}">
-                <a16:creationId xmlns:a16="http://schemas.microsoft.com/office/drawing/2014/main" xmlns="" id="{D5F8127B-3EAF-4D79-B961-9CDCF5DA2CA6}"/>
-              </a:ext>
-            </a:extLst>
-          </p:cNvPr>
-          <p:cNvSpPr/>
-          <p:nvPr/>
-        </p:nvSpPr>
-        <p:spPr>
-          <a:xfrm>
-            <a:off x="735330" y="1772052"/>
-            <a:ext cx="8012430" cy="1200329"/>
-          </a:xfrm>
-          <a:prstGeom prst="rect">
-            <a:avLst/>
-          </a:prstGeom>
-        </p:spPr>
-        <p:txBody>
-          <a:bodyPr wrap="square">
-            <a:spAutoFit/>
-          </a:bodyPr>
-          <a:lstStyle/>
-          <a:p>
-            <a:r>
-              <a:rPr lang="en-US" sz="2400" dirty="0"/>
-              <a:t>RT </a:t>
-            </a:r>
-            <a:r>
-              <a:rPr lang="en-US" sz="2400" dirty="0">
-                <a:solidFill>
-                  <a:srgbClr val="0070C0"/>
-                </a:solidFill>
-              </a:rPr>
-              <a:t>@jc_stubbs</a:t>
-            </a:r>
-            <a:r>
-              <a:rPr lang="en-US" sz="2400" dirty="0"/>
-              <a:t>: Another tragic day in </a:t>
-            </a:r>
-            <a:r>
-              <a:rPr lang="en-US" sz="2400" dirty="0">
-                <a:solidFill>
-                  <a:srgbClr val="0070C0"/>
-                </a:solidFill>
-              </a:rPr>
-              <a:t>#Ukraine </a:t>
-            </a:r>
-            <a:r>
-              <a:rPr lang="mr-IN" sz="2400" dirty="0"/>
-              <a:t>–</a:t>
-            </a:r>
-            <a:r>
-              <a:rPr lang="en-US" sz="2400" dirty="0"/>
-              <a:t> More than 50 rebels killed as new leader unleashes assault: </a:t>
-            </a:r>
-            <a:r>
-              <a:rPr lang="en-US" sz="2400" dirty="0">
-                <a:solidFill>
-                  <a:srgbClr val="0070C0"/>
-                </a:solidFill>
-              </a:rPr>
-              <a:t>http://t.co/wcfU3kyAFX</a:t>
-            </a:r>
-          </a:p>
-        </p:txBody>
-      </p:sp>
-    </p:spTree>
-    <p:extLst>
-      <p:ext uri="{BB962C8B-B14F-4D97-AF65-F5344CB8AC3E}">
-        <p14:creationId xmlns:p14="http://schemas.microsoft.com/office/powerpoint/2010/main" val="1556995143"/>
       </p:ext>
     </p:extLst>
   </p:cSld>

</xml_diff>